<commit_message>
Fixed formatting in events/delegates presentation
</commit_message>
<xml_diff>
--- a/Presentation/lesson-05-events.pptx
+++ b/Presentation/lesson-05-events.pptx
@@ -301,7 +301,7 @@
           <a:p>
             <a:fld id="{FAECF776-F836-4CCD-9497-99E5597B8B5D}" type="datetimeFigureOut">
               <a:rPr lang="en-US" smtClean="0"/>
-              <a:t>3/27/2013</a:t>
+              <a:t>4/6/2013</a:t>
             </a:fld>
             <a:endParaRPr lang="en-US"/>
           </a:p>
@@ -471,7 +471,7 @@
           <a:p>
             <a:fld id="{FAECF776-F836-4CCD-9497-99E5597B8B5D}" type="datetimeFigureOut">
               <a:rPr lang="en-US" smtClean="0"/>
-              <a:t>3/27/2013</a:t>
+              <a:t>4/6/2013</a:t>
             </a:fld>
             <a:endParaRPr lang="en-US"/>
           </a:p>
@@ -651,7 +651,7 @@
           <a:p>
             <a:fld id="{FAECF776-F836-4CCD-9497-99E5597B8B5D}" type="datetimeFigureOut">
               <a:rPr lang="en-US" smtClean="0"/>
-              <a:t>3/27/2013</a:t>
+              <a:t>4/6/2013</a:t>
             </a:fld>
             <a:endParaRPr lang="en-US"/>
           </a:p>
@@ -821,7 +821,7 @@
           <a:p>
             <a:fld id="{FAECF776-F836-4CCD-9497-99E5597B8B5D}" type="datetimeFigureOut">
               <a:rPr lang="en-US" smtClean="0"/>
-              <a:t>3/27/2013</a:t>
+              <a:t>4/6/2013</a:t>
             </a:fld>
             <a:endParaRPr lang="en-US"/>
           </a:p>
@@ -1067,7 +1067,7 @@
           <a:p>
             <a:fld id="{FAECF776-F836-4CCD-9497-99E5597B8B5D}" type="datetimeFigureOut">
               <a:rPr lang="en-US" smtClean="0"/>
-              <a:t>3/27/2013</a:t>
+              <a:t>4/6/2013</a:t>
             </a:fld>
             <a:endParaRPr lang="en-US"/>
           </a:p>
@@ -1355,7 +1355,7 @@
           <a:p>
             <a:fld id="{FAECF776-F836-4CCD-9497-99E5597B8B5D}" type="datetimeFigureOut">
               <a:rPr lang="en-US" smtClean="0"/>
-              <a:t>3/27/2013</a:t>
+              <a:t>4/6/2013</a:t>
             </a:fld>
             <a:endParaRPr lang="en-US"/>
           </a:p>
@@ -1777,7 +1777,7 @@
           <a:p>
             <a:fld id="{FAECF776-F836-4CCD-9497-99E5597B8B5D}" type="datetimeFigureOut">
               <a:rPr lang="en-US" smtClean="0"/>
-              <a:t>3/27/2013</a:t>
+              <a:t>4/6/2013</a:t>
             </a:fld>
             <a:endParaRPr lang="en-US"/>
           </a:p>
@@ -1895,7 +1895,7 @@
           <a:p>
             <a:fld id="{FAECF776-F836-4CCD-9497-99E5597B8B5D}" type="datetimeFigureOut">
               <a:rPr lang="en-US" smtClean="0"/>
-              <a:t>3/27/2013</a:t>
+              <a:t>4/6/2013</a:t>
             </a:fld>
             <a:endParaRPr lang="en-US"/>
           </a:p>
@@ -1990,7 +1990,7 @@
           <a:p>
             <a:fld id="{FAECF776-F836-4CCD-9497-99E5597B8B5D}" type="datetimeFigureOut">
               <a:rPr lang="en-US" smtClean="0"/>
-              <a:t>3/27/2013</a:t>
+              <a:t>4/6/2013</a:t>
             </a:fld>
             <a:endParaRPr lang="en-US"/>
           </a:p>
@@ -2267,7 +2267,7 @@
           <a:p>
             <a:fld id="{FAECF776-F836-4CCD-9497-99E5597B8B5D}" type="datetimeFigureOut">
               <a:rPr lang="en-US" smtClean="0"/>
-              <a:t>3/27/2013</a:t>
+              <a:t>4/6/2013</a:t>
             </a:fld>
             <a:endParaRPr lang="en-US"/>
           </a:p>
@@ -2520,7 +2520,7 @@
           <a:p>
             <a:fld id="{FAECF776-F836-4CCD-9497-99E5597B8B5D}" type="datetimeFigureOut">
               <a:rPr lang="en-US" smtClean="0"/>
-              <a:t>3/27/2013</a:t>
+              <a:t>4/6/2013</a:t>
             </a:fld>
             <a:endParaRPr lang="en-US"/>
           </a:p>
@@ -2733,7 +2733,7 @@
           <a:p>
             <a:fld id="{FAECF776-F836-4CCD-9497-99E5597B8B5D}" type="datetimeFigureOut">
               <a:rPr lang="en-US" smtClean="0"/>
-              <a:t>3/27/2013</a:t>
+              <a:t>4/6/2013</a:t>
             </a:fld>
             <a:endParaRPr lang="en-US"/>
           </a:p>
@@ -4183,6 +4183,17 @@
               <a:defRPr/>
             </a:pPr>
             <a:r>
+              <a:rPr lang="en-US" sz="1000" dirty="0" smtClean="0">
+                <a:solidFill>
+                  <a:schemeClr val="bg1"/>
+                </a:solidFill>
+                <a:latin typeface="Courier New" pitchFamily="49" charset="0"/>
+                <a:ea typeface="Calibri" pitchFamily="34" charset="0"/>
+                <a:cs typeface="Courier New" pitchFamily="49" charset="0"/>
+              </a:rPr>
+              <a:t>            _</a:t>
+            </a:r>
+            <a:r>
               <a:rPr lang="en-US" sz="1000" dirty="0">
                 <a:solidFill>
                   <a:schemeClr val="bg1"/>
@@ -4191,7 +4202,18 @@
                 <a:ea typeface="Calibri" pitchFamily="34" charset="0"/>
                 <a:cs typeface="Courier New" pitchFamily="49" charset="0"/>
               </a:rPr>
-              <a:t>			_speed += 20;</a:t>
+              <a:t>speed += </a:t>
+            </a:r>
+            <a:r>
+              <a:rPr lang="en-US" sz="1000" dirty="0" smtClean="0">
+                <a:solidFill>
+                  <a:schemeClr val="bg1"/>
+                </a:solidFill>
+                <a:latin typeface="Courier New" pitchFamily="49" charset="0"/>
+                <a:ea typeface="Calibri" pitchFamily="34" charset="0"/>
+                <a:cs typeface="Courier New" pitchFamily="49" charset="0"/>
+              </a:rPr>
+              <a:t>20;</a:t>
             </a:r>
           </a:p>
           <a:p>
@@ -4207,7 +4229,88 @@
                 <a:ea typeface="Calibri" pitchFamily="34" charset="0"/>
                 <a:cs typeface="Courier New" pitchFamily="49" charset="0"/>
               </a:rPr>
-              <a:t>			</a:t>
+              <a:t> </a:t>
+            </a:r>
+            <a:r>
+              <a:rPr lang="en-US" sz="1000" dirty="0" smtClean="0">
+                <a:solidFill>
+                  <a:schemeClr val="bg1"/>
+                </a:solidFill>
+                <a:latin typeface="Courier New" pitchFamily="49" charset="0"/>
+                <a:ea typeface="Calibri" pitchFamily="34" charset="0"/>
+                <a:cs typeface="Courier New" pitchFamily="49" charset="0"/>
+              </a:rPr>
+              <a:t>           </a:t>
+            </a:r>
+            <a:r>
+              <a:rPr lang="en-US" sz="1000" dirty="0" err="1" smtClean="0">
+                <a:solidFill>
+                  <a:schemeClr val="bg1"/>
+                </a:solidFill>
+                <a:latin typeface="Courier New" pitchFamily="49" charset="0"/>
+                <a:ea typeface="Calibri" pitchFamily="34" charset="0"/>
+                <a:cs typeface="Courier New" pitchFamily="49" charset="0"/>
+              </a:rPr>
+              <a:t>Console.WriteLine</a:t>
+            </a:r>
+            <a:r>
+              <a:rPr lang="en-US" sz="1000" dirty="0">
+                <a:solidFill>
+                  <a:schemeClr val="bg1"/>
+                </a:solidFill>
+                <a:latin typeface="Courier New" pitchFamily="49" charset="0"/>
+                <a:ea typeface="Calibri" pitchFamily="34" charset="0"/>
+                <a:cs typeface="Courier New" pitchFamily="49" charset="0"/>
+              </a:rPr>
+              <a:t>("Speed = {0}", _speed);</a:t>
+            </a:r>
+          </a:p>
+          <a:p>
+            <a:pPr eaLnBrk="0" hangingPunct="0">
+              <a:defRPr/>
+            </a:pPr>
+            <a:r>
+              <a:rPr lang="en-US" sz="1000" dirty="0">
+                <a:solidFill>
+                  <a:schemeClr val="bg1"/>
+                </a:solidFill>
+                <a:latin typeface="Courier New" pitchFamily="49" charset="0"/>
+                <a:ea typeface="Calibri" pitchFamily="34" charset="0"/>
+                <a:cs typeface="Courier New" pitchFamily="49" charset="0"/>
+              </a:rPr>
+              <a:t>            if (_speed &gt; 200)</a:t>
+            </a:r>
+          </a:p>
+          <a:p>
+            <a:pPr eaLnBrk="0" hangingPunct="0">
+              <a:defRPr/>
+            </a:pPr>
+            <a:r>
+              <a:rPr lang="en-US" sz="1000" dirty="0">
+                <a:solidFill>
+                  <a:schemeClr val="bg1"/>
+                </a:solidFill>
+                <a:latin typeface="Courier New" pitchFamily="49" charset="0"/>
+                <a:ea typeface="Calibri" pitchFamily="34" charset="0"/>
+                <a:cs typeface="Courier New" pitchFamily="49" charset="0"/>
+              </a:rPr>
+              <a:t>            {</a:t>
+            </a:r>
+          </a:p>
+          <a:p>
+            <a:pPr eaLnBrk="0" hangingPunct="0">
+              <a:defRPr/>
+            </a:pPr>
+            <a:r>
+              <a:rPr lang="en-US" sz="1000" dirty="0">
+                <a:solidFill>
+                  <a:schemeClr val="bg1"/>
+                </a:solidFill>
+                <a:latin typeface="Courier New" pitchFamily="49" charset="0"/>
+                <a:ea typeface="Calibri" pitchFamily="34" charset="0"/>
+                <a:cs typeface="Courier New" pitchFamily="49" charset="0"/>
+              </a:rPr>
+              <a:t>                </a:t>
             </a:r>
             <a:r>
               <a:rPr lang="en-US" sz="1000" dirty="0" err="1">
@@ -4218,7 +4321,7 @@
                 <a:ea typeface="Calibri" pitchFamily="34" charset="0"/>
                 <a:cs typeface="Courier New" pitchFamily="49" charset="0"/>
               </a:rPr>
-              <a:t>Console.WriteLine</a:t>
+              <a:t>Console.Write</a:t>
             </a:r>
             <a:r>
               <a:rPr lang="en-US" sz="1000" dirty="0">
@@ -4229,13 +4332,24 @@
                 <a:ea typeface="Calibri" pitchFamily="34" charset="0"/>
                 <a:cs typeface="Courier New" pitchFamily="49" charset="0"/>
               </a:rPr>
-              <a:t>("Speed = {0}", _speed);</a:t>
-            </a:r>
-          </a:p>
-          <a:p>
-            <a:pPr eaLnBrk="0" hangingPunct="0">
-              <a:defRPr/>
-            </a:pPr>
+              <a:t>("Engine explode...");</a:t>
+            </a:r>
+          </a:p>
+          <a:p>
+            <a:pPr eaLnBrk="0" hangingPunct="0">
+              <a:defRPr/>
+            </a:pPr>
+            <a:r>
+              <a:rPr lang="en-US" sz="1000" dirty="0" smtClean="0">
+                <a:solidFill>
+                  <a:schemeClr val="bg1"/>
+                </a:solidFill>
+                <a:latin typeface="Courier New" pitchFamily="49" charset="0"/>
+                <a:ea typeface="Calibri" pitchFamily="34" charset="0"/>
+                <a:cs typeface="Courier New" pitchFamily="49" charset="0"/>
+              </a:rPr>
+              <a:t>                if </a:t>
+            </a:r>
             <a:r>
               <a:rPr lang="en-US" sz="1000" dirty="0">
                 <a:solidFill>
@@ -4245,7 +4359,7 @@
                 <a:ea typeface="Calibri" pitchFamily="34" charset="0"/>
                 <a:cs typeface="Courier New" pitchFamily="49" charset="0"/>
               </a:rPr>
-              <a:t>            if (_speed &gt; 200)</a:t>
+              <a:t>(Explode != null)</a:t>
             </a:r>
           </a:p>
           <a:p>
@@ -4261,13 +4375,24 @@
                 <a:ea typeface="Calibri" pitchFamily="34" charset="0"/>
                 <a:cs typeface="Courier New" pitchFamily="49" charset="0"/>
               </a:rPr>
-              <a:t>            {</a:t>
-            </a:r>
-          </a:p>
-          <a:p>
-            <a:pPr eaLnBrk="0" hangingPunct="0">
-              <a:defRPr/>
-            </a:pPr>
+              <a:t>                {</a:t>
+            </a:r>
+          </a:p>
+          <a:p>
+            <a:pPr eaLnBrk="0" hangingPunct="0">
+              <a:defRPr/>
+            </a:pPr>
+            <a:r>
+              <a:rPr lang="en-US" sz="1000" dirty="0" smtClean="0">
+                <a:solidFill>
+                  <a:schemeClr val="bg1"/>
+                </a:solidFill>
+                <a:latin typeface="Courier New" pitchFamily="49" charset="0"/>
+                <a:ea typeface="Calibri" pitchFamily="34" charset="0"/>
+                <a:cs typeface="Courier New" pitchFamily="49" charset="0"/>
+              </a:rPr>
+              <a:t>                    Explode</a:t>
+            </a:r>
             <a:r>
               <a:rPr lang="en-US" sz="1000" dirty="0">
                 <a:solidFill>
@@ -4277,105 +4402,54 @@
                 <a:ea typeface="Calibri" pitchFamily="34" charset="0"/>
                 <a:cs typeface="Courier New" pitchFamily="49" charset="0"/>
               </a:rPr>
+              <a:t>(); /</a:t>
+            </a:r>
+            <a:r>
+              <a:rPr lang="be-BY" sz="1000" dirty="0">
+                <a:solidFill>
+                  <a:schemeClr val="bg1"/>
+                </a:solidFill>
+                <a:latin typeface="Courier New" pitchFamily="49" charset="0"/>
+                <a:ea typeface="Calibri" pitchFamily="34" charset="0"/>
+                <a:cs typeface="Courier New" pitchFamily="49" charset="0"/>
+              </a:rPr>
+              <a:t>Шаг 3. Вызов (генерация) события</a:t>
+            </a:r>
+          </a:p>
+          <a:p>
+            <a:pPr eaLnBrk="0" hangingPunct="0">
+              <a:defRPr/>
+            </a:pPr>
+            <a:r>
+              <a:rPr lang="en-US" sz="1000" dirty="0" smtClean="0">
+                <a:solidFill>
+                  <a:schemeClr val="bg1"/>
+                </a:solidFill>
+                <a:latin typeface="Courier New" pitchFamily="49" charset="0"/>
+                <a:ea typeface="Calibri" pitchFamily="34" charset="0"/>
+                <a:cs typeface="Courier New" pitchFamily="49" charset="0"/>
+              </a:rPr>
               <a:t>                </a:t>
             </a:r>
             <a:r>
-              <a:rPr lang="en-US" sz="1000" dirty="0" err="1">
-                <a:solidFill>
-                  <a:schemeClr val="bg1"/>
-                </a:solidFill>
-                <a:latin typeface="Courier New" pitchFamily="49" charset="0"/>
-                <a:ea typeface="Calibri" pitchFamily="34" charset="0"/>
-                <a:cs typeface="Courier New" pitchFamily="49" charset="0"/>
-              </a:rPr>
-              <a:t>Console.Write</a:t>
-            </a:r>
-            <a:r>
-              <a:rPr lang="en-US" sz="1000" dirty="0">
-                <a:solidFill>
-                  <a:schemeClr val="bg1"/>
-                </a:solidFill>
-                <a:latin typeface="Courier New" pitchFamily="49" charset="0"/>
-                <a:ea typeface="Calibri" pitchFamily="34" charset="0"/>
-                <a:cs typeface="Courier New" pitchFamily="49" charset="0"/>
-              </a:rPr>
-              <a:t>("Engine explode...");</a:t>
-            </a:r>
-          </a:p>
-          <a:p>
-            <a:pPr eaLnBrk="0" hangingPunct="0">
-              <a:defRPr/>
-            </a:pPr>
-            <a:r>
-              <a:rPr lang="en-US" sz="1000" dirty="0">
-                <a:solidFill>
-                  <a:schemeClr val="bg1"/>
-                </a:solidFill>
-                <a:latin typeface="Courier New" pitchFamily="49" charset="0"/>
-                <a:ea typeface="Calibri" pitchFamily="34" charset="0"/>
-                <a:cs typeface="Courier New" pitchFamily="49" charset="0"/>
-              </a:rPr>
-              <a:t>				if (Explode != null)</a:t>
-            </a:r>
-          </a:p>
-          <a:p>
-            <a:pPr eaLnBrk="0" hangingPunct="0">
-              <a:defRPr/>
-            </a:pPr>
-            <a:r>
-              <a:rPr lang="en-US" sz="1000" dirty="0">
-                <a:solidFill>
-                  <a:schemeClr val="bg1"/>
-                </a:solidFill>
-                <a:latin typeface="Courier New" pitchFamily="49" charset="0"/>
-                <a:ea typeface="Calibri" pitchFamily="34" charset="0"/>
-                <a:cs typeface="Courier New" pitchFamily="49" charset="0"/>
-              </a:rPr>
-              <a:t>                {</a:t>
-            </a:r>
-          </a:p>
-          <a:p>
-            <a:pPr eaLnBrk="0" hangingPunct="0">
-              <a:defRPr/>
-            </a:pPr>
-            <a:r>
-              <a:rPr lang="en-US" sz="1000" dirty="0">
-                <a:solidFill>
-                  <a:schemeClr val="bg1"/>
-                </a:solidFill>
-                <a:latin typeface="Courier New" pitchFamily="49" charset="0"/>
-                <a:ea typeface="Calibri" pitchFamily="34" charset="0"/>
-                <a:cs typeface="Courier New" pitchFamily="49" charset="0"/>
-              </a:rPr>
-              <a:t>					Explode(); /</a:t>
-            </a:r>
-            <a:r>
-              <a:rPr lang="be-BY" sz="1000" dirty="0">
-                <a:solidFill>
-                  <a:schemeClr val="bg1"/>
-                </a:solidFill>
-                <a:latin typeface="Courier New" pitchFamily="49" charset="0"/>
-                <a:ea typeface="Calibri" pitchFamily="34" charset="0"/>
-                <a:cs typeface="Courier New" pitchFamily="49" charset="0"/>
-              </a:rPr>
-              <a:t>Шаг 3. Вызов (генерация) события</a:t>
-            </a:r>
-          </a:p>
-          <a:p>
-            <a:pPr eaLnBrk="0" hangingPunct="0">
-              <a:defRPr/>
-            </a:pPr>
-            <a:r>
-              <a:rPr lang="be-BY" sz="1000" dirty="0">
-                <a:solidFill>
-                  <a:schemeClr val="bg1"/>
-                </a:solidFill>
-                <a:latin typeface="Courier New" pitchFamily="49" charset="0"/>
-                <a:ea typeface="Calibri" pitchFamily="34" charset="0"/>
-                <a:cs typeface="Courier New" pitchFamily="49" charset="0"/>
-              </a:rPr>
-              <a:t>				}</a:t>
-            </a:r>
+              <a:rPr lang="be-BY" sz="1000" dirty="0" smtClean="0">
+                <a:solidFill>
+                  <a:schemeClr val="bg1"/>
+                </a:solidFill>
+                <a:latin typeface="Courier New" pitchFamily="49" charset="0"/>
+                <a:ea typeface="Calibri" pitchFamily="34" charset="0"/>
+                <a:cs typeface="Courier New" pitchFamily="49" charset="0"/>
+              </a:rPr>
+              <a:t>}</a:t>
+            </a:r>
+            <a:endParaRPr lang="be-BY" sz="1000" dirty="0">
+              <a:solidFill>
+                <a:schemeClr val="bg1"/>
+              </a:solidFill>
+              <a:latin typeface="Courier New" pitchFamily="49" charset="0"/>
+              <a:ea typeface="Calibri" pitchFamily="34" charset="0"/>
+              <a:cs typeface="Courier New" pitchFamily="49" charset="0"/>
+            </a:endParaRPr>
           </a:p>
           <a:p>
             <a:pPr eaLnBrk="0" hangingPunct="0">
@@ -12566,14 +12640,30 @@
           <a:p>
             <a:pPr eaLnBrk="1" hangingPunct="1"/>
             <a:r>
-              <a:rPr lang="ru-RU" sz="1600"/>
-              <a:t>	Для шаблонных делегатов также модно использовать сокращенную запись</a:t>
-            </a:r>
-            <a:r>
-              <a:rPr lang="en-US" sz="1600"/>
+              <a:rPr lang="ru-RU" sz="1600" dirty="0"/>
+              <a:t>	Для шаблонных делегатов также </a:t>
+            </a:r>
+            <a:r>
+              <a:rPr lang="ru-RU" sz="1600" dirty="0" smtClean="0"/>
+              <a:t>мо</a:t>
+            </a:r>
+            <a:r>
+              <a:rPr lang="ru-RU" sz="1600" dirty="0"/>
+              <a:t>ж</a:t>
+            </a:r>
+            <a:r>
+              <a:rPr lang="ru-RU" sz="1600" dirty="0" smtClean="0"/>
+              <a:t>но </a:t>
+            </a:r>
+            <a:r>
+              <a:rPr lang="ru-RU" sz="1600" dirty="0"/>
+              <a:t>использовать сокращенную запись</a:t>
+            </a:r>
+            <a:r>
+              <a:rPr lang="en-US" sz="1600" dirty="0"/>
               <a:t>:</a:t>
             </a:r>
-            <a:endParaRPr lang="be-BY" sz="1600">
+            <a:endParaRPr lang="be-BY" sz="1600" dirty="0">
               <a:solidFill>
                 <a:srgbClr val="008080"/>
               </a:solidFill>

</xml_diff>

<commit_message>
Moved timer home task to multithreading lesson
</commit_message>
<xml_diff>
--- a/Presentation/lesson-05-events.pptx
+++ b/Presentation/lesson-05-events.pptx
@@ -19,7 +19,6 @@
     <p:sldId id="282" r:id="rId13"/>
     <p:sldId id="283" r:id="rId14"/>
     <p:sldId id="286" r:id="rId15"/>
-    <p:sldId id="284" r:id="rId16"/>
   </p:sldIdLst>
   <p:sldSz cx="9144000" cy="6858000" type="screen4x3"/>
   <p:notesSz cx="6858000" cy="9144000"/>
@@ -302,7 +301,7 @@
           <a:p>
             <a:fld id="{FAECF776-F836-4CCD-9497-99E5597B8B5D}" type="datetimeFigureOut">
               <a:rPr lang="en-US" smtClean="0"/>
-              <a:t>10/18/2013</a:t>
+              <a:t>11/5/2013</a:t>
             </a:fld>
             <a:endParaRPr lang="en-US"/>
           </a:p>
@@ -472,7 +471,7 @@
           <a:p>
             <a:fld id="{FAECF776-F836-4CCD-9497-99E5597B8B5D}" type="datetimeFigureOut">
               <a:rPr lang="en-US" smtClean="0"/>
-              <a:t>10/18/2013</a:t>
+              <a:t>11/5/2013</a:t>
             </a:fld>
             <a:endParaRPr lang="en-US"/>
           </a:p>
@@ -652,7 +651,7 @@
           <a:p>
             <a:fld id="{FAECF776-F836-4CCD-9497-99E5597B8B5D}" type="datetimeFigureOut">
               <a:rPr lang="en-US" smtClean="0"/>
-              <a:t>10/18/2013</a:t>
+              <a:t>11/5/2013</a:t>
             </a:fld>
             <a:endParaRPr lang="en-US"/>
           </a:p>
@@ -822,7 +821,7 @@
           <a:p>
             <a:fld id="{FAECF776-F836-4CCD-9497-99E5597B8B5D}" type="datetimeFigureOut">
               <a:rPr lang="en-US" smtClean="0"/>
-              <a:t>10/18/2013</a:t>
+              <a:t>11/5/2013</a:t>
             </a:fld>
             <a:endParaRPr lang="en-US"/>
           </a:p>
@@ -1068,7 +1067,7 @@
           <a:p>
             <a:fld id="{FAECF776-F836-4CCD-9497-99E5597B8B5D}" type="datetimeFigureOut">
               <a:rPr lang="en-US" smtClean="0"/>
-              <a:t>10/18/2013</a:t>
+              <a:t>11/5/2013</a:t>
             </a:fld>
             <a:endParaRPr lang="en-US"/>
           </a:p>
@@ -1356,7 +1355,7 @@
           <a:p>
             <a:fld id="{FAECF776-F836-4CCD-9497-99E5597B8B5D}" type="datetimeFigureOut">
               <a:rPr lang="en-US" smtClean="0"/>
-              <a:t>10/18/2013</a:t>
+              <a:t>11/5/2013</a:t>
             </a:fld>
             <a:endParaRPr lang="en-US"/>
           </a:p>
@@ -1778,7 +1777,7 @@
           <a:p>
             <a:fld id="{FAECF776-F836-4CCD-9497-99E5597B8B5D}" type="datetimeFigureOut">
               <a:rPr lang="en-US" smtClean="0"/>
-              <a:t>10/18/2013</a:t>
+              <a:t>11/5/2013</a:t>
             </a:fld>
             <a:endParaRPr lang="en-US"/>
           </a:p>
@@ -1896,7 +1895,7 @@
           <a:p>
             <a:fld id="{FAECF776-F836-4CCD-9497-99E5597B8B5D}" type="datetimeFigureOut">
               <a:rPr lang="en-US" smtClean="0"/>
-              <a:t>10/18/2013</a:t>
+              <a:t>11/5/2013</a:t>
             </a:fld>
             <a:endParaRPr lang="en-US"/>
           </a:p>
@@ -1991,7 +1990,7 @@
           <a:p>
             <a:fld id="{FAECF776-F836-4CCD-9497-99E5597B8B5D}" type="datetimeFigureOut">
               <a:rPr lang="en-US" smtClean="0"/>
-              <a:t>10/18/2013</a:t>
+              <a:t>11/5/2013</a:t>
             </a:fld>
             <a:endParaRPr lang="en-US"/>
           </a:p>
@@ -2268,7 +2267,7 @@
           <a:p>
             <a:fld id="{FAECF776-F836-4CCD-9497-99E5597B8B5D}" type="datetimeFigureOut">
               <a:rPr lang="en-US" smtClean="0"/>
-              <a:t>10/18/2013</a:t>
+              <a:t>11/5/2013</a:t>
             </a:fld>
             <a:endParaRPr lang="en-US"/>
           </a:p>
@@ -2521,7 +2520,7 @@
           <a:p>
             <a:fld id="{FAECF776-F836-4CCD-9497-99E5597B8B5D}" type="datetimeFigureOut">
               <a:rPr lang="en-US" smtClean="0"/>
-              <a:t>10/18/2013</a:t>
+              <a:t>11/5/2013</a:t>
             </a:fld>
             <a:endParaRPr lang="en-US"/>
           </a:p>
@@ -2734,7 +2733,7 @@
           <a:p>
             <a:fld id="{FAECF776-F836-4CCD-9497-99E5597B8B5D}" type="datetimeFigureOut">
               <a:rPr lang="en-US" smtClean="0"/>
-              <a:t>10/18/2013</a:t>
+              <a:t>11/5/2013</a:t>
             </a:fld>
             <a:endParaRPr lang="en-US"/>
           </a:p>
@@ -5722,7 +5721,31 @@
                   <a:schemeClr val="bg1"/>
                 </a:solidFill>
               </a:rPr>
-              <a:t>обработки </a:t>
+              <a:t>обработки событий в </a:t>
+            </a:r>
+            <a:r>
+              <a:rPr lang="ru-RU" sz="1600" dirty="0" smtClean="0">
+                <a:solidFill>
+                  <a:schemeClr val="bg1"/>
+                </a:solidFill>
+              </a:rPr>
+              <a:t>приложениях </a:t>
+            </a:r>
+            <a:r>
+              <a:rPr lang="en-US" sz="1600" dirty="0" smtClean="0">
+                <a:solidFill>
+                  <a:schemeClr val="bg1"/>
+                </a:solidFill>
+              </a:rPr>
+              <a:t>Windows Forms</a:t>
+            </a:r>
+            <a:r>
+              <a:rPr lang="ru-RU" sz="1600" dirty="0" smtClean="0">
+                <a:solidFill>
+                  <a:schemeClr val="bg1"/>
+                </a:solidFill>
+              </a:rPr>
+              <a:t> </a:t>
             </a:r>
             <a:r>
               <a:rPr lang="ru-RU" sz="1600" dirty="0">
@@ -5730,47 +5753,7 @@
                   <a:schemeClr val="bg1"/>
                 </a:solidFill>
               </a:rPr>
-              <a:t>событий в </a:t>
-            </a:r>
-            <a:r>
-              <a:rPr lang="ru-RU" sz="1600" dirty="0" smtClean="0">
-                <a:solidFill>
-                  <a:schemeClr val="bg1"/>
-                </a:solidFill>
-              </a:rPr>
-              <a:t>приложениях </a:t>
-            </a:r>
-            <a:r>
-              <a:rPr lang="en-US" sz="1600" dirty="0" smtClean="0">
-                <a:solidFill>
-                  <a:schemeClr val="bg1"/>
-                </a:solidFill>
-              </a:rPr>
-              <a:t>Windows Forms</a:t>
-            </a:r>
-            <a:r>
-              <a:rPr lang="ru-RU" sz="1600" dirty="0" smtClean="0">
-                <a:solidFill>
-                  <a:schemeClr val="bg1"/>
-                </a:solidFill>
-              </a:rPr>
-              <a:t> </a:t>
-            </a:r>
-            <a:r>
-              <a:rPr lang="ru-RU" sz="1600" dirty="0">
-                <a:solidFill>
-                  <a:schemeClr val="bg1"/>
-                </a:solidFill>
-              </a:rPr>
-              <a:t>применяются </a:t>
-            </a:r>
-            <a:r>
-              <a:rPr lang="ru-RU" sz="1600" dirty="0">
-                <a:solidFill>
-                  <a:schemeClr val="bg1"/>
-                </a:solidFill>
-              </a:rPr>
-              <a:t>готовые делегаты</a:t>
+              <a:t>применяются готовые делегаты</a:t>
             </a:r>
             <a:r>
               <a:rPr lang="en-US" sz="1600" dirty="0">
@@ -9206,310 +9189,6 @@
     <p:extLst>
       <p:ext uri="{BB962C8B-B14F-4D97-AF65-F5344CB8AC3E}">
         <p14:creationId xmlns:p14="http://schemas.microsoft.com/office/powerpoint/2010/main" val="3317838411"/>
-      </p:ext>
-    </p:extLst>
-  </p:cSld>
-  <p:clrMapOvr>
-    <a:masterClrMapping/>
-  </p:clrMapOvr>
-  <p:timing>
-    <p:tnLst>
-      <p:par>
-        <p:cTn id="1" dur="indefinite" restart="never" nodeType="tmRoot"/>
-      </p:par>
-    </p:tnLst>
-  </p:timing>
-</p:sld>
-</file>
-
-<file path=ppt/slides/slide15.xml><?xml version="1.0" encoding="utf-8"?>
-<p:sld xmlns:a="http://schemas.openxmlformats.org/drawingml/2006/main" xmlns:r="http://schemas.openxmlformats.org/officeDocument/2006/relationships" xmlns:p="http://schemas.openxmlformats.org/presentationml/2006/main">
-  <p:cSld>
-    <p:bg>
-      <p:bgPr>
-        <a:solidFill>
-          <a:srgbClr val="6600CC"/>
-        </a:solidFill>
-        <a:effectLst/>
-      </p:bgPr>
-    </p:bg>
-    <p:spTree>
-      <p:nvGrpSpPr>
-        <p:cNvPr id="1" name=""/>
-        <p:cNvGrpSpPr/>
-        <p:nvPr/>
-      </p:nvGrpSpPr>
-      <p:grpSpPr>
-        <a:xfrm>
-          <a:off x="0" y="0"/>
-          <a:ext cx="0" cy="0"/>
-          <a:chOff x="0" y="0"/>
-          <a:chExt cx="0" cy="0"/>
-        </a:xfrm>
-      </p:grpSpPr>
-      <p:sp>
-        <p:nvSpPr>
-          <p:cNvPr id="12290" name="Прямоугольник 2"/>
-          <p:cNvSpPr>
-            <a:spLocks noChangeArrowheads="1"/>
-          </p:cNvSpPr>
-          <p:nvPr/>
-        </p:nvSpPr>
-        <p:spPr bwMode="auto">
-          <a:xfrm>
-            <a:off x="2133600" y="0"/>
-            <a:ext cx="5105400" cy="461963"/>
-          </a:xfrm>
-          <a:prstGeom prst="rect">
-            <a:avLst/>
-          </a:prstGeom>
-          <a:noFill/>
-          <a:ln>
-            <a:noFill/>
-          </a:ln>
-          <a:extLst>
-            <a:ext uri="{909E8E84-426E-40DD-AFC4-6F175D3DCCD1}">
-              <a14:hiddenFill xmlns:a14="http://schemas.microsoft.com/office/drawing/2010/main">
-                <a:solidFill>
-                  <a:srgbClr val="FFFFFF"/>
-                </a:solidFill>
-              </a14:hiddenFill>
-            </a:ext>
-            <a:ext uri="{91240B29-F687-4F45-9708-019B960494DF}">
-              <a14:hiddenLine xmlns:a14="http://schemas.microsoft.com/office/drawing/2010/main" w="9525">
-                <a:solidFill>
-                  <a:srgbClr val="000000"/>
-                </a:solidFill>
-                <a:miter lim="800000"/>
-                <a:headEnd/>
-                <a:tailEnd/>
-              </a14:hiddenLine>
-            </a:ext>
-          </a:extLst>
-        </p:spPr>
-        <p:txBody>
-          <a:bodyPr>
-            <a:spAutoFit/>
-          </a:bodyPr>
-          <a:lstStyle/>
-          <a:p>
-            <a:pPr algn="ctr"/>
-            <a:r>
-              <a:rPr lang="ru-RU" sz="2400" b="1" dirty="0" smtClean="0"/>
-              <a:t>Домашнее задание</a:t>
-            </a:r>
-            <a:endParaRPr lang="ru-RU" sz="2400" b="1" dirty="0"/>
-          </a:p>
-        </p:txBody>
-      </p:sp>
-      <p:sp>
-        <p:nvSpPr>
-          <p:cNvPr id="8" name="TextBox 6"/>
-          <p:cNvSpPr txBox="1">
-            <a:spLocks noChangeArrowheads="1"/>
-          </p:cNvSpPr>
-          <p:nvPr/>
-        </p:nvSpPr>
-        <p:spPr bwMode="auto">
-          <a:xfrm>
-            <a:off x="152400" y="620688"/>
-            <a:ext cx="8839200" cy="923330"/>
-          </a:xfrm>
-          <a:prstGeom prst="rect">
-            <a:avLst/>
-          </a:prstGeom>
-          <a:noFill/>
-          <a:ln>
-            <a:noFill/>
-          </a:ln>
-          <a:extLst>
-            <a:ext uri="{909E8E84-426E-40DD-AFC4-6F175D3DCCD1}">
-              <a14:hiddenFill xmlns:a14="http://schemas.microsoft.com/office/drawing/2010/main">
-                <a:solidFill>
-                  <a:srgbClr val="FFFFFF"/>
-                </a:solidFill>
-              </a14:hiddenFill>
-            </a:ext>
-            <a:ext uri="{91240B29-F687-4F45-9708-019B960494DF}">
-              <a14:hiddenLine xmlns:a14="http://schemas.microsoft.com/office/drawing/2010/main" w="9525">
-                <a:solidFill>
-                  <a:srgbClr val="000000"/>
-                </a:solidFill>
-                <a:miter lim="800000"/>
-                <a:headEnd/>
-                <a:tailEnd/>
-              </a14:hiddenLine>
-            </a:ext>
-          </a:extLst>
-        </p:spPr>
-        <p:txBody>
-          <a:bodyPr>
-            <a:spAutoFit/>
-          </a:bodyPr>
-          <a:lstStyle>
-            <a:lvl1pPr defTabSz="358775" eaLnBrk="0" hangingPunct="0">
-              <a:defRPr>
-                <a:solidFill>
-                  <a:schemeClr val="tx1"/>
-                </a:solidFill>
-                <a:latin typeface="Arial" charset="0"/>
-              </a:defRPr>
-            </a:lvl1pPr>
-            <a:lvl2pPr marL="742950" indent="-285750" defTabSz="358775" eaLnBrk="0" hangingPunct="0">
-              <a:defRPr>
-                <a:solidFill>
-                  <a:schemeClr val="tx1"/>
-                </a:solidFill>
-                <a:latin typeface="Arial" charset="0"/>
-              </a:defRPr>
-            </a:lvl2pPr>
-            <a:lvl3pPr marL="1143000" indent="-228600" defTabSz="358775" eaLnBrk="0" hangingPunct="0">
-              <a:defRPr>
-                <a:solidFill>
-                  <a:schemeClr val="tx1"/>
-                </a:solidFill>
-                <a:latin typeface="Arial" charset="0"/>
-              </a:defRPr>
-            </a:lvl3pPr>
-            <a:lvl4pPr marL="1600200" indent="-228600" defTabSz="358775" eaLnBrk="0" hangingPunct="0">
-              <a:defRPr>
-                <a:solidFill>
-                  <a:schemeClr val="tx1"/>
-                </a:solidFill>
-                <a:latin typeface="Arial" charset="0"/>
-              </a:defRPr>
-            </a:lvl4pPr>
-            <a:lvl5pPr marL="2057400" indent="-228600" defTabSz="358775" eaLnBrk="0" hangingPunct="0">
-              <a:defRPr>
-                <a:solidFill>
-                  <a:schemeClr val="tx1"/>
-                </a:solidFill>
-                <a:latin typeface="Arial" charset="0"/>
-              </a:defRPr>
-            </a:lvl5pPr>
-            <a:lvl6pPr marL="2514600" indent="-228600" defTabSz="358775" eaLnBrk="0" fontAlgn="base" hangingPunct="0">
-              <a:spcBef>
-                <a:spcPct val="0"/>
-              </a:spcBef>
-              <a:spcAft>
-                <a:spcPct val="0"/>
-              </a:spcAft>
-              <a:defRPr>
-                <a:solidFill>
-                  <a:schemeClr val="tx1"/>
-                </a:solidFill>
-                <a:latin typeface="Arial" charset="0"/>
-              </a:defRPr>
-            </a:lvl6pPr>
-            <a:lvl7pPr marL="2971800" indent="-228600" defTabSz="358775" eaLnBrk="0" fontAlgn="base" hangingPunct="0">
-              <a:spcBef>
-                <a:spcPct val="0"/>
-              </a:spcBef>
-              <a:spcAft>
-                <a:spcPct val="0"/>
-              </a:spcAft>
-              <a:defRPr>
-                <a:solidFill>
-                  <a:schemeClr val="tx1"/>
-                </a:solidFill>
-                <a:latin typeface="Arial" charset="0"/>
-              </a:defRPr>
-            </a:lvl7pPr>
-            <a:lvl8pPr marL="3429000" indent="-228600" defTabSz="358775" eaLnBrk="0" fontAlgn="base" hangingPunct="0">
-              <a:spcBef>
-                <a:spcPct val="0"/>
-              </a:spcBef>
-              <a:spcAft>
-                <a:spcPct val="0"/>
-              </a:spcAft>
-              <a:defRPr>
-                <a:solidFill>
-                  <a:schemeClr val="tx1"/>
-                </a:solidFill>
-                <a:latin typeface="Arial" charset="0"/>
-              </a:defRPr>
-            </a:lvl8pPr>
-            <a:lvl9pPr marL="3886200" indent="-228600" defTabSz="358775" eaLnBrk="0" fontAlgn="base" hangingPunct="0">
-              <a:spcBef>
-                <a:spcPct val="0"/>
-              </a:spcBef>
-              <a:spcAft>
-                <a:spcPct val="0"/>
-              </a:spcAft>
-              <a:defRPr>
-                <a:solidFill>
-                  <a:schemeClr val="tx1"/>
-                </a:solidFill>
-                <a:latin typeface="Arial" charset="0"/>
-              </a:defRPr>
-            </a:lvl9pPr>
-          </a:lstStyle>
-          <a:p>
-            <a:pPr eaLnBrk="1" hangingPunct="1"/>
-            <a:r>
-              <a:rPr lang="ru-RU" i="1" dirty="0" smtClean="0">
-                <a:cs typeface="Arial" charset="0"/>
-              </a:rPr>
-              <a:t>Создание </a:t>
-            </a:r>
-            <a:r>
-              <a:rPr lang="ru-RU" i="1" dirty="0">
-                <a:cs typeface="Arial" charset="0"/>
-              </a:rPr>
-              <a:t>класса </a:t>
-            </a:r>
-            <a:r>
-              <a:rPr lang="en-US" i="1" dirty="0">
-                <a:cs typeface="Arial" charset="0"/>
-              </a:rPr>
-              <a:t>“</a:t>
-            </a:r>
-            <a:r>
-              <a:rPr lang="ru-RU" i="1" dirty="0">
-                <a:cs typeface="Arial" charset="0"/>
-              </a:rPr>
-              <a:t>Секундомер</a:t>
-            </a:r>
-            <a:r>
-              <a:rPr lang="en-US" i="1" dirty="0" smtClean="0">
-                <a:cs typeface="Arial" charset="0"/>
-              </a:rPr>
-              <a:t>”.</a:t>
-            </a:r>
-            <a:endParaRPr lang="ru-RU" i="1" dirty="0" smtClean="0">
-              <a:cs typeface="Arial" charset="0"/>
-            </a:endParaRPr>
-          </a:p>
-          <a:p>
-            <a:pPr eaLnBrk="1" hangingPunct="1"/>
-            <a:endParaRPr lang="ru-RU" i="1" dirty="0">
-              <a:cs typeface="Arial" charset="0"/>
-            </a:endParaRPr>
-          </a:p>
-          <a:p>
-            <a:pPr eaLnBrk="1" hangingPunct="1"/>
-            <a:r>
-              <a:rPr lang="ru-RU" i="1" dirty="0" smtClean="0">
-                <a:cs typeface="Arial" charset="0"/>
-              </a:rPr>
-              <a:t>Смотрите текст задания в файле </a:t>
-            </a:r>
-            <a:r>
-              <a:rPr lang="en-US" i="1" dirty="0" smtClean="0">
-                <a:cs typeface="Arial" charset="0"/>
-              </a:rPr>
-              <a:t>gui-seconds-counter.docx</a:t>
-            </a:r>
-            <a:endParaRPr lang="en-US" i="1" dirty="0">
-              <a:cs typeface="Arial" charset="0"/>
-            </a:endParaRPr>
-          </a:p>
-        </p:txBody>
-      </p:sp>
-    </p:spTree>
-    <p:extLst>
-      <p:ext uri="{BB962C8B-B14F-4D97-AF65-F5344CB8AC3E}">
-        <p14:creationId xmlns:p14="http://schemas.microsoft.com/office/powerpoint/2010/main" val="1333012541"/>
       </p:ext>
     </p:extLst>
   </p:cSld>

</xml_diff>

<commit_message>
Added "battery class" home task
</commit_message>
<xml_diff>
--- a/Presentation/lesson-05-events.pptx
+++ b/Presentation/lesson-05-events.pptx
@@ -19,6 +19,7 @@
     <p:sldId id="282" r:id="rId13"/>
     <p:sldId id="283" r:id="rId14"/>
     <p:sldId id="286" r:id="rId15"/>
+    <p:sldId id="287" r:id="rId16"/>
   </p:sldIdLst>
   <p:sldSz cx="9144000" cy="6858000" type="screen4x3"/>
   <p:notesSz cx="6858000" cy="9144000"/>
@@ -301,7 +302,7 @@
           <a:p>
             <a:fld id="{FAECF776-F836-4CCD-9497-99E5597B8B5D}" type="datetimeFigureOut">
               <a:rPr lang="en-US" smtClean="0"/>
-              <a:t>11/5/2013</a:t>
+              <a:t>11/6/2013</a:t>
             </a:fld>
             <a:endParaRPr lang="en-US"/>
           </a:p>
@@ -471,7 +472,7 @@
           <a:p>
             <a:fld id="{FAECF776-F836-4CCD-9497-99E5597B8B5D}" type="datetimeFigureOut">
               <a:rPr lang="en-US" smtClean="0"/>
-              <a:t>11/5/2013</a:t>
+              <a:t>11/6/2013</a:t>
             </a:fld>
             <a:endParaRPr lang="en-US"/>
           </a:p>
@@ -651,7 +652,7 @@
           <a:p>
             <a:fld id="{FAECF776-F836-4CCD-9497-99E5597B8B5D}" type="datetimeFigureOut">
               <a:rPr lang="en-US" smtClean="0"/>
-              <a:t>11/5/2013</a:t>
+              <a:t>11/6/2013</a:t>
             </a:fld>
             <a:endParaRPr lang="en-US"/>
           </a:p>
@@ -821,7 +822,7 @@
           <a:p>
             <a:fld id="{FAECF776-F836-4CCD-9497-99E5597B8B5D}" type="datetimeFigureOut">
               <a:rPr lang="en-US" smtClean="0"/>
-              <a:t>11/5/2013</a:t>
+              <a:t>11/6/2013</a:t>
             </a:fld>
             <a:endParaRPr lang="en-US"/>
           </a:p>
@@ -1067,7 +1068,7 @@
           <a:p>
             <a:fld id="{FAECF776-F836-4CCD-9497-99E5597B8B5D}" type="datetimeFigureOut">
               <a:rPr lang="en-US" smtClean="0"/>
-              <a:t>11/5/2013</a:t>
+              <a:t>11/6/2013</a:t>
             </a:fld>
             <a:endParaRPr lang="en-US"/>
           </a:p>
@@ -1355,7 +1356,7 @@
           <a:p>
             <a:fld id="{FAECF776-F836-4CCD-9497-99E5597B8B5D}" type="datetimeFigureOut">
               <a:rPr lang="en-US" smtClean="0"/>
-              <a:t>11/5/2013</a:t>
+              <a:t>11/6/2013</a:t>
             </a:fld>
             <a:endParaRPr lang="en-US"/>
           </a:p>
@@ -1777,7 +1778,7 @@
           <a:p>
             <a:fld id="{FAECF776-F836-4CCD-9497-99E5597B8B5D}" type="datetimeFigureOut">
               <a:rPr lang="en-US" smtClean="0"/>
-              <a:t>11/5/2013</a:t>
+              <a:t>11/6/2013</a:t>
             </a:fld>
             <a:endParaRPr lang="en-US"/>
           </a:p>
@@ -1895,7 +1896,7 @@
           <a:p>
             <a:fld id="{FAECF776-F836-4CCD-9497-99E5597B8B5D}" type="datetimeFigureOut">
               <a:rPr lang="en-US" smtClean="0"/>
-              <a:t>11/5/2013</a:t>
+              <a:t>11/6/2013</a:t>
             </a:fld>
             <a:endParaRPr lang="en-US"/>
           </a:p>
@@ -1990,7 +1991,7 @@
           <a:p>
             <a:fld id="{FAECF776-F836-4CCD-9497-99E5597B8B5D}" type="datetimeFigureOut">
               <a:rPr lang="en-US" smtClean="0"/>
-              <a:t>11/5/2013</a:t>
+              <a:t>11/6/2013</a:t>
             </a:fld>
             <a:endParaRPr lang="en-US"/>
           </a:p>
@@ -2267,7 +2268,7 @@
           <a:p>
             <a:fld id="{FAECF776-F836-4CCD-9497-99E5597B8B5D}" type="datetimeFigureOut">
               <a:rPr lang="en-US" smtClean="0"/>
-              <a:t>11/5/2013</a:t>
+              <a:t>11/6/2013</a:t>
             </a:fld>
             <a:endParaRPr lang="en-US"/>
           </a:p>
@@ -2520,7 +2521,7 @@
           <a:p>
             <a:fld id="{FAECF776-F836-4CCD-9497-99E5597B8B5D}" type="datetimeFigureOut">
               <a:rPr lang="en-US" smtClean="0"/>
-              <a:t>11/5/2013</a:t>
+              <a:t>11/6/2013</a:t>
             </a:fld>
             <a:endParaRPr lang="en-US"/>
           </a:p>
@@ -2733,7 +2734,7 @@
           <a:p>
             <a:fld id="{FAECF776-F836-4CCD-9497-99E5597B8B5D}" type="datetimeFigureOut">
               <a:rPr lang="en-US" smtClean="0"/>
-              <a:t>11/5/2013</a:t>
+              <a:t>11/6/2013</a:t>
             </a:fld>
             <a:endParaRPr lang="en-US"/>
           </a:p>
@@ -9205,6 +9206,348 @@
 </p:sld>
 </file>
 
+<file path=ppt/slides/slide15.xml><?xml version="1.0" encoding="utf-8"?>
+<p:sld xmlns:a="http://schemas.openxmlformats.org/drawingml/2006/main" xmlns:r="http://schemas.openxmlformats.org/officeDocument/2006/relationships" xmlns:p="http://schemas.openxmlformats.org/presentationml/2006/main">
+  <p:cSld>
+    <p:bg>
+      <p:bgPr>
+        <a:solidFill>
+          <a:srgbClr val="6600CC"/>
+        </a:solidFill>
+        <a:effectLst/>
+      </p:bgPr>
+    </p:bg>
+    <p:spTree>
+      <p:nvGrpSpPr>
+        <p:cNvPr id="1" name=""/>
+        <p:cNvGrpSpPr/>
+        <p:nvPr/>
+      </p:nvGrpSpPr>
+      <p:grpSpPr>
+        <a:xfrm>
+          <a:off x="0" y="0"/>
+          <a:ext cx="0" cy="0"/>
+          <a:chOff x="0" y="0"/>
+          <a:chExt cx="0" cy="0"/>
+        </a:xfrm>
+      </p:grpSpPr>
+      <p:sp>
+        <p:nvSpPr>
+          <p:cNvPr id="12290" name="Прямоугольник 2"/>
+          <p:cNvSpPr>
+            <a:spLocks noChangeArrowheads="1"/>
+          </p:cNvSpPr>
+          <p:nvPr/>
+        </p:nvSpPr>
+        <p:spPr bwMode="auto">
+          <a:xfrm>
+            <a:off x="2133600" y="0"/>
+            <a:ext cx="5105400" cy="461963"/>
+          </a:xfrm>
+          <a:prstGeom prst="rect">
+            <a:avLst/>
+          </a:prstGeom>
+          <a:noFill/>
+          <a:ln>
+            <a:noFill/>
+          </a:ln>
+          <a:extLst>
+            <a:ext uri="{909E8E84-426E-40DD-AFC4-6F175D3DCCD1}">
+              <a14:hiddenFill xmlns:a14="http://schemas.microsoft.com/office/drawing/2010/main">
+                <a:solidFill>
+                  <a:srgbClr val="FFFFFF"/>
+                </a:solidFill>
+              </a14:hiddenFill>
+            </a:ext>
+            <a:ext uri="{91240B29-F687-4F45-9708-019B960494DF}">
+              <a14:hiddenLine xmlns:a14="http://schemas.microsoft.com/office/drawing/2010/main" w="9525">
+                <a:solidFill>
+                  <a:srgbClr val="000000"/>
+                </a:solidFill>
+                <a:miter lim="800000"/>
+                <a:headEnd/>
+                <a:tailEnd/>
+              </a14:hiddenLine>
+            </a:ext>
+          </a:extLst>
+        </p:spPr>
+        <p:txBody>
+          <a:bodyPr>
+            <a:spAutoFit/>
+          </a:bodyPr>
+          <a:lstStyle/>
+          <a:p>
+            <a:pPr algn="ctr"/>
+            <a:r>
+              <a:rPr lang="ru-RU" sz="2400" b="1" dirty="0" smtClean="0">
+                <a:solidFill>
+                  <a:srgbClr val="FFFFFF"/>
+                </a:solidFill>
+              </a:rPr>
+              <a:t>Домашнее задание</a:t>
+            </a:r>
+            <a:endParaRPr lang="ru-RU" sz="2400" b="1" dirty="0">
+              <a:solidFill>
+                <a:srgbClr val="FFFFFF"/>
+              </a:solidFill>
+            </a:endParaRPr>
+          </a:p>
+        </p:txBody>
+      </p:sp>
+      <p:sp>
+        <p:nvSpPr>
+          <p:cNvPr id="8" name="TextBox 6"/>
+          <p:cNvSpPr txBox="1">
+            <a:spLocks noChangeArrowheads="1"/>
+          </p:cNvSpPr>
+          <p:nvPr/>
+        </p:nvSpPr>
+        <p:spPr bwMode="auto">
+          <a:xfrm>
+            <a:off x="152400" y="620688"/>
+            <a:ext cx="8839200" cy="923330"/>
+          </a:xfrm>
+          <a:prstGeom prst="rect">
+            <a:avLst/>
+          </a:prstGeom>
+          <a:noFill/>
+          <a:ln>
+            <a:noFill/>
+          </a:ln>
+          <a:extLst>
+            <a:ext uri="{909E8E84-426E-40DD-AFC4-6F175D3DCCD1}">
+              <a14:hiddenFill xmlns:a14="http://schemas.microsoft.com/office/drawing/2010/main">
+                <a:solidFill>
+                  <a:srgbClr val="FFFFFF"/>
+                </a:solidFill>
+              </a14:hiddenFill>
+            </a:ext>
+            <a:ext uri="{91240B29-F687-4F45-9708-019B960494DF}">
+              <a14:hiddenLine xmlns:a14="http://schemas.microsoft.com/office/drawing/2010/main" w="9525">
+                <a:solidFill>
+                  <a:srgbClr val="000000"/>
+                </a:solidFill>
+                <a:miter lim="800000"/>
+                <a:headEnd/>
+                <a:tailEnd/>
+              </a14:hiddenLine>
+            </a:ext>
+          </a:extLst>
+        </p:spPr>
+        <p:txBody>
+          <a:bodyPr>
+            <a:spAutoFit/>
+          </a:bodyPr>
+          <a:lstStyle>
+            <a:lvl1pPr defTabSz="358775" eaLnBrk="0" hangingPunct="0">
+              <a:defRPr>
+                <a:solidFill>
+                  <a:schemeClr val="tx1"/>
+                </a:solidFill>
+                <a:latin typeface="Arial" charset="0"/>
+              </a:defRPr>
+            </a:lvl1pPr>
+            <a:lvl2pPr marL="742950" indent="-285750" defTabSz="358775" eaLnBrk="0" hangingPunct="0">
+              <a:defRPr>
+                <a:solidFill>
+                  <a:schemeClr val="tx1"/>
+                </a:solidFill>
+                <a:latin typeface="Arial" charset="0"/>
+              </a:defRPr>
+            </a:lvl2pPr>
+            <a:lvl3pPr marL="1143000" indent="-228600" defTabSz="358775" eaLnBrk="0" hangingPunct="0">
+              <a:defRPr>
+                <a:solidFill>
+                  <a:schemeClr val="tx1"/>
+                </a:solidFill>
+                <a:latin typeface="Arial" charset="0"/>
+              </a:defRPr>
+            </a:lvl3pPr>
+            <a:lvl4pPr marL="1600200" indent="-228600" defTabSz="358775" eaLnBrk="0" hangingPunct="0">
+              <a:defRPr>
+                <a:solidFill>
+                  <a:schemeClr val="tx1"/>
+                </a:solidFill>
+                <a:latin typeface="Arial" charset="0"/>
+              </a:defRPr>
+            </a:lvl4pPr>
+            <a:lvl5pPr marL="2057400" indent="-228600" defTabSz="358775" eaLnBrk="0" hangingPunct="0">
+              <a:defRPr>
+                <a:solidFill>
+                  <a:schemeClr val="tx1"/>
+                </a:solidFill>
+                <a:latin typeface="Arial" charset="0"/>
+              </a:defRPr>
+            </a:lvl5pPr>
+            <a:lvl6pPr marL="2514600" indent="-228600" defTabSz="358775" eaLnBrk="0" fontAlgn="base" hangingPunct="0">
+              <a:spcBef>
+                <a:spcPct val="0"/>
+              </a:spcBef>
+              <a:spcAft>
+                <a:spcPct val="0"/>
+              </a:spcAft>
+              <a:defRPr>
+                <a:solidFill>
+                  <a:schemeClr val="tx1"/>
+                </a:solidFill>
+                <a:latin typeface="Arial" charset="0"/>
+              </a:defRPr>
+            </a:lvl6pPr>
+            <a:lvl7pPr marL="2971800" indent="-228600" defTabSz="358775" eaLnBrk="0" fontAlgn="base" hangingPunct="0">
+              <a:spcBef>
+                <a:spcPct val="0"/>
+              </a:spcBef>
+              <a:spcAft>
+                <a:spcPct val="0"/>
+              </a:spcAft>
+              <a:defRPr>
+                <a:solidFill>
+                  <a:schemeClr val="tx1"/>
+                </a:solidFill>
+                <a:latin typeface="Arial" charset="0"/>
+              </a:defRPr>
+            </a:lvl7pPr>
+            <a:lvl8pPr marL="3429000" indent="-228600" defTabSz="358775" eaLnBrk="0" fontAlgn="base" hangingPunct="0">
+              <a:spcBef>
+                <a:spcPct val="0"/>
+              </a:spcBef>
+              <a:spcAft>
+                <a:spcPct val="0"/>
+              </a:spcAft>
+              <a:defRPr>
+                <a:solidFill>
+                  <a:schemeClr val="tx1"/>
+                </a:solidFill>
+                <a:latin typeface="Arial" charset="0"/>
+              </a:defRPr>
+            </a:lvl8pPr>
+            <a:lvl9pPr marL="3886200" indent="-228600" defTabSz="358775" eaLnBrk="0" fontAlgn="base" hangingPunct="0">
+              <a:spcBef>
+                <a:spcPct val="0"/>
+              </a:spcBef>
+              <a:spcAft>
+                <a:spcPct val="0"/>
+              </a:spcAft>
+              <a:defRPr>
+                <a:solidFill>
+                  <a:schemeClr val="tx1"/>
+                </a:solidFill>
+                <a:latin typeface="Arial" charset="0"/>
+              </a:defRPr>
+            </a:lvl9pPr>
+          </a:lstStyle>
+          <a:p>
+            <a:pPr eaLnBrk="1" hangingPunct="1"/>
+            <a:r>
+              <a:rPr lang="ru-RU" i="1" dirty="0" smtClean="0">
+                <a:solidFill>
+                  <a:srgbClr val="FFFFFF"/>
+                </a:solidFill>
+                <a:cs typeface="Arial" charset="0"/>
+              </a:rPr>
+              <a:t>Создание </a:t>
+            </a:r>
+            <a:r>
+              <a:rPr lang="ru-RU" i="1" dirty="0">
+                <a:solidFill>
+                  <a:srgbClr val="FFFFFF"/>
+                </a:solidFill>
+                <a:cs typeface="Arial" charset="0"/>
+              </a:rPr>
+              <a:t>класса </a:t>
+            </a:r>
+            <a:r>
+              <a:rPr lang="en-US" i="1" dirty="0" smtClean="0">
+                <a:solidFill>
+                  <a:srgbClr val="FFFFFF"/>
+                </a:solidFill>
+                <a:cs typeface="Arial" charset="0"/>
+              </a:rPr>
+              <a:t>“</a:t>
+            </a:r>
+            <a:r>
+              <a:rPr lang="ru-RU" i="1" dirty="0" smtClean="0">
+                <a:solidFill>
+                  <a:srgbClr val="FFFFFF"/>
+                </a:solidFill>
+                <a:cs typeface="Arial" charset="0"/>
+              </a:rPr>
+              <a:t>Аккумулятор</a:t>
+            </a:r>
+            <a:r>
+              <a:rPr lang="en-US" i="1" dirty="0" smtClean="0">
+                <a:solidFill>
+                  <a:srgbClr val="FFFFFF"/>
+                </a:solidFill>
+                <a:cs typeface="Arial" charset="0"/>
+              </a:rPr>
+              <a:t>”.</a:t>
+            </a:r>
+            <a:endParaRPr lang="ru-RU" i="1" dirty="0" smtClean="0">
+              <a:solidFill>
+                <a:srgbClr val="FFFFFF"/>
+              </a:solidFill>
+              <a:cs typeface="Arial" charset="0"/>
+            </a:endParaRPr>
+          </a:p>
+          <a:p>
+            <a:pPr eaLnBrk="1" hangingPunct="1"/>
+            <a:endParaRPr lang="ru-RU" i="1" dirty="0">
+              <a:solidFill>
+                <a:srgbClr val="FFFFFF"/>
+              </a:solidFill>
+              <a:cs typeface="Arial" charset="0"/>
+            </a:endParaRPr>
+          </a:p>
+          <a:p>
+            <a:pPr eaLnBrk="1" hangingPunct="1"/>
+            <a:r>
+              <a:rPr lang="ru-RU" i="1" dirty="0" smtClean="0">
+                <a:solidFill>
+                  <a:srgbClr val="FFFFFF"/>
+                </a:solidFill>
+                <a:cs typeface="Arial" charset="0"/>
+              </a:rPr>
+              <a:t>Смотрите текст задания в файле </a:t>
+            </a:r>
+            <a:r>
+              <a:rPr lang="en-US" i="1" smtClean="0">
+                <a:solidFill>
+                  <a:srgbClr val="FFFFFF"/>
+                </a:solidFill>
+                <a:cs typeface="Arial" charset="0"/>
+              </a:rPr>
+              <a:t>Homework\battery.docx</a:t>
+            </a:r>
+            <a:endParaRPr lang="en-US" i="1" dirty="0">
+              <a:solidFill>
+                <a:srgbClr val="FFFFFF"/>
+              </a:solidFill>
+              <a:cs typeface="Arial" charset="0"/>
+            </a:endParaRPr>
+          </a:p>
+        </p:txBody>
+      </p:sp>
+    </p:spTree>
+    <p:extLst>
+      <p:ext uri="{BB962C8B-B14F-4D97-AF65-F5344CB8AC3E}">
+        <p14:creationId xmlns:p14="http://schemas.microsoft.com/office/powerpoint/2010/main" val="428226623"/>
+      </p:ext>
+    </p:extLst>
+  </p:cSld>
+  <p:clrMapOvr>
+    <a:masterClrMapping/>
+  </p:clrMapOvr>
+  <p:timing>
+    <p:tnLst>
+      <p:par>
+        <p:cTn id="1" dur="indefinite" restart="never" nodeType="tmRoot"/>
+      </p:par>
+    </p:tnLst>
+  </p:timing>
+</p:sld>
+</file>
+
 <file path=ppt/slides/slide2.xml><?xml version="1.0" encoding="utf-8"?>
 <p:sld xmlns:a="http://schemas.openxmlformats.org/drawingml/2006/main" xmlns:r="http://schemas.openxmlformats.org/officeDocument/2006/relationships" xmlns:p="http://schemas.openxmlformats.org/presentationml/2006/main">
   <p:cSld>

</xml_diff>

<commit_message>
Added class task for events
</commit_message>
<xml_diff>
--- a/Presentation/lesson-05-events.pptx
+++ b/Presentation/lesson-05-events.pptx
@@ -20,6 +20,7 @@
     <p:sldId id="283" r:id="rId14"/>
     <p:sldId id="286" r:id="rId15"/>
     <p:sldId id="287" r:id="rId16"/>
+    <p:sldId id="288" r:id="rId17"/>
   </p:sldIdLst>
   <p:sldSz cx="9144000" cy="6858000" type="screen4x3"/>
   <p:notesSz cx="6858000" cy="9144000"/>
@@ -302,7 +303,7 @@
           <a:p>
             <a:fld id="{FAECF776-F836-4CCD-9497-99E5597B8B5D}" type="datetimeFigureOut">
               <a:rPr lang="en-US" smtClean="0"/>
-              <a:t>11/6/2013</a:t>
+              <a:t>12/14/2013</a:t>
             </a:fld>
             <a:endParaRPr lang="en-US"/>
           </a:p>
@@ -472,7 +473,7 @@
           <a:p>
             <a:fld id="{FAECF776-F836-4CCD-9497-99E5597B8B5D}" type="datetimeFigureOut">
               <a:rPr lang="en-US" smtClean="0"/>
-              <a:t>11/6/2013</a:t>
+              <a:t>12/14/2013</a:t>
             </a:fld>
             <a:endParaRPr lang="en-US"/>
           </a:p>
@@ -652,7 +653,7 @@
           <a:p>
             <a:fld id="{FAECF776-F836-4CCD-9497-99E5597B8B5D}" type="datetimeFigureOut">
               <a:rPr lang="en-US" smtClean="0"/>
-              <a:t>11/6/2013</a:t>
+              <a:t>12/14/2013</a:t>
             </a:fld>
             <a:endParaRPr lang="en-US"/>
           </a:p>
@@ -822,7 +823,7 @@
           <a:p>
             <a:fld id="{FAECF776-F836-4CCD-9497-99E5597B8B5D}" type="datetimeFigureOut">
               <a:rPr lang="en-US" smtClean="0"/>
-              <a:t>11/6/2013</a:t>
+              <a:t>12/14/2013</a:t>
             </a:fld>
             <a:endParaRPr lang="en-US"/>
           </a:p>
@@ -1068,7 +1069,7 @@
           <a:p>
             <a:fld id="{FAECF776-F836-4CCD-9497-99E5597B8B5D}" type="datetimeFigureOut">
               <a:rPr lang="en-US" smtClean="0"/>
-              <a:t>11/6/2013</a:t>
+              <a:t>12/14/2013</a:t>
             </a:fld>
             <a:endParaRPr lang="en-US"/>
           </a:p>
@@ -1356,7 +1357,7 @@
           <a:p>
             <a:fld id="{FAECF776-F836-4CCD-9497-99E5597B8B5D}" type="datetimeFigureOut">
               <a:rPr lang="en-US" smtClean="0"/>
-              <a:t>11/6/2013</a:t>
+              <a:t>12/14/2013</a:t>
             </a:fld>
             <a:endParaRPr lang="en-US"/>
           </a:p>
@@ -1778,7 +1779,7 @@
           <a:p>
             <a:fld id="{FAECF776-F836-4CCD-9497-99E5597B8B5D}" type="datetimeFigureOut">
               <a:rPr lang="en-US" smtClean="0"/>
-              <a:t>11/6/2013</a:t>
+              <a:t>12/14/2013</a:t>
             </a:fld>
             <a:endParaRPr lang="en-US"/>
           </a:p>
@@ -1896,7 +1897,7 @@
           <a:p>
             <a:fld id="{FAECF776-F836-4CCD-9497-99E5597B8B5D}" type="datetimeFigureOut">
               <a:rPr lang="en-US" smtClean="0"/>
-              <a:t>11/6/2013</a:t>
+              <a:t>12/14/2013</a:t>
             </a:fld>
             <a:endParaRPr lang="en-US"/>
           </a:p>
@@ -1991,7 +1992,7 @@
           <a:p>
             <a:fld id="{FAECF776-F836-4CCD-9497-99E5597B8B5D}" type="datetimeFigureOut">
               <a:rPr lang="en-US" smtClean="0"/>
-              <a:t>11/6/2013</a:t>
+              <a:t>12/14/2013</a:t>
             </a:fld>
             <a:endParaRPr lang="en-US"/>
           </a:p>
@@ -2268,7 +2269,7 @@
           <a:p>
             <a:fld id="{FAECF776-F836-4CCD-9497-99E5597B8B5D}" type="datetimeFigureOut">
               <a:rPr lang="en-US" smtClean="0"/>
-              <a:t>11/6/2013</a:t>
+              <a:t>12/14/2013</a:t>
             </a:fld>
             <a:endParaRPr lang="en-US"/>
           </a:p>
@@ -2521,7 +2522,7 @@
           <a:p>
             <a:fld id="{FAECF776-F836-4CCD-9497-99E5597B8B5D}" type="datetimeFigureOut">
               <a:rPr lang="en-US" smtClean="0"/>
-              <a:t>11/6/2013</a:t>
+              <a:t>12/14/2013</a:t>
             </a:fld>
             <a:endParaRPr lang="en-US"/>
           </a:p>
@@ -2734,7 +2735,7 @@
           <a:p>
             <a:fld id="{FAECF776-F836-4CCD-9497-99E5597B8B5D}" type="datetimeFigureOut">
               <a:rPr lang="en-US" smtClean="0"/>
-              <a:t>11/6/2013</a:t>
+              <a:t>12/14/2013</a:t>
             </a:fld>
             <a:endParaRPr lang="en-US"/>
           </a:p>
@@ -9284,7 +9285,15 @@
                   <a:srgbClr val="FFFFFF"/>
                 </a:solidFill>
               </a:rPr>
-              <a:t>Домашнее задание</a:t>
+              <a:t>Самостоятельное </a:t>
+            </a:r>
+            <a:r>
+              <a:rPr lang="ru-RU" sz="2400" b="1" dirty="0" smtClean="0">
+                <a:solidFill>
+                  <a:srgbClr val="FFFFFF"/>
+                </a:solidFill>
+              </a:rPr>
+              <a:t>задание</a:t>
             </a:r>
             <a:endParaRPr lang="ru-RU" sz="2400" b="1" dirty="0">
               <a:solidFill>
@@ -9439,85 +9448,61 @@
           <a:p>
             <a:pPr eaLnBrk="1" hangingPunct="1"/>
             <a:r>
+              <a:rPr lang="ru-RU" dirty="0" smtClean="0">
+                <a:solidFill>
+                  <a:srgbClr val="FFFFFF"/>
+                </a:solidFill>
+                <a:cs typeface="Arial" charset="0"/>
+              </a:rPr>
+              <a:t>Добавление событий к классу</a:t>
+            </a:r>
+            <a:r>
+              <a:rPr lang="en-US" dirty="0" smtClean="0">
+                <a:solidFill>
+                  <a:srgbClr val="FFFFFF"/>
+                </a:solidFill>
+                <a:cs typeface="Arial" charset="0"/>
+              </a:rPr>
+              <a:t>Vehi</a:t>
+            </a:r>
+            <a:r>
+              <a:rPr lang="en-US" dirty="0" smtClean="0">
+                <a:solidFill>
+                  <a:srgbClr val="FFFFFF"/>
+                </a:solidFill>
+                <a:cs typeface="Arial" charset="0"/>
+              </a:rPr>
+              <a:t>cle.</a:t>
+            </a:r>
+          </a:p>
+          <a:p>
+            <a:pPr eaLnBrk="1" hangingPunct="1"/>
+            <a:endParaRPr lang="ru-RU" dirty="0">
+              <a:solidFill>
+                <a:srgbClr val="FFFFFF"/>
+              </a:solidFill>
+              <a:cs typeface="Arial" charset="0"/>
+            </a:endParaRPr>
+          </a:p>
+          <a:p>
+            <a:pPr eaLnBrk="1" hangingPunct="1"/>
+            <a:r>
               <a:rPr lang="ru-RU" i="1" dirty="0" smtClean="0">
                 <a:solidFill>
                   <a:srgbClr val="FFFFFF"/>
                 </a:solidFill>
                 <a:cs typeface="Arial" charset="0"/>
               </a:rPr>
-              <a:t>Создание </a:t>
-            </a:r>
-            <a:r>
-              <a:rPr lang="ru-RU" i="1" dirty="0">
+              <a:t>Смотрите текст задания в файле </a:t>
+            </a:r>
+            <a:r>
+              <a:rPr lang="en-US" i="1" dirty="0">
                 <a:solidFill>
                   <a:srgbClr val="FFFFFF"/>
                 </a:solidFill>
                 <a:cs typeface="Arial" charset="0"/>
               </a:rPr>
-              <a:t>класса </a:t>
-            </a:r>
-            <a:r>
-              <a:rPr lang="en-US" i="1" dirty="0" smtClean="0">
-                <a:solidFill>
-                  <a:srgbClr val="FFFFFF"/>
-                </a:solidFill>
-                <a:cs typeface="Arial" charset="0"/>
-              </a:rPr>
-              <a:t>“</a:t>
-            </a:r>
-            <a:r>
-              <a:rPr lang="ru-RU" i="1" dirty="0" smtClean="0">
-                <a:solidFill>
-                  <a:srgbClr val="FFFFFF"/>
-                </a:solidFill>
-                <a:cs typeface="Arial" charset="0"/>
-              </a:rPr>
-              <a:t>Аккумулятор</a:t>
-            </a:r>
-            <a:r>
-              <a:rPr lang="en-US" i="1" dirty="0" smtClean="0">
-                <a:solidFill>
-                  <a:srgbClr val="FFFFFF"/>
-                </a:solidFill>
-                <a:cs typeface="Arial" charset="0"/>
-              </a:rPr>
-              <a:t>”.</a:t>
-            </a:r>
-            <a:endParaRPr lang="ru-RU" i="1" dirty="0" smtClean="0">
-              <a:solidFill>
-                <a:srgbClr val="FFFFFF"/>
-              </a:solidFill>
-              <a:cs typeface="Arial" charset="0"/>
-            </a:endParaRPr>
-          </a:p>
-          <a:p>
-            <a:pPr eaLnBrk="1" hangingPunct="1"/>
-            <a:endParaRPr lang="ru-RU" i="1" dirty="0">
-              <a:solidFill>
-                <a:srgbClr val="FFFFFF"/>
-              </a:solidFill>
-              <a:cs typeface="Arial" charset="0"/>
-            </a:endParaRPr>
-          </a:p>
-          <a:p>
-            <a:pPr eaLnBrk="1" hangingPunct="1"/>
-            <a:r>
-              <a:rPr lang="ru-RU" i="1" dirty="0" smtClean="0">
-                <a:solidFill>
-                  <a:srgbClr val="FFFFFF"/>
-                </a:solidFill>
-                <a:cs typeface="Arial" charset="0"/>
-              </a:rPr>
-              <a:t>Смотрите текст задания в файле </a:t>
-            </a:r>
-            <a:r>
-              <a:rPr lang="en-US" i="1" smtClean="0">
-                <a:solidFill>
-                  <a:srgbClr val="FFFFFF"/>
-                </a:solidFill>
-                <a:cs typeface="Arial" charset="0"/>
-              </a:rPr>
-              <a:t>Homework\battery.docx</a:t>
+              <a:t>Homework\vehicle-events.docx</a:t>
             </a:r>
             <a:endParaRPr lang="en-US" i="1" dirty="0">
               <a:solidFill>
@@ -9532,6 +9517,348 @@
     <p:extLst>
       <p:ext uri="{BB962C8B-B14F-4D97-AF65-F5344CB8AC3E}">
         <p14:creationId xmlns:p14="http://schemas.microsoft.com/office/powerpoint/2010/main" val="428226623"/>
+      </p:ext>
+    </p:extLst>
+  </p:cSld>
+  <p:clrMapOvr>
+    <a:masterClrMapping/>
+  </p:clrMapOvr>
+  <p:timing>
+    <p:tnLst>
+      <p:par>
+        <p:cTn id="1" dur="indefinite" restart="never" nodeType="tmRoot"/>
+      </p:par>
+    </p:tnLst>
+  </p:timing>
+</p:sld>
+</file>
+
+<file path=ppt/slides/slide16.xml><?xml version="1.0" encoding="utf-8"?>
+<p:sld xmlns:a="http://schemas.openxmlformats.org/drawingml/2006/main" xmlns:r="http://schemas.openxmlformats.org/officeDocument/2006/relationships" xmlns:p="http://schemas.openxmlformats.org/presentationml/2006/main">
+  <p:cSld>
+    <p:bg>
+      <p:bgPr>
+        <a:solidFill>
+          <a:srgbClr val="6600CC"/>
+        </a:solidFill>
+        <a:effectLst/>
+      </p:bgPr>
+    </p:bg>
+    <p:spTree>
+      <p:nvGrpSpPr>
+        <p:cNvPr id="1" name=""/>
+        <p:cNvGrpSpPr/>
+        <p:nvPr/>
+      </p:nvGrpSpPr>
+      <p:grpSpPr>
+        <a:xfrm>
+          <a:off x="0" y="0"/>
+          <a:ext cx="0" cy="0"/>
+          <a:chOff x="0" y="0"/>
+          <a:chExt cx="0" cy="0"/>
+        </a:xfrm>
+      </p:grpSpPr>
+      <p:sp>
+        <p:nvSpPr>
+          <p:cNvPr id="12290" name="Прямоугольник 2"/>
+          <p:cNvSpPr>
+            <a:spLocks noChangeArrowheads="1"/>
+          </p:cNvSpPr>
+          <p:nvPr/>
+        </p:nvSpPr>
+        <p:spPr bwMode="auto">
+          <a:xfrm>
+            <a:off x="2133600" y="0"/>
+            <a:ext cx="5105400" cy="461963"/>
+          </a:xfrm>
+          <a:prstGeom prst="rect">
+            <a:avLst/>
+          </a:prstGeom>
+          <a:noFill/>
+          <a:ln>
+            <a:noFill/>
+          </a:ln>
+          <a:extLst>
+            <a:ext uri="{909E8E84-426E-40DD-AFC4-6F175D3DCCD1}">
+              <a14:hiddenFill xmlns:a14="http://schemas.microsoft.com/office/drawing/2010/main">
+                <a:solidFill>
+                  <a:srgbClr val="FFFFFF"/>
+                </a:solidFill>
+              </a14:hiddenFill>
+            </a:ext>
+            <a:ext uri="{91240B29-F687-4F45-9708-019B960494DF}">
+              <a14:hiddenLine xmlns:a14="http://schemas.microsoft.com/office/drawing/2010/main" w="9525">
+                <a:solidFill>
+                  <a:srgbClr val="000000"/>
+                </a:solidFill>
+                <a:miter lim="800000"/>
+                <a:headEnd/>
+                <a:tailEnd/>
+              </a14:hiddenLine>
+            </a:ext>
+          </a:extLst>
+        </p:spPr>
+        <p:txBody>
+          <a:bodyPr>
+            <a:spAutoFit/>
+          </a:bodyPr>
+          <a:lstStyle/>
+          <a:p>
+            <a:pPr algn="ctr"/>
+            <a:r>
+              <a:rPr lang="ru-RU" sz="2400" b="1" dirty="0" smtClean="0">
+                <a:solidFill>
+                  <a:srgbClr val="FFFFFF"/>
+                </a:solidFill>
+              </a:rPr>
+              <a:t>Домашнее задание</a:t>
+            </a:r>
+            <a:endParaRPr lang="ru-RU" sz="2400" b="1" dirty="0">
+              <a:solidFill>
+                <a:srgbClr val="FFFFFF"/>
+              </a:solidFill>
+            </a:endParaRPr>
+          </a:p>
+        </p:txBody>
+      </p:sp>
+      <p:sp>
+        <p:nvSpPr>
+          <p:cNvPr id="8" name="TextBox 6"/>
+          <p:cNvSpPr txBox="1">
+            <a:spLocks noChangeArrowheads="1"/>
+          </p:cNvSpPr>
+          <p:nvPr/>
+        </p:nvSpPr>
+        <p:spPr bwMode="auto">
+          <a:xfrm>
+            <a:off x="152400" y="620688"/>
+            <a:ext cx="8839200" cy="923330"/>
+          </a:xfrm>
+          <a:prstGeom prst="rect">
+            <a:avLst/>
+          </a:prstGeom>
+          <a:noFill/>
+          <a:ln>
+            <a:noFill/>
+          </a:ln>
+          <a:extLst>
+            <a:ext uri="{909E8E84-426E-40DD-AFC4-6F175D3DCCD1}">
+              <a14:hiddenFill xmlns:a14="http://schemas.microsoft.com/office/drawing/2010/main">
+                <a:solidFill>
+                  <a:srgbClr val="FFFFFF"/>
+                </a:solidFill>
+              </a14:hiddenFill>
+            </a:ext>
+            <a:ext uri="{91240B29-F687-4F45-9708-019B960494DF}">
+              <a14:hiddenLine xmlns:a14="http://schemas.microsoft.com/office/drawing/2010/main" w="9525">
+                <a:solidFill>
+                  <a:srgbClr val="000000"/>
+                </a:solidFill>
+                <a:miter lim="800000"/>
+                <a:headEnd/>
+                <a:tailEnd/>
+              </a14:hiddenLine>
+            </a:ext>
+          </a:extLst>
+        </p:spPr>
+        <p:txBody>
+          <a:bodyPr>
+            <a:spAutoFit/>
+          </a:bodyPr>
+          <a:lstStyle>
+            <a:lvl1pPr defTabSz="358775" eaLnBrk="0" hangingPunct="0">
+              <a:defRPr>
+                <a:solidFill>
+                  <a:schemeClr val="tx1"/>
+                </a:solidFill>
+                <a:latin typeface="Arial" charset="0"/>
+              </a:defRPr>
+            </a:lvl1pPr>
+            <a:lvl2pPr marL="742950" indent="-285750" defTabSz="358775" eaLnBrk="0" hangingPunct="0">
+              <a:defRPr>
+                <a:solidFill>
+                  <a:schemeClr val="tx1"/>
+                </a:solidFill>
+                <a:latin typeface="Arial" charset="0"/>
+              </a:defRPr>
+            </a:lvl2pPr>
+            <a:lvl3pPr marL="1143000" indent="-228600" defTabSz="358775" eaLnBrk="0" hangingPunct="0">
+              <a:defRPr>
+                <a:solidFill>
+                  <a:schemeClr val="tx1"/>
+                </a:solidFill>
+                <a:latin typeface="Arial" charset="0"/>
+              </a:defRPr>
+            </a:lvl3pPr>
+            <a:lvl4pPr marL="1600200" indent="-228600" defTabSz="358775" eaLnBrk="0" hangingPunct="0">
+              <a:defRPr>
+                <a:solidFill>
+                  <a:schemeClr val="tx1"/>
+                </a:solidFill>
+                <a:latin typeface="Arial" charset="0"/>
+              </a:defRPr>
+            </a:lvl4pPr>
+            <a:lvl5pPr marL="2057400" indent="-228600" defTabSz="358775" eaLnBrk="0" hangingPunct="0">
+              <a:defRPr>
+                <a:solidFill>
+                  <a:schemeClr val="tx1"/>
+                </a:solidFill>
+                <a:latin typeface="Arial" charset="0"/>
+              </a:defRPr>
+            </a:lvl5pPr>
+            <a:lvl6pPr marL="2514600" indent="-228600" defTabSz="358775" eaLnBrk="0" fontAlgn="base" hangingPunct="0">
+              <a:spcBef>
+                <a:spcPct val="0"/>
+              </a:spcBef>
+              <a:spcAft>
+                <a:spcPct val="0"/>
+              </a:spcAft>
+              <a:defRPr>
+                <a:solidFill>
+                  <a:schemeClr val="tx1"/>
+                </a:solidFill>
+                <a:latin typeface="Arial" charset="0"/>
+              </a:defRPr>
+            </a:lvl6pPr>
+            <a:lvl7pPr marL="2971800" indent="-228600" defTabSz="358775" eaLnBrk="0" fontAlgn="base" hangingPunct="0">
+              <a:spcBef>
+                <a:spcPct val="0"/>
+              </a:spcBef>
+              <a:spcAft>
+                <a:spcPct val="0"/>
+              </a:spcAft>
+              <a:defRPr>
+                <a:solidFill>
+                  <a:schemeClr val="tx1"/>
+                </a:solidFill>
+                <a:latin typeface="Arial" charset="0"/>
+              </a:defRPr>
+            </a:lvl7pPr>
+            <a:lvl8pPr marL="3429000" indent="-228600" defTabSz="358775" eaLnBrk="0" fontAlgn="base" hangingPunct="0">
+              <a:spcBef>
+                <a:spcPct val="0"/>
+              </a:spcBef>
+              <a:spcAft>
+                <a:spcPct val="0"/>
+              </a:spcAft>
+              <a:defRPr>
+                <a:solidFill>
+                  <a:schemeClr val="tx1"/>
+                </a:solidFill>
+                <a:latin typeface="Arial" charset="0"/>
+              </a:defRPr>
+            </a:lvl8pPr>
+            <a:lvl9pPr marL="3886200" indent="-228600" defTabSz="358775" eaLnBrk="0" fontAlgn="base" hangingPunct="0">
+              <a:spcBef>
+                <a:spcPct val="0"/>
+              </a:spcBef>
+              <a:spcAft>
+                <a:spcPct val="0"/>
+              </a:spcAft>
+              <a:defRPr>
+                <a:solidFill>
+                  <a:schemeClr val="tx1"/>
+                </a:solidFill>
+                <a:latin typeface="Arial" charset="0"/>
+              </a:defRPr>
+            </a:lvl9pPr>
+          </a:lstStyle>
+          <a:p>
+            <a:pPr eaLnBrk="1" hangingPunct="1"/>
+            <a:r>
+              <a:rPr lang="ru-RU" i="1" dirty="0" smtClean="0">
+                <a:solidFill>
+                  <a:srgbClr val="FFFFFF"/>
+                </a:solidFill>
+                <a:cs typeface="Arial" charset="0"/>
+              </a:rPr>
+              <a:t>Создание </a:t>
+            </a:r>
+            <a:r>
+              <a:rPr lang="ru-RU" i="1" dirty="0">
+                <a:solidFill>
+                  <a:srgbClr val="FFFFFF"/>
+                </a:solidFill>
+                <a:cs typeface="Arial" charset="0"/>
+              </a:rPr>
+              <a:t>класса </a:t>
+            </a:r>
+            <a:r>
+              <a:rPr lang="en-US" i="1" dirty="0" smtClean="0">
+                <a:solidFill>
+                  <a:srgbClr val="FFFFFF"/>
+                </a:solidFill>
+                <a:cs typeface="Arial" charset="0"/>
+              </a:rPr>
+              <a:t>“</a:t>
+            </a:r>
+            <a:r>
+              <a:rPr lang="ru-RU" i="1" dirty="0" smtClean="0">
+                <a:solidFill>
+                  <a:srgbClr val="FFFFFF"/>
+                </a:solidFill>
+                <a:cs typeface="Arial" charset="0"/>
+              </a:rPr>
+              <a:t>Аккумулятор</a:t>
+            </a:r>
+            <a:r>
+              <a:rPr lang="en-US" i="1" dirty="0" smtClean="0">
+                <a:solidFill>
+                  <a:srgbClr val="FFFFFF"/>
+                </a:solidFill>
+                <a:cs typeface="Arial" charset="0"/>
+              </a:rPr>
+              <a:t>”.</a:t>
+            </a:r>
+            <a:endParaRPr lang="ru-RU" i="1" dirty="0" smtClean="0">
+              <a:solidFill>
+                <a:srgbClr val="FFFFFF"/>
+              </a:solidFill>
+              <a:cs typeface="Arial" charset="0"/>
+            </a:endParaRPr>
+          </a:p>
+          <a:p>
+            <a:pPr eaLnBrk="1" hangingPunct="1"/>
+            <a:endParaRPr lang="ru-RU" i="1" dirty="0">
+              <a:solidFill>
+                <a:srgbClr val="FFFFFF"/>
+              </a:solidFill>
+              <a:cs typeface="Arial" charset="0"/>
+            </a:endParaRPr>
+          </a:p>
+          <a:p>
+            <a:pPr eaLnBrk="1" hangingPunct="1"/>
+            <a:r>
+              <a:rPr lang="ru-RU" i="1" dirty="0" smtClean="0">
+                <a:solidFill>
+                  <a:srgbClr val="FFFFFF"/>
+                </a:solidFill>
+                <a:cs typeface="Arial" charset="0"/>
+              </a:rPr>
+              <a:t>Смотрите текст задания в файле </a:t>
+            </a:r>
+            <a:r>
+              <a:rPr lang="en-US" i="1" smtClean="0">
+                <a:solidFill>
+                  <a:srgbClr val="FFFFFF"/>
+                </a:solidFill>
+                <a:cs typeface="Arial" charset="0"/>
+              </a:rPr>
+              <a:t>Homework\battery.docx</a:t>
+            </a:r>
+            <a:endParaRPr lang="en-US" i="1" dirty="0">
+              <a:solidFill>
+                <a:srgbClr val="FFFFFF"/>
+              </a:solidFill>
+              <a:cs typeface="Arial" charset="0"/>
+            </a:endParaRPr>
+          </a:p>
+        </p:txBody>
+      </p:sp>
+    </p:spTree>
+    <p:extLst>
+      <p:ext uri="{BB962C8B-B14F-4D97-AF65-F5344CB8AC3E}">
+        <p14:creationId xmlns:p14="http://schemas.microsoft.com/office/powerpoint/2010/main" val="758884923"/>
       </p:ext>
     </p:extLst>
   </p:cSld>

</xml_diff>

<commit_message>
Info on Action and Func delegates
</commit_message>
<xml_diff>
--- a/Presentation/lesson-05-events.pptx
+++ b/Presentation/lesson-05-events.pptx
@@ -17,10 +17,11 @@
     <p:sldId id="280" r:id="rId11"/>
     <p:sldId id="281" r:id="rId12"/>
     <p:sldId id="282" r:id="rId13"/>
-    <p:sldId id="283" r:id="rId14"/>
-    <p:sldId id="286" r:id="rId15"/>
-    <p:sldId id="287" r:id="rId16"/>
-    <p:sldId id="288" r:id="rId17"/>
+    <p:sldId id="289" r:id="rId14"/>
+    <p:sldId id="283" r:id="rId15"/>
+    <p:sldId id="286" r:id="rId16"/>
+    <p:sldId id="287" r:id="rId17"/>
+    <p:sldId id="288" r:id="rId18"/>
   </p:sldIdLst>
   <p:sldSz cx="9144000" cy="6858000" type="screen4x3"/>
   <p:notesSz cx="6858000" cy="9144000"/>
@@ -303,7 +304,7 @@
           <a:p>
             <a:fld id="{FAECF776-F836-4CCD-9497-99E5597B8B5D}" type="datetimeFigureOut">
               <a:rPr lang="en-US" smtClean="0"/>
-              <a:t>12/14/2013</a:t>
+              <a:t>6/4/2014</a:t>
             </a:fld>
             <a:endParaRPr lang="en-US"/>
           </a:p>
@@ -473,7 +474,7 @@
           <a:p>
             <a:fld id="{FAECF776-F836-4CCD-9497-99E5597B8B5D}" type="datetimeFigureOut">
               <a:rPr lang="en-US" smtClean="0"/>
-              <a:t>12/14/2013</a:t>
+              <a:t>6/4/2014</a:t>
             </a:fld>
             <a:endParaRPr lang="en-US"/>
           </a:p>
@@ -653,7 +654,7 @@
           <a:p>
             <a:fld id="{FAECF776-F836-4CCD-9497-99E5597B8B5D}" type="datetimeFigureOut">
               <a:rPr lang="en-US" smtClean="0"/>
-              <a:t>12/14/2013</a:t>
+              <a:t>6/4/2014</a:t>
             </a:fld>
             <a:endParaRPr lang="en-US"/>
           </a:p>
@@ -823,7 +824,7 @@
           <a:p>
             <a:fld id="{FAECF776-F836-4CCD-9497-99E5597B8B5D}" type="datetimeFigureOut">
               <a:rPr lang="en-US" smtClean="0"/>
-              <a:t>12/14/2013</a:t>
+              <a:t>6/4/2014</a:t>
             </a:fld>
             <a:endParaRPr lang="en-US"/>
           </a:p>
@@ -1069,7 +1070,7 @@
           <a:p>
             <a:fld id="{FAECF776-F836-4CCD-9497-99E5597B8B5D}" type="datetimeFigureOut">
               <a:rPr lang="en-US" smtClean="0"/>
-              <a:t>12/14/2013</a:t>
+              <a:t>6/4/2014</a:t>
             </a:fld>
             <a:endParaRPr lang="en-US"/>
           </a:p>
@@ -1357,7 +1358,7 @@
           <a:p>
             <a:fld id="{FAECF776-F836-4CCD-9497-99E5597B8B5D}" type="datetimeFigureOut">
               <a:rPr lang="en-US" smtClean="0"/>
-              <a:t>12/14/2013</a:t>
+              <a:t>6/4/2014</a:t>
             </a:fld>
             <a:endParaRPr lang="en-US"/>
           </a:p>
@@ -1779,7 +1780,7 @@
           <a:p>
             <a:fld id="{FAECF776-F836-4CCD-9497-99E5597B8B5D}" type="datetimeFigureOut">
               <a:rPr lang="en-US" smtClean="0"/>
-              <a:t>12/14/2013</a:t>
+              <a:t>6/4/2014</a:t>
             </a:fld>
             <a:endParaRPr lang="en-US"/>
           </a:p>
@@ -1897,7 +1898,7 @@
           <a:p>
             <a:fld id="{FAECF776-F836-4CCD-9497-99E5597B8B5D}" type="datetimeFigureOut">
               <a:rPr lang="en-US" smtClean="0"/>
-              <a:t>12/14/2013</a:t>
+              <a:t>6/4/2014</a:t>
             </a:fld>
             <a:endParaRPr lang="en-US"/>
           </a:p>
@@ -1992,7 +1993,7 @@
           <a:p>
             <a:fld id="{FAECF776-F836-4CCD-9497-99E5597B8B5D}" type="datetimeFigureOut">
               <a:rPr lang="en-US" smtClean="0"/>
-              <a:t>12/14/2013</a:t>
+              <a:t>6/4/2014</a:t>
             </a:fld>
             <a:endParaRPr lang="en-US"/>
           </a:p>
@@ -2269,7 +2270,7 @@
           <a:p>
             <a:fld id="{FAECF776-F836-4CCD-9497-99E5597B8B5D}" type="datetimeFigureOut">
               <a:rPr lang="en-US" smtClean="0"/>
-              <a:t>12/14/2013</a:t>
+              <a:t>6/4/2014</a:t>
             </a:fld>
             <a:endParaRPr lang="en-US"/>
           </a:p>
@@ -2522,7 +2523,7 @@
           <a:p>
             <a:fld id="{FAECF776-F836-4CCD-9497-99E5597B8B5D}" type="datetimeFigureOut">
               <a:rPr lang="en-US" smtClean="0"/>
-              <a:t>12/14/2013</a:t>
+              <a:t>6/4/2014</a:t>
             </a:fld>
             <a:endParaRPr lang="en-US"/>
           </a:p>
@@ -2735,7 +2736,7 @@
           <a:p>
             <a:fld id="{FAECF776-F836-4CCD-9497-99E5597B8B5D}" type="datetimeFigureOut">
               <a:rPr lang="en-US" smtClean="0"/>
-              <a:t>12/14/2013</a:t>
+              <a:t>6/4/2014</a:t>
             </a:fld>
             <a:endParaRPr lang="en-US"/>
           </a:p>
@@ -5493,6 +5494,886 @@
         <p:spPr bwMode="auto">
           <a:xfrm>
             <a:off x="228600" y="0"/>
+            <a:ext cx="8686800" cy="461665"/>
+          </a:xfrm>
+          <a:prstGeom prst="rect">
+            <a:avLst/>
+          </a:prstGeom>
+          <a:noFill/>
+          <a:ln>
+            <a:noFill/>
+          </a:ln>
+          <a:extLst>
+            <a:ext uri="{909E8E84-426E-40DD-AFC4-6F175D3DCCD1}">
+              <a14:hiddenFill xmlns:a14="http://schemas.microsoft.com/office/drawing/2010/main">
+                <a:solidFill>
+                  <a:srgbClr val="FFFFFF"/>
+                </a:solidFill>
+              </a14:hiddenFill>
+            </a:ext>
+            <a:ext uri="{91240B29-F687-4F45-9708-019B960494DF}">
+              <a14:hiddenLine xmlns:a14="http://schemas.microsoft.com/office/drawing/2010/main" w="9525">
+                <a:solidFill>
+                  <a:srgbClr val="000000"/>
+                </a:solidFill>
+                <a:miter lim="800000"/>
+                <a:headEnd/>
+                <a:tailEnd/>
+              </a14:hiddenLine>
+            </a:ext>
+          </a:extLst>
+        </p:spPr>
+        <p:txBody>
+          <a:bodyPr wrap="square">
+            <a:spAutoFit/>
+          </a:bodyPr>
+          <a:lstStyle/>
+          <a:p>
+            <a:pPr algn="ctr"/>
+            <a:r>
+              <a:rPr lang="ru-RU" sz="2400" b="1" dirty="0" smtClean="0"/>
+              <a:t>Делегаты </a:t>
+            </a:r>
+            <a:r>
+              <a:rPr lang="en-US" sz="2400" b="1" dirty="0" err="1" smtClean="0"/>
+              <a:t>System.Action</a:t>
+            </a:r>
+            <a:r>
+              <a:rPr lang="en-US" sz="2400" b="1" dirty="0" smtClean="0"/>
+              <a:t> </a:t>
+            </a:r>
+            <a:r>
+              <a:rPr lang="ru-RU" sz="2400" b="1" dirty="0" smtClean="0"/>
+              <a:t>и </a:t>
+            </a:r>
+            <a:r>
+              <a:rPr lang="en-US" sz="2400" b="1" dirty="0" err="1" smtClean="0"/>
+              <a:t>System.Func</a:t>
+            </a:r>
+            <a:endParaRPr lang="ru-RU" sz="2400" b="1" dirty="0"/>
+          </a:p>
+        </p:txBody>
+      </p:sp>
+      <p:sp>
+        <p:nvSpPr>
+          <p:cNvPr id="12291" name="TextBox 6"/>
+          <p:cNvSpPr txBox="1">
+            <a:spLocks noChangeArrowheads="1"/>
+          </p:cNvSpPr>
+          <p:nvPr/>
+        </p:nvSpPr>
+        <p:spPr bwMode="auto">
+          <a:xfrm>
+            <a:off x="152400" y="1002828"/>
+            <a:ext cx="8839200" cy="5016758"/>
+          </a:xfrm>
+          <a:prstGeom prst="rect">
+            <a:avLst/>
+          </a:prstGeom>
+          <a:noFill/>
+          <a:ln>
+            <a:noFill/>
+          </a:ln>
+          <a:extLst>
+            <a:ext uri="{909E8E84-426E-40DD-AFC4-6F175D3DCCD1}">
+              <a14:hiddenFill xmlns:a14="http://schemas.microsoft.com/office/drawing/2010/main">
+                <a:solidFill>
+                  <a:srgbClr val="FFFFFF"/>
+                </a:solidFill>
+              </a14:hiddenFill>
+            </a:ext>
+            <a:ext uri="{91240B29-F687-4F45-9708-019B960494DF}">
+              <a14:hiddenLine xmlns:a14="http://schemas.microsoft.com/office/drawing/2010/main" w="9525">
+                <a:solidFill>
+                  <a:srgbClr val="000000"/>
+                </a:solidFill>
+                <a:miter lim="800000"/>
+                <a:headEnd/>
+                <a:tailEnd/>
+              </a14:hiddenLine>
+            </a:ext>
+          </a:extLst>
+        </p:spPr>
+        <p:txBody>
+          <a:bodyPr>
+            <a:spAutoFit/>
+          </a:bodyPr>
+          <a:lstStyle>
+            <a:lvl1pPr defTabSz="358775" eaLnBrk="0" hangingPunct="0">
+              <a:defRPr>
+                <a:solidFill>
+                  <a:schemeClr val="tx1"/>
+                </a:solidFill>
+                <a:latin typeface="Arial" charset="0"/>
+              </a:defRPr>
+            </a:lvl1pPr>
+            <a:lvl2pPr marL="742950" indent="-285750" defTabSz="358775" eaLnBrk="0" hangingPunct="0">
+              <a:defRPr>
+                <a:solidFill>
+                  <a:schemeClr val="tx1"/>
+                </a:solidFill>
+                <a:latin typeface="Arial" charset="0"/>
+              </a:defRPr>
+            </a:lvl2pPr>
+            <a:lvl3pPr marL="1143000" indent="-228600" defTabSz="358775" eaLnBrk="0" hangingPunct="0">
+              <a:defRPr>
+                <a:solidFill>
+                  <a:schemeClr val="tx1"/>
+                </a:solidFill>
+                <a:latin typeface="Arial" charset="0"/>
+              </a:defRPr>
+            </a:lvl3pPr>
+            <a:lvl4pPr marL="1600200" indent="-228600" defTabSz="358775" eaLnBrk="0" hangingPunct="0">
+              <a:defRPr>
+                <a:solidFill>
+                  <a:schemeClr val="tx1"/>
+                </a:solidFill>
+                <a:latin typeface="Arial" charset="0"/>
+              </a:defRPr>
+            </a:lvl4pPr>
+            <a:lvl5pPr marL="2057400" indent="-228600" defTabSz="358775" eaLnBrk="0" hangingPunct="0">
+              <a:defRPr>
+                <a:solidFill>
+                  <a:schemeClr val="tx1"/>
+                </a:solidFill>
+                <a:latin typeface="Arial" charset="0"/>
+              </a:defRPr>
+            </a:lvl5pPr>
+            <a:lvl6pPr marL="2514600" indent="-228600" defTabSz="358775" eaLnBrk="0" fontAlgn="base" hangingPunct="0">
+              <a:spcBef>
+                <a:spcPct val="0"/>
+              </a:spcBef>
+              <a:spcAft>
+                <a:spcPct val="0"/>
+              </a:spcAft>
+              <a:defRPr>
+                <a:solidFill>
+                  <a:schemeClr val="tx1"/>
+                </a:solidFill>
+                <a:latin typeface="Arial" charset="0"/>
+              </a:defRPr>
+            </a:lvl6pPr>
+            <a:lvl7pPr marL="2971800" indent="-228600" defTabSz="358775" eaLnBrk="0" fontAlgn="base" hangingPunct="0">
+              <a:spcBef>
+                <a:spcPct val="0"/>
+              </a:spcBef>
+              <a:spcAft>
+                <a:spcPct val="0"/>
+              </a:spcAft>
+              <a:defRPr>
+                <a:solidFill>
+                  <a:schemeClr val="tx1"/>
+                </a:solidFill>
+                <a:latin typeface="Arial" charset="0"/>
+              </a:defRPr>
+            </a:lvl7pPr>
+            <a:lvl8pPr marL="3429000" indent="-228600" defTabSz="358775" eaLnBrk="0" fontAlgn="base" hangingPunct="0">
+              <a:spcBef>
+                <a:spcPct val="0"/>
+              </a:spcBef>
+              <a:spcAft>
+                <a:spcPct val="0"/>
+              </a:spcAft>
+              <a:defRPr>
+                <a:solidFill>
+                  <a:schemeClr val="tx1"/>
+                </a:solidFill>
+                <a:latin typeface="Arial" charset="0"/>
+              </a:defRPr>
+            </a:lvl8pPr>
+            <a:lvl9pPr marL="3886200" indent="-228600" defTabSz="358775" eaLnBrk="0" fontAlgn="base" hangingPunct="0">
+              <a:spcBef>
+                <a:spcPct val="0"/>
+              </a:spcBef>
+              <a:spcAft>
+                <a:spcPct val="0"/>
+              </a:spcAft>
+              <a:defRPr>
+                <a:solidFill>
+                  <a:schemeClr val="tx1"/>
+                </a:solidFill>
+                <a:latin typeface="Arial" charset="0"/>
+              </a:defRPr>
+            </a:lvl9pPr>
+          </a:lstStyle>
+          <a:p>
+            <a:pPr marL="285750" indent="-285750" eaLnBrk="1" hangingPunct="1">
+              <a:buFont typeface="Arial" panose="020B0604020202020204" pitchFamily="34" charset="0"/>
+              <a:buChar char="•"/>
+            </a:pPr>
+            <a:r>
+              <a:rPr lang="ru-RU" sz="1600" dirty="0" smtClean="0">
+                <a:solidFill>
+                  <a:schemeClr val="bg1"/>
+                </a:solidFill>
+              </a:rPr>
+              <a:t>Делегат</a:t>
+            </a:r>
+            <a:r>
+              <a:rPr lang="ru-RU" sz="1600" dirty="0">
+                <a:solidFill>
+                  <a:schemeClr val="bg1"/>
+                </a:solidFill>
+              </a:rPr>
+              <a:t>ы</a:t>
+            </a:r>
+            <a:r>
+              <a:rPr lang="ru-RU" sz="1600" dirty="0" smtClean="0">
+                <a:solidFill>
+                  <a:schemeClr val="bg1"/>
+                </a:solidFill>
+              </a:rPr>
+              <a:t> </a:t>
+            </a:r>
+            <a:r>
+              <a:rPr lang="en-US" sz="1600" dirty="0" err="1" smtClean="0">
+                <a:solidFill>
+                  <a:schemeClr val="bg1"/>
+                </a:solidFill>
+              </a:rPr>
+              <a:t>System.Action</a:t>
+            </a:r>
+            <a:r>
+              <a:rPr lang="en-US" sz="1600" dirty="0" smtClean="0">
+                <a:solidFill>
+                  <a:schemeClr val="bg1"/>
+                </a:solidFill>
+              </a:rPr>
+              <a:t> </a:t>
+            </a:r>
+            <a:r>
+              <a:rPr lang="ru-RU" sz="1600" dirty="0" smtClean="0">
+                <a:solidFill>
+                  <a:schemeClr val="bg1"/>
+                </a:solidFill>
+              </a:rPr>
+              <a:t>описывают </a:t>
+            </a:r>
+            <a:r>
+              <a:rPr lang="ru-RU" sz="1600" dirty="0" smtClean="0">
+                <a:solidFill>
+                  <a:schemeClr val="bg1"/>
+                </a:solidFill>
+              </a:rPr>
+              <a:t>функцию без возвращаемого </a:t>
+            </a:r>
+            <a:r>
+              <a:rPr lang="ru-RU" sz="1600" dirty="0" smtClean="0">
+                <a:solidFill>
+                  <a:schemeClr val="bg1"/>
+                </a:solidFill>
+              </a:rPr>
+              <a:t>значения </a:t>
+            </a:r>
+            <a:r>
+              <a:rPr lang="ru-RU" sz="1600" dirty="0" smtClean="0">
+                <a:solidFill>
+                  <a:schemeClr val="bg1"/>
+                </a:solidFill>
+              </a:rPr>
+              <a:t>с количеством аргументов от 0 до 16.</a:t>
+            </a:r>
+          </a:p>
+          <a:p>
+            <a:pPr marL="1028700" lvl="1" eaLnBrk="1" hangingPunct="1">
+              <a:buFont typeface="Arial" panose="020B0604020202020204" pitchFamily="34" charset="0"/>
+              <a:buChar char="•"/>
+            </a:pPr>
+            <a:r>
+              <a:rPr lang="en-US" sz="1600" dirty="0" smtClean="0">
+                <a:solidFill>
+                  <a:schemeClr val="bg1"/>
+                </a:solidFill>
+              </a:rPr>
+              <a:t>Action</a:t>
+            </a:r>
+          </a:p>
+          <a:p>
+            <a:pPr marL="1028700" lvl="1" eaLnBrk="1" hangingPunct="1">
+              <a:buFont typeface="Arial" panose="020B0604020202020204" pitchFamily="34" charset="0"/>
+              <a:buChar char="•"/>
+            </a:pPr>
+            <a:r>
+              <a:rPr lang="en-US" sz="1600" dirty="0" smtClean="0">
+                <a:solidFill>
+                  <a:schemeClr val="bg1"/>
+                </a:solidFill>
+              </a:rPr>
+              <a:t>Action&lt;T&gt;</a:t>
+            </a:r>
+          </a:p>
+          <a:p>
+            <a:pPr marL="1028700" lvl="1" eaLnBrk="1" hangingPunct="1">
+              <a:buFont typeface="Arial" panose="020B0604020202020204" pitchFamily="34" charset="0"/>
+              <a:buChar char="•"/>
+            </a:pPr>
+            <a:r>
+              <a:rPr lang="en-US" sz="1600" dirty="0" smtClean="0">
+                <a:solidFill>
+                  <a:schemeClr val="bg1"/>
+                </a:solidFill>
+              </a:rPr>
+              <a:t>Action&lt;T1, T2&gt;</a:t>
+            </a:r>
+          </a:p>
+          <a:p>
+            <a:pPr marL="1028700" lvl="1" eaLnBrk="1" hangingPunct="1">
+              <a:buFont typeface="Arial" panose="020B0604020202020204" pitchFamily="34" charset="0"/>
+              <a:buChar char="•"/>
+            </a:pPr>
+            <a:r>
+              <a:rPr lang="en-US" sz="1600" dirty="0">
+                <a:solidFill>
+                  <a:schemeClr val="bg1"/>
+                </a:solidFill>
+              </a:rPr>
+              <a:t>Action&lt;T1, </a:t>
+            </a:r>
+            <a:r>
+              <a:rPr lang="en-US" sz="1600" dirty="0" smtClean="0">
+                <a:solidFill>
+                  <a:schemeClr val="bg1"/>
+                </a:solidFill>
+              </a:rPr>
+              <a:t>T2, T3&gt;</a:t>
+            </a:r>
+          </a:p>
+          <a:p>
+            <a:pPr marL="1028700" lvl="1" eaLnBrk="1" hangingPunct="1">
+              <a:buFont typeface="Arial" panose="020B0604020202020204" pitchFamily="34" charset="0"/>
+              <a:buChar char="•"/>
+            </a:pPr>
+            <a:r>
+              <a:rPr lang="en-US" sz="1600" dirty="0" smtClean="0">
+                <a:solidFill>
+                  <a:schemeClr val="bg1"/>
+                </a:solidFill>
+              </a:rPr>
+              <a:t>…</a:t>
+            </a:r>
+          </a:p>
+          <a:p>
+            <a:pPr marL="1028700" lvl="1" eaLnBrk="1" hangingPunct="1">
+              <a:buFont typeface="Arial" panose="020B0604020202020204" pitchFamily="34" charset="0"/>
+              <a:buChar char="•"/>
+            </a:pPr>
+            <a:r>
+              <a:rPr lang="en-US" sz="1600" dirty="0">
+                <a:solidFill>
+                  <a:schemeClr val="bg1"/>
+                </a:solidFill>
+              </a:rPr>
+              <a:t>Action&lt;T1, T2, </a:t>
+            </a:r>
+            <a:r>
+              <a:rPr lang="en-US" sz="1600" dirty="0" smtClean="0">
+                <a:solidFill>
+                  <a:schemeClr val="bg1"/>
+                </a:solidFill>
+              </a:rPr>
+              <a:t>T3, T4, T5, T6, T7, T8, T9, T10, T11, T12, T13, T14, T15, T16&gt;</a:t>
+            </a:r>
+          </a:p>
+          <a:p>
+            <a:pPr marL="285750" indent="-285750" eaLnBrk="1" hangingPunct="1">
+              <a:buFont typeface="Arial" panose="020B0604020202020204" pitchFamily="34" charset="0"/>
+              <a:buChar char="•"/>
+            </a:pPr>
+            <a:r>
+              <a:rPr lang="ru-RU" sz="1600" dirty="0" smtClean="0">
+                <a:solidFill>
+                  <a:schemeClr val="bg1"/>
+                </a:solidFill>
+              </a:rPr>
+              <a:t>Делегаты </a:t>
+            </a:r>
+            <a:r>
+              <a:rPr lang="en-US" sz="1600" dirty="0" err="1" smtClean="0">
+                <a:solidFill>
+                  <a:schemeClr val="bg1"/>
+                </a:solidFill>
+              </a:rPr>
+              <a:t>System.Func</a:t>
+            </a:r>
+            <a:r>
+              <a:rPr lang="en-US" sz="1600" dirty="0" smtClean="0">
+                <a:solidFill>
+                  <a:schemeClr val="bg1"/>
+                </a:solidFill>
+              </a:rPr>
+              <a:t> </a:t>
+            </a:r>
+            <a:r>
+              <a:rPr lang="ru-RU" sz="1600" dirty="0" smtClean="0">
+                <a:solidFill>
+                  <a:schemeClr val="bg1"/>
+                </a:solidFill>
+              </a:rPr>
+              <a:t>описывают </a:t>
+            </a:r>
+            <a:r>
+              <a:rPr lang="ru-RU" sz="1600" dirty="0">
+                <a:solidFill>
+                  <a:schemeClr val="bg1"/>
+                </a:solidFill>
+              </a:rPr>
+              <a:t>функцию </a:t>
+            </a:r>
+            <a:r>
+              <a:rPr lang="ru-RU" sz="1600" dirty="0" smtClean="0">
+                <a:solidFill>
+                  <a:schemeClr val="bg1"/>
+                </a:solidFill>
+              </a:rPr>
+              <a:t>с возвращаемым значением с количеством </a:t>
+            </a:r>
+            <a:r>
+              <a:rPr lang="ru-RU" sz="1600" dirty="0">
+                <a:solidFill>
+                  <a:schemeClr val="bg1"/>
+                </a:solidFill>
+              </a:rPr>
+              <a:t>аргументов от 0 до </a:t>
+            </a:r>
+            <a:r>
+              <a:rPr lang="ru-RU" sz="1600" dirty="0" smtClean="0">
+                <a:solidFill>
+                  <a:schemeClr val="bg1"/>
+                </a:solidFill>
+              </a:rPr>
+              <a:t>16.</a:t>
+            </a:r>
+            <a:endParaRPr lang="en-US" sz="1600" dirty="0" smtClean="0">
+              <a:solidFill>
+                <a:schemeClr val="bg1"/>
+              </a:solidFill>
+            </a:endParaRPr>
+          </a:p>
+          <a:p>
+            <a:pPr marL="1028700" lvl="1" eaLnBrk="1" hangingPunct="1">
+              <a:buFont typeface="Arial" panose="020B0604020202020204" pitchFamily="34" charset="0"/>
+              <a:buChar char="•"/>
+            </a:pPr>
+            <a:r>
+              <a:rPr lang="en-US" sz="1600" dirty="0" err="1" smtClean="0">
+                <a:solidFill>
+                  <a:schemeClr val="bg1"/>
+                </a:solidFill>
+              </a:rPr>
+              <a:t>Func</a:t>
+            </a:r>
+            <a:r>
+              <a:rPr lang="en-US" sz="1600" dirty="0" smtClean="0">
+                <a:solidFill>
+                  <a:schemeClr val="bg1"/>
+                </a:solidFill>
+              </a:rPr>
+              <a:t>&lt;</a:t>
+            </a:r>
+            <a:r>
+              <a:rPr lang="en-US" sz="1600" dirty="0" err="1" smtClean="0">
+                <a:solidFill>
+                  <a:schemeClr val="bg1"/>
+                </a:solidFill>
+              </a:rPr>
+              <a:t>TResult</a:t>
+            </a:r>
+            <a:r>
+              <a:rPr lang="en-US" sz="1600" dirty="0" smtClean="0">
+                <a:solidFill>
+                  <a:schemeClr val="bg1"/>
+                </a:solidFill>
+              </a:rPr>
+              <a:t>&gt;</a:t>
+            </a:r>
+            <a:endParaRPr lang="en-US" sz="1600" dirty="0">
+              <a:solidFill>
+                <a:schemeClr val="bg1"/>
+              </a:solidFill>
+            </a:endParaRPr>
+          </a:p>
+          <a:p>
+            <a:pPr marL="1028700" lvl="1" eaLnBrk="1" hangingPunct="1">
+              <a:buFont typeface="Arial" panose="020B0604020202020204" pitchFamily="34" charset="0"/>
+              <a:buChar char="•"/>
+            </a:pPr>
+            <a:r>
+              <a:rPr lang="en-US" sz="1600" dirty="0" err="1" smtClean="0">
+                <a:solidFill>
+                  <a:schemeClr val="bg1"/>
+                </a:solidFill>
+              </a:rPr>
+              <a:t>Func</a:t>
+            </a:r>
+            <a:r>
+              <a:rPr lang="en-US" sz="1600" dirty="0" smtClean="0">
+                <a:solidFill>
+                  <a:schemeClr val="bg1"/>
+                </a:solidFill>
+              </a:rPr>
+              <a:t>&lt;</a:t>
+            </a:r>
+            <a:r>
+              <a:rPr lang="en-US" sz="1600" dirty="0" err="1" smtClean="0">
+                <a:solidFill>
+                  <a:schemeClr val="bg1"/>
+                </a:solidFill>
+              </a:rPr>
+              <a:t>TResult</a:t>
+            </a:r>
+            <a:r>
+              <a:rPr lang="en-US" sz="1600" dirty="0" smtClean="0">
+                <a:solidFill>
+                  <a:schemeClr val="bg1"/>
+                </a:solidFill>
+              </a:rPr>
+              <a:t>, T</a:t>
+            </a:r>
+            <a:r>
+              <a:rPr lang="en-US" sz="1600" dirty="0">
+                <a:solidFill>
+                  <a:schemeClr val="bg1"/>
+                </a:solidFill>
+              </a:rPr>
+              <a:t>&gt;</a:t>
+            </a:r>
+          </a:p>
+          <a:p>
+            <a:pPr marL="1028700" lvl="1" eaLnBrk="1" hangingPunct="1">
+              <a:buFont typeface="Arial" panose="020B0604020202020204" pitchFamily="34" charset="0"/>
+              <a:buChar char="•"/>
+            </a:pPr>
+            <a:r>
+              <a:rPr lang="en-US" sz="1600" dirty="0" err="1" smtClean="0">
+                <a:solidFill>
+                  <a:schemeClr val="bg1"/>
+                </a:solidFill>
+              </a:rPr>
+              <a:t>Func</a:t>
+            </a:r>
+            <a:r>
+              <a:rPr lang="en-US" sz="1600" dirty="0" smtClean="0">
+                <a:solidFill>
+                  <a:schemeClr val="bg1"/>
+                </a:solidFill>
+              </a:rPr>
+              <a:t>&lt;</a:t>
+            </a:r>
+            <a:r>
+              <a:rPr lang="en-US" sz="1600" dirty="0" err="1">
+                <a:solidFill>
+                  <a:schemeClr val="bg1"/>
+                </a:solidFill>
+              </a:rPr>
+              <a:t>TResult</a:t>
+            </a:r>
+            <a:r>
+              <a:rPr lang="en-US" sz="1600" dirty="0">
+                <a:solidFill>
+                  <a:schemeClr val="bg1"/>
+                </a:solidFill>
+              </a:rPr>
+              <a:t>, </a:t>
+            </a:r>
+            <a:r>
+              <a:rPr lang="en-US" sz="1600" dirty="0" smtClean="0">
+                <a:solidFill>
+                  <a:schemeClr val="bg1"/>
+                </a:solidFill>
+              </a:rPr>
+              <a:t>T1</a:t>
+            </a:r>
+            <a:r>
+              <a:rPr lang="en-US" sz="1600" dirty="0">
+                <a:solidFill>
+                  <a:schemeClr val="bg1"/>
+                </a:solidFill>
+              </a:rPr>
+              <a:t>, T2&gt;</a:t>
+            </a:r>
+          </a:p>
+          <a:p>
+            <a:pPr marL="1028700" lvl="1" eaLnBrk="1" hangingPunct="1">
+              <a:buFont typeface="Arial" panose="020B0604020202020204" pitchFamily="34" charset="0"/>
+              <a:buChar char="•"/>
+            </a:pPr>
+            <a:r>
+              <a:rPr lang="en-US" sz="1600" dirty="0" err="1" smtClean="0">
+                <a:solidFill>
+                  <a:schemeClr val="bg1"/>
+                </a:solidFill>
+              </a:rPr>
+              <a:t>Func</a:t>
+            </a:r>
+            <a:r>
+              <a:rPr lang="en-US" sz="1600" dirty="0" smtClean="0">
+                <a:solidFill>
+                  <a:schemeClr val="bg1"/>
+                </a:solidFill>
+              </a:rPr>
+              <a:t>&lt;</a:t>
+            </a:r>
+            <a:r>
+              <a:rPr lang="en-US" sz="1600" dirty="0" err="1">
+                <a:solidFill>
+                  <a:schemeClr val="bg1"/>
+                </a:solidFill>
+              </a:rPr>
+              <a:t>TResult</a:t>
+            </a:r>
+            <a:r>
+              <a:rPr lang="en-US" sz="1600" dirty="0">
+                <a:solidFill>
+                  <a:schemeClr val="bg1"/>
+                </a:solidFill>
+              </a:rPr>
+              <a:t>, </a:t>
+            </a:r>
+            <a:r>
+              <a:rPr lang="en-US" sz="1600" dirty="0" smtClean="0">
+                <a:solidFill>
+                  <a:schemeClr val="bg1"/>
+                </a:solidFill>
+              </a:rPr>
+              <a:t>T1</a:t>
+            </a:r>
+            <a:r>
+              <a:rPr lang="en-US" sz="1600" dirty="0">
+                <a:solidFill>
+                  <a:schemeClr val="bg1"/>
+                </a:solidFill>
+              </a:rPr>
+              <a:t>, T2, T3&gt;</a:t>
+            </a:r>
+          </a:p>
+          <a:p>
+            <a:pPr marL="1028700" lvl="1" eaLnBrk="1" hangingPunct="1">
+              <a:buFont typeface="Arial" panose="020B0604020202020204" pitchFamily="34" charset="0"/>
+              <a:buChar char="•"/>
+            </a:pPr>
+            <a:r>
+              <a:rPr lang="en-US" sz="1600" dirty="0">
+                <a:solidFill>
+                  <a:schemeClr val="bg1"/>
+                </a:solidFill>
+              </a:rPr>
+              <a:t>…</a:t>
+            </a:r>
+          </a:p>
+          <a:p>
+            <a:pPr marL="1028700" lvl="1" eaLnBrk="1" hangingPunct="1">
+              <a:buFont typeface="Arial" panose="020B0604020202020204" pitchFamily="34" charset="0"/>
+              <a:buChar char="•"/>
+            </a:pPr>
+            <a:r>
+              <a:rPr lang="en-US" sz="1600" dirty="0" err="1" smtClean="0">
+                <a:solidFill>
+                  <a:schemeClr val="bg1"/>
+                </a:solidFill>
+              </a:rPr>
+              <a:t>Func</a:t>
+            </a:r>
+            <a:r>
+              <a:rPr lang="en-US" sz="1600" dirty="0" smtClean="0">
+                <a:solidFill>
+                  <a:schemeClr val="bg1"/>
+                </a:solidFill>
+              </a:rPr>
+              <a:t>&lt;</a:t>
+            </a:r>
+            <a:r>
+              <a:rPr lang="en-US" sz="1600" dirty="0" err="1">
+                <a:solidFill>
+                  <a:schemeClr val="bg1"/>
+                </a:solidFill>
+              </a:rPr>
+              <a:t>TResult</a:t>
+            </a:r>
+            <a:r>
+              <a:rPr lang="en-US" sz="1600" dirty="0">
+                <a:solidFill>
+                  <a:schemeClr val="bg1"/>
+                </a:solidFill>
+              </a:rPr>
+              <a:t>, </a:t>
+            </a:r>
+            <a:r>
+              <a:rPr lang="en-US" sz="1600" dirty="0" smtClean="0">
+                <a:solidFill>
+                  <a:schemeClr val="bg1"/>
+                </a:solidFill>
+              </a:rPr>
+              <a:t>T1</a:t>
+            </a:r>
+            <a:r>
+              <a:rPr lang="en-US" sz="1600" dirty="0">
+                <a:solidFill>
+                  <a:schemeClr val="bg1"/>
+                </a:solidFill>
+              </a:rPr>
+              <a:t>, T2, T3, T4, T5, T6, T7, T8, T9, T10, T11, T12, T13, T14, T15, </a:t>
+            </a:r>
+            <a:r>
+              <a:rPr lang="en-US" sz="1600" dirty="0" smtClean="0">
+                <a:solidFill>
+                  <a:schemeClr val="bg1"/>
+                </a:solidFill>
+              </a:rPr>
+              <a:t>T16&gt;</a:t>
+            </a:r>
+          </a:p>
+          <a:p>
+            <a:pPr marL="285750" eaLnBrk="1" hangingPunct="1"/>
+            <a:endParaRPr lang="en-US" sz="1600" dirty="0">
+              <a:solidFill>
+                <a:schemeClr val="bg1"/>
+              </a:solidFill>
+            </a:endParaRPr>
+          </a:p>
+          <a:p>
+            <a:pPr eaLnBrk="1" hangingPunct="1"/>
+            <a:r>
+              <a:rPr lang="ru-RU" sz="1600" dirty="0" smtClean="0">
+                <a:solidFill>
+                  <a:schemeClr val="bg1"/>
+                </a:solidFill>
+              </a:rPr>
+              <a:t>Где </a:t>
+            </a:r>
+            <a:r>
+              <a:rPr lang="en-US" sz="1600" dirty="0" smtClean="0">
+                <a:solidFill>
+                  <a:schemeClr val="bg1"/>
+                </a:solidFill>
+              </a:rPr>
+              <a:t>T1, T2, ,,, T16 </a:t>
+            </a:r>
+            <a:r>
+              <a:rPr lang="ru-RU" sz="1600" dirty="0" smtClean="0">
+                <a:solidFill>
+                  <a:schemeClr val="bg1"/>
+                </a:solidFill>
+              </a:rPr>
+              <a:t>– тип аргумента, </a:t>
+            </a:r>
+            <a:r>
+              <a:rPr lang="en-US" sz="1600" smtClean="0">
+                <a:solidFill>
+                  <a:schemeClr val="bg1"/>
+                </a:solidFill>
+              </a:rPr>
+              <a:t>T</a:t>
+            </a:r>
+            <a:r>
+              <a:rPr lang="en-US" sz="1600">
+                <a:solidFill>
+                  <a:schemeClr val="bg1"/>
+                </a:solidFill>
+              </a:rPr>
+              <a:t>R</a:t>
+            </a:r>
+            <a:r>
+              <a:rPr lang="en-US" sz="1600" smtClean="0">
+                <a:solidFill>
+                  <a:schemeClr val="bg1"/>
+                </a:solidFill>
+              </a:rPr>
+              <a:t>esult</a:t>
+            </a:r>
+            <a:r>
+              <a:rPr lang="en-US" sz="1600" dirty="0" smtClean="0">
+                <a:solidFill>
+                  <a:schemeClr val="bg1"/>
+                </a:solidFill>
+              </a:rPr>
+              <a:t> </a:t>
+            </a:r>
+            <a:r>
+              <a:rPr lang="ru-RU" sz="1600" dirty="0" smtClean="0">
+                <a:solidFill>
+                  <a:schemeClr val="bg1"/>
+                </a:solidFill>
+              </a:rPr>
+              <a:t>тип возвращаемого значения.</a:t>
+            </a:r>
+            <a:endParaRPr lang="ru-RU" sz="1600" dirty="0">
+              <a:solidFill>
+                <a:schemeClr val="bg1"/>
+              </a:solidFill>
+            </a:endParaRPr>
+          </a:p>
+          <a:p>
+            <a:pPr eaLnBrk="1" hangingPunct="1"/>
+            <a:endParaRPr lang="ru-RU" sz="1600" dirty="0">
+              <a:solidFill>
+                <a:schemeClr val="bg1"/>
+              </a:solidFill>
+            </a:endParaRPr>
+          </a:p>
+        </p:txBody>
+      </p:sp>
+    </p:spTree>
+    <p:extLst>
+      <p:ext uri="{BB962C8B-B14F-4D97-AF65-F5344CB8AC3E}">
+        <p14:creationId xmlns:p14="http://schemas.microsoft.com/office/powerpoint/2010/main" val="1894118169"/>
+      </p:ext>
+    </p:extLst>
+  </p:cSld>
+  <p:clrMapOvr>
+    <a:masterClrMapping/>
+  </p:clrMapOvr>
+  <p:timing>
+    <p:tnLst>
+      <p:par>
+        <p:cTn id="1" dur="indefinite" restart="never" nodeType="tmRoot"/>
+      </p:par>
+    </p:tnLst>
+  </p:timing>
+</p:sld>
+</file>
+
+<file path=ppt/slides/slide13.xml><?xml version="1.0" encoding="utf-8"?>
+<p:sld xmlns:a="http://schemas.openxmlformats.org/drawingml/2006/main" xmlns:r="http://schemas.openxmlformats.org/officeDocument/2006/relationships" xmlns:p="http://schemas.openxmlformats.org/presentationml/2006/main">
+  <p:cSld>
+    <p:bg>
+      <p:bgPr>
+        <a:blipFill dpi="0" rotWithShape="1">
+          <a:blip r:embed="rId2">
+            <a:lum/>
+          </a:blip>
+          <a:srcRect/>
+          <a:stretch>
+            <a:fillRect/>
+          </a:stretch>
+        </a:blipFill>
+        <a:effectLst/>
+      </p:bgPr>
+    </p:bg>
+    <p:spTree>
+      <p:nvGrpSpPr>
+        <p:cNvPr id="1" name=""/>
+        <p:cNvGrpSpPr/>
+        <p:nvPr/>
+      </p:nvGrpSpPr>
+      <p:grpSpPr>
+        <a:xfrm>
+          <a:off x="0" y="0"/>
+          <a:ext cx="0" cy="0"/>
+          <a:chOff x="0" y="0"/>
+          <a:chExt cx="0" cy="0"/>
+        </a:xfrm>
+      </p:grpSpPr>
+      <p:sp>
+        <p:nvSpPr>
+          <p:cNvPr id="12290" name="Прямоугольник 2"/>
+          <p:cNvSpPr>
+            <a:spLocks noChangeArrowheads="1"/>
+          </p:cNvSpPr>
+          <p:nvPr/>
+        </p:nvSpPr>
+        <p:spPr bwMode="auto">
+          <a:xfrm>
+            <a:off x="228600" y="0"/>
             <a:ext cx="8686800" cy="830997"/>
           </a:xfrm>
           <a:prstGeom prst="rect">
@@ -6260,373 +7141,10 @@
           </a:p>
         </p:txBody>
       </p:sp>
-      <p:sp>
-        <p:nvSpPr>
-          <p:cNvPr id="12293" name="Rectangle 3"/>
-          <p:cNvSpPr>
-            <a:spLocks noChangeArrowheads="1"/>
-          </p:cNvSpPr>
-          <p:nvPr/>
-        </p:nvSpPr>
-        <p:spPr bwMode="auto">
-          <a:xfrm>
-            <a:off x="228600" y="4203228"/>
-            <a:ext cx="8686800" cy="1169988"/>
-          </a:xfrm>
-          <a:prstGeom prst="rect">
-            <a:avLst/>
-          </a:prstGeom>
-          <a:noFill/>
-          <a:ln w="9525">
-            <a:solidFill>
-              <a:srgbClr val="FF0000"/>
-            </a:solidFill>
-            <a:miter lim="800000"/>
-            <a:headEnd/>
-            <a:tailEnd/>
-          </a:ln>
-          <a:extLst>
-            <a:ext uri="{909E8E84-426E-40DD-AFC4-6F175D3DCCD1}">
-              <a14:hiddenFill xmlns:a14="http://schemas.microsoft.com/office/drawing/2010/main">
-                <a:solidFill>
-                  <a:srgbClr val="FFFFFF"/>
-                </a:solidFill>
-              </a14:hiddenFill>
-            </a:ext>
-          </a:extLst>
-        </p:spPr>
-        <p:txBody>
-          <a:bodyPr anchor="ctr">
-            <a:spAutoFit/>
-          </a:bodyPr>
-          <a:lstStyle/>
-          <a:p>
-            <a:pPr eaLnBrk="0" hangingPunct="0"/>
-            <a:r>
-              <a:rPr lang="en-US" sz="1400" dirty="0">
-                <a:solidFill>
-                  <a:schemeClr val="bg1"/>
-                </a:solidFill>
-                <a:latin typeface="Courier New" pitchFamily="49" charset="0"/>
-                <a:ea typeface="Times New Roman" pitchFamily="18" charset="0"/>
-                <a:cs typeface="Courier New" pitchFamily="49" charset="0"/>
-              </a:rPr>
-              <a:t>e</a:t>
-            </a:r>
-            <a:r>
-              <a:rPr lang="ru-RU" sz="1400" dirty="0">
-                <a:solidFill>
-                  <a:schemeClr val="bg1"/>
-                </a:solidFill>
-                <a:latin typeface="Courier New" pitchFamily="49" charset="0"/>
-                <a:ea typeface="Times New Roman" pitchFamily="18" charset="0"/>
-                <a:cs typeface="Courier New" pitchFamily="49" charset="0"/>
-              </a:rPr>
-              <a:t>vent &lt;имя делегата&gt; &lt;имя события&gt;</a:t>
-            </a:r>
-            <a:endParaRPr lang="be-BY" sz="1400" dirty="0">
-              <a:solidFill>
-                <a:schemeClr val="bg1"/>
-              </a:solidFill>
-              <a:latin typeface="Courier New" pitchFamily="49" charset="0"/>
-              <a:ea typeface="Times New Roman" pitchFamily="18" charset="0"/>
-              <a:cs typeface="Courier New" pitchFamily="49" charset="0"/>
-            </a:endParaRPr>
-          </a:p>
-          <a:p>
-            <a:pPr eaLnBrk="0" hangingPunct="0"/>
-            <a:r>
-              <a:rPr lang="ru-RU" sz="1400" dirty="0">
-                <a:solidFill>
-                  <a:schemeClr val="bg1"/>
-                </a:solidFill>
-                <a:latin typeface="Courier New" pitchFamily="49" charset="0"/>
-                <a:ea typeface="Times New Roman" pitchFamily="18" charset="0"/>
-                <a:cs typeface="Courier New" pitchFamily="49" charset="0"/>
-              </a:rPr>
-              <a:t>{</a:t>
-            </a:r>
-            <a:endParaRPr lang="be-BY" sz="1400" dirty="0">
-              <a:solidFill>
-                <a:schemeClr val="bg1"/>
-              </a:solidFill>
-              <a:latin typeface="Courier New" pitchFamily="49" charset="0"/>
-              <a:ea typeface="Times New Roman" pitchFamily="18" charset="0"/>
-              <a:cs typeface="Courier New" pitchFamily="49" charset="0"/>
-            </a:endParaRPr>
-          </a:p>
-          <a:p>
-            <a:pPr eaLnBrk="0" hangingPunct="0"/>
-            <a:r>
-              <a:rPr lang="ru-RU" sz="1400" dirty="0">
-                <a:solidFill>
-                  <a:schemeClr val="bg1"/>
-                </a:solidFill>
-                <a:latin typeface="Courier New" pitchFamily="49" charset="0"/>
-                <a:ea typeface="Times New Roman" pitchFamily="18" charset="0"/>
-                <a:cs typeface="Courier New" pitchFamily="49" charset="0"/>
-              </a:rPr>
-              <a:t>    </a:t>
-            </a:r>
-            <a:r>
-              <a:rPr lang="en-US" sz="1400" dirty="0">
-                <a:solidFill>
-                  <a:schemeClr val="bg1"/>
-                </a:solidFill>
-                <a:latin typeface="Courier New" pitchFamily="49" charset="0"/>
-                <a:ea typeface="Times New Roman" pitchFamily="18" charset="0"/>
-                <a:cs typeface="Courier New" pitchFamily="49" charset="0"/>
-              </a:rPr>
-              <a:t>add</a:t>
-            </a:r>
-            <a:r>
-              <a:rPr lang="ru-RU" sz="1400" dirty="0">
-                <a:solidFill>
-                  <a:schemeClr val="bg1"/>
-                </a:solidFill>
-                <a:latin typeface="Courier New" pitchFamily="49" charset="0"/>
-                <a:ea typeface="Times New Roman" pitchFamily="18" charset="0"/>
-                <a:cs typeface="Courier New" pitchFamily="49" charset="0"/>
-              </a:rPr>
-              <a:t> { }</a:t>
-            </a:r>
-            <a:endParaRPr lang="be-BY" sz="1400" dirty="0">
-              <a:solidFill>
-                <a:schemeClr val="bg1"/>
-              </a:solidFill>
-              <a:latin typeface="Courier New" pitchFamily="49" charset="0"/>
-              <a:ea typeface="Times New Roman" pitchFamily="18" charset="0"/>
-              <a:cs typeface="Courier New" pitchFamily="49" charset="0"/>
-            </a:endParaRPr>
-          </a:p>
-          <a:p>
-            <a:pPr eaLnBrk="0" hangingPunct="0"/>
-            <a:r>
-              <a:rPr lang="ru-RU" sz="1400" dirty="0">
-                <a:solidFill>
-                  <a:schemeClr val="bg1"/>
-                </a:solidFill>
-                <a:latin typeface="Courier New" pitchFamily="49" charset="0"/>
-                <a:ea typeface="Times New Roman" pitchFamily="18" charset="0"/>
-                <a:cs typeface="Courier New" pitchFamily="49" charset="0"/>
-              </a:rPr>
-              <a:t>    </a:t>
-            </a:r>
-            <a:r>
-              <a:rPr lang="en-US" sz="1400" dirty="0">
-                <a:solidFill>
-                  <a:schemeClr val="bg1"/>
-                </a:solidFill>
-                <a:latin typeface="Courier New" pitchFamily="49" charset="0"/>
-                <a:ea typeface="Times New Roman" pitchFamily="18" charset="0"/>
-                <a:cs typeface="Courier New" pitchFamily="49" charset="0"/>
-              </a:rPr>
-              <a:t>remove</a:t>
-            </a:r>
-            <a:r>
-              <a:rPr lang="ru-RU" sz="1400" dirty="0">
-                <a:solidFill>
-                  <a:schemeClr val="bg1"/>
-                </a:solidFill>
-                <a:latin typeface="Courier New" pitchFamily="49" charset="0"/>
-                <a:ea typeface="Times New Roman" pitchFamily="18" charset="0"/>
-                <a:cs typeface="Courier New" pitchFamily="49" charset="0"/>
-              </a:rPr>
-              <a:t> { }</a:t>
-            </a:r>
-            <a:endParaRPr lang="be-BY" sz="1400" dirty="0">
-              <a:solidFill>
-                <a:schemeClr val="bg1"/>
-              </a:solidFill>
-              <a:latin typeface="Courier New" pitchFamily="49" charset="0"/>
-              <a:ea typeface="Times New Roman" pitchFamily="18" charset="0"/>
-              <a:cs typeface="Courier New" pitchFamily="49" charset="0"/>
-            </a:endParaRPr>
-          </a:p>
-          <a:p>
-            <a:pPr eaLnBrk="0" hangingPunct="0"/>
-            <a:r>
-              <a:rPr lang="ru-RU" sz="1400" dirty="0">
-                <a:solidFill>
-                  <a:schemeClr val="bg1"/>
-                </a:solidFill>
-                <a:latin typeface="Courier New" pitchFamily="49" charset="0"/>
-                <a:ea typeface="Times New Roman" pitchFamily="18" charset="0"/>
-                <a:cs typeface="Courier New" pitchFamily="49" charset="0"/>
-              </a:rPr>
-              <a:t>};</a:t>
-            </a:r>
-            <a:endParaRPr lang="be-BY" sz="1400" dirty="0">
-              <a:solidFill>
-                <a:schemeClr val="bg1"/>
-              </a:solidFill>
-              <a:latin typeface="Courier New" pitchFamily="49" charset="0"/>
-              <a:ea typeface="Times New Roman" pitchFamily="18" charset="0"/>
-              <a:cs typeface="Courier New" pitchFamily="49" charset="0"/>
-            </a:endParaRPr>
-          </a:p>
-        </p:txBody>
-      </p:sp>
-      <p:sp>
-        <p:nvSpPr>
-          <p:cNvPr id="12294" name="TextBox 6"/>
-          <p:cNvSpPr txBox="1">
-            <a:spLocks noChangeArrowheads="1"/>
-          </p:cNvSpPr>
-          <p:nvPr/>
-        </p:nvSpPr>
-        <p:spPr bwMode="auto">
-          <a:xfrm>
-            <a:off x="152400" y="3441228"/>
-            <a:ext cx="8839200" cy="584200"/>
-          </a:xfrm>
-          <a:prstGeom prst="rect">
-            <a:avLst/>
-          </a:prstGeom>
-          <a:noFill/>
-          <a:ln>
-            <a:noFill/>
-          </a:ln>
-          <a:extLst>
-            <a:ext uri="{909E8E84-426E-40DD-AFC4-6F175D3DCCD1}">
-              <a14:hiddenFill xmlns:a14="http://schemas.microsoft.com/office/drawing/2010/main">
-                <a:solidFill>
-                  <a:srgbClr val="FFFFFF"/>
-                </a:solidFill>
-              </a14:hiddenFill>
-            </a:ext>
-            <a:ext uri="{91240B29-F687-4F45-9708-019B960494DF}">
-              <a14:hiddenLine xmlns:a14="http://schemas.microsoft.com/office/drawing/2010/main" w="9525">
-                <a:solidFill>
-                  <a:srgbClr val="000000"/>
-                </a:solidFill>
-                <a:miter lim="800000"/>
-                <a:headEnd/>
-                <a:tailEnd/>
-              </a14:hiddenLine>
-            </a:ext>
-          </a:extLst>
-        </p:spPr>
-        <p:txBody>
-          <a:bodyPr>
-            <a:spAutoFit/>
-          </a:bodyPr>
-          <a:lstStyle>
-            <a:lvl1pPr defTabSz="358775" eaLnBrk="0" hangingPunct="0">
-              <a:defRPr>
-                <a:solidFill>
-                  <a:schemeClr val="tx1"/>
-                </a:solidFill>
-                <a:latin typeface="Arial" charset="0"/>
-              </a:defRPr>
-            </a:lvl1pPr>
-            <a:lvl2pPr marL="742950" indent="-285750" defTabSz="358775" eaLnBrk="0" hangingPunct="0">
-              <a:defRPr>
-                <a:solidFill>
-                  <a:schemeClr val="tx1"/>
-                </a:solidFill>
-                <a:latin typeface="Arial" charset="0"/>
-              </a:defRPr>
-            </a:lvl2pPr>
-            <a:lvl3pPr marL="1143000" indent="-228600" defTabSz="358775" eaLnBrk="0" hangingPunct="0">
-              <a:defRPr>
-                <a:solidFill>
-                  <a:schemeClr val="tx1"/>
-                </a:solidFill>
-                <a:latin typeface="Arial" charset="0"/>
-              </a:defRPr>
-            </a:lvl3pPr>
-            <a:lvl4pPr marL="1600200" indent="-228600" defTabSz="358775" eaLnBrk="0" hangingPunct="0">
-              <a:defRPr>
-                <a:solidFill>
-                  <a:schemeClr val="tx1"/>
-                </a:solidFill>
-                <a:latin typeface="Arial" charset="0"/>
-              </a:defRPr>
-            </a:lvl4pPr>
-            <a:lvl5pPr marL="2057400" indent="-228600" defTabSz="358775" eaLnBrk="0" hangingPunct="0">
-              <a:defRPr>
-                <a:solidFill>
-                  <a:schemeClr val="tx1"/>
-                </a:solidFill>
-                <a:latin typeface="Arial" charset="0"/>
-              </a:defRPr>
-            </a:lvl5pPr>
-            <a:lvl6pPr marL="2514600" indent="-228600" defTabSz="358775" eaLnBrk="0" fontAlgn="base" hangingPunct="0">
-              <a:spcBef>
-                <a:spcPct val="0"/>
-              </a:spcBef>
-              <a:spcAft>
-                <a:spcPct val="0"/>
-              </a:spcAft>
-              <a:defRPr>
-                <a:solidFill>
-                  <a:schemeClr val="tx1"/>
-                </a:solidFill>
-                <a:latin typeface="Arial" charset="0"/>
-              </a:defRPr>
-            </a:lvl6pPr>
-            <a:lvl7pPr marL="2971800" indent="-228600" defTabSz="358775" eaLnBrk="0" fontAlgn="base" hangingPunct="0">
-              <a:spcBef>
-                <a:spcPct val="0"/>
-              </a:spcBef>
-              <a:spcAft>
-                <a:spcPct val="0"/>
-              </a:spcAft>
-              <a:defRPr>
-                <a:solidFill>
-                  <a:schemeClr val="tx1"/>
-                </a:solidFill>
-                <a:latin typeface="Arial" charset="0"/>
-              </a:defRPr>
-            </a:lvl7pPr>
-            <a:lvl8pPr marL="3429000" indent="-228600" defTabSz="358775" eaLnBrk="0" fontAlgn="base" hangingPunct="0">
-              <a:spcBef>
-                <a:spcPct val="0"/>
-              </a:spcBef>
-              <a:spcAft>
-                <a:spcPct val="0"/>
-              </a:spcAft>
-              <a:defRPr>
-                <a:solidFill>
-                  <a:schemeClr val="tx1"/>
-                </a:solidFill>
-                <a:latin typeface="Arial" charset="0"/>
-              </a:defRPr>
-            </a:lvl8pPr>
-            <a:lvl9pPr marL="3886200" indent="-228600" defTabSz="358775" eaLnBrk="0" fontAlgn="base" hangingPunct="0">
-              <a:spcBef>
-                <a:spcPct val="0"/>
-              </a:spcBef>
-              <a:spcAft>
-                <a:spcPct val="0"/>
-              </a:spcAft>
-              <a:defRPr>
-                <a:solidFill>
-                  <a:schemeClr val="tx1"/>
-                </a:solidFill>
-                <a:latin typeface="Arial" charset="0"/>
-              </a:defRPr>
-            </a:lvl9pPr>
-          </a:lstStyle>
-          <a:p>
-            <a:pPr eaLnBrk="1" hangingPunct="1"/>
-            <a:r>
-              <a:rPr lang="ru-RU" sz="1600"/>
-              <a:t>	Методы добавления и удаления делегата из события генерируются автоматически, однако программист может их переопределить, используя следующую запись</a:t>
-            </a:r>
-            <a:r>
-              <a:rPr lang="en-US" sz="1600"/>
-              <a:t>:</a:t>
-            </a:r>
-            <a:endParaRPr lang="ru-RU" sz="1600"/>
-          </a:p>
-        </p:txBody>
-      </p:sp>
     </p:spTree>
     <p:extLst>
       <p:ext uri="{BB962C8B-B14F-4D97-AF65-F5344CB8AC3E}">
-        <p14:creationId xmlns:p14="http://schemas.microsoft.com/office/powerpoint/2010/main" val="1894118169"/>
+        <p14:creationId xmlns:p14="http://schemas.microsoft.com/office/powerpoint/2010/main" val="3940884637"/>
       </p:ext>
     </p:extLst>
   </p:cSld>
@@ -6643,7 +7161,7 @@
 </p:sld>
 </file>
 
-<file path=ppt/slides/slide13.xml><?xml version="1.0" encoding="utf-8"?>
+<file path=ppt/slides/slide14.xml><?xml version="1.0" encoding="utf-8"?>
 <p:sld xmlns:a="http://schemas.openxmlformats.org/drawingml/2006/main" xmlns:r="http://schemas.openxmlformats.org/officeDocument/2006/relationships" xmlns:p="http://schemas.openxmlformats.org/presentationml/2006/main">
   <p:cSld>
     <p:bg>
@@ -7679,7 +8197,7 @@
 </p:sld>
 </file>
 
-<file path=ppt/slides/slide14.xml><?xml version="1.0" encoding="utf-8"?>
+<file path=ppt/slides/slide15.xml><?xml version="1.0" encoding="utf-8"?>
 <p:sld xmlns:a="http://schemas.openxmlformats.org/drawingml/2006/main" xmlns:r="http://schemas.openxmlformats.org/officeDocument/2006/relationships" xmlns:p="http://schemas.openxmlformats.org/presentationml/2006/main">
   <p:cSld>
     <p:bg>
@@ -9207,7 +9725,7 @@
 </p:sld>
 </file>
 
-<file path=ppt/slides/slide15.xml><?xml version="1.0" encoding="utf-8"?>
+<file path=ppt/slides/slide16.xml><?xml version="1.0" encoding="utf-8"?>
 <p:sld xmlns:a="http://schemas.openxmlformats.org/drawingml/2006/main" xmlns:r="http://schemas.openxmlformats.org/officeDocument/2006/relationships" xmlns:p="http://schemas.openxmlformats.org/presentationml/2006/main">
   <p:cSld>
     <p:bg>
@@ -9285,15 +9803,7 @@
                   <a:srgbClr val="FFFFFF"/>
                 </a:solidFill>
               </a:rPr>
-              <a:t>Самостоятельное </a:t>
-            </a:r>
-            <a:r>
-              <a:rPr lang="ru-RU" sz="2400" b="1" dirty="0" smtClean="0">
-                <a:solidFill>
-                  <a:srgbClr val="FFFFFF"/>
-                </a:solidFill>
-              </a:rPr>
-              <a:t>задание</a:t>
+              <a:t>Самостоятельное задание</a:t>
             </a:r>
             <a:endParaRPr lang="ru-RU" sz="2400" b="1" dirty="0">
               <a:solidFill>
@@ -9463,16 +9973,7 @@
                 </a:solidFill>
                 <a:cs typeface="Arial" charset="0"/>
               </a:rPr>
-              <a:t>Vehi</a:t>
-            </a:r>
-            <a:r>
-              <a:rPr lang="en-US" dirty="0" smtClean="0">
-                <a:solidFill>
-                  <a:srgbClr val="FFFFFF"/>
-                </a:solidFill>
-                <a:cs typeface="Arial" charset="0"/>
-              </a:rPr>
-              <a:t>cle.</a:t>
+              <a:t>Vehicle.</a:t>
             </a:r>
           </a:p>
           <a:p>
@@ -9504,12 +10005,6 @@
               </a:rPr>
               <a:t>Homework\vehicle-events.docx</a:t>
             </a:r>
-            <a:endParaRPr lang="en-US" i="1" dirty="0">
-              <a:solidFill>
-                <a:srgbClr val="FFFFFF"/>
-              </a:solidFill>
-              <a:cs typeface="Arial" charset="0"/>
-            </a:endParaRPr>
           </a:p>
         </p:txBody>
       </p:sp>
@@ -9533,7 +10028,7 @@
 </p:sld>
 </file>
 
-<file path=ppt/slides/slide16.xml><?xml version="1.0" encoding="utf-8"?>
+<file path=ppt/slides/slide17.xml><?xml version="1.0" encoding="utf-8"?>
 <p:sld xmlns:a="http://schemas.openxmlformats.org/drawingml/2006/main" xmlns:r="http://schemas.openxmlformats.org/officeDocument/2006/relationships" xmlns:p="http://schemas.openxmlformats.org/presentationml/2006/main">
   <p:cSld>
     <p:bg>
@@ -10064,6 +10559,13 @@
   <p:clrMapOvr>
     <a:masterClrMapping/>
   </p:clrMapOvr>
+  <p:timing>
+    <p:tnLst>
+      <p:par>
+        <p:cTn id="1" dur="indefinite" restart="never" nodeType="tmRoot"/>
+      </p:par>
+    </p:tnLst>
+  </p:timing>
 </p:sld>
 </file>
 
@@ -17195,6 +17697,369 @@
               <a:rPr lang="ru-RU" sz="1600"/>
               <a:t>	3. Вызов(или генерация) события.</a:t>
             </a:r>
+          </a:p>
+        </p:txBody>
+      </p:sp>
+      <p:sp>
+        <p:nvSpPr>
+          <p:cNvPr id="6" name="Rectangle 3"/>
+          <p:cNvSpPr>
+            <a:spLocks noChangeArrowheads="1"/>
+          </p:cNvSpPr>
+          <p:nvPr/>
+        </p:nvSpPr>
+        <p:spPr bwMode="auto">
+          <a:xfrm>
+            <a:off x="228600" y="5427364"/>
+            <a:ext cx="8686800" cy="1169988"/>
+          </a:xfrm>
+          <a:prstGeom prst="rect">
+            <a:avLst/>
+          </a:prstGeom>
+          <a:noFill/>
+          <a:ln w="9525">
+            <a:solidFill>
+              <a:srgbClr val="FF0000"/>
+            </a:solidFill>
+            <a:miter lim="800000"/>
+            <a:headEnd/>
+            <a:tailEnd/>
+          </a:ln>
+          <a:extLst>
+            <a:ext uri="{909E8E84-426E-40DD-AFC4-6F175D3DCCD1}">
+              <a14:hiddenFill xmlns:a14="http://schemas.microsoft.com/office/drawing/2010/main">
+                <a:solidFill>
+                  <a:srgbClr val="FFFFFF"/>
+                </a:solidFill>
+              </a14:hiddenFill>
+            </a:ext>
+          </a:extLst>
+        </p:spPr>
+        <p:txBody>
+          <a:bodyPr anchor="ctr">
+            <a:spAutoFit/>
+          </a:bodyPr>
+          <a:lstStyle/>
+          <a:p>
+            <a:pPr eaLnBrk="0" hangingPunct="0"/>
+            <a:r>
+              <a:rPr lang="en-US" sz="1400" dirty="0">
+                <a:solidFill>
+                  <a:schemeClr val="bg1"/>
+                </a:solidFill>
+                <a:latin typeface="Courier New" pitchFamily="49" charset="0"/>
+                <a:ea typeface="Times New Roman" pitchFamily="18" charset="0"/>
+                <a:cs typeface="Courier New" pitchFamily="49" charset="0"/>
+              </a:rPr>
+              <a:t>e</a:t>
+            </a:r>
+            <a:r>
+              <a:rPr lang="ru-RU" sz="1400" dirty="0">
+                <a:solidFill>
+                  <a:schemeClr val="bg1"/>
+                </a:solidFill>
+                <a:latin typeface="Courier New" pitchFamily="49" charset="0"/>
+                <a:ea typeface="Times New Roman" pitchFamily="18" charset="0"/>
+                <a:cs typeface="Courier New" pitchFamily="49" charset="0"/>
+              </a:rPr>
+              <a:t>vent &lt;имя делегата&gt; &lt;имя события&gt;</a:t>
+            </a:r>
+            <a:endParaRPr lang="be-BY" sz="1400" dirty="0">
+              <a:solidFill>
+                <a:schemeClr val="bg1"/>
+              </a:solidFill>
+              <a:latin typeface="Courier New" pitchFamily="49" charset="0"/>
+              <a:ea typeface="Times New Roman" pitchFamily="18" charset="0"/>
+              <a:cs typeface="Courier New" pitchFamily="49" charset="0"/>
+            </a:endParaRPr>
+          </a:p>
+          <a:p>
+            <a:pPr eaLnBrk="0" hangingPunct="0"/>
+            <a:r>
+              <a:rPr lang="ru-RU" sz="1400" dirty="0">
+                <a:solidFill>
+                  <a:schemeClr val="bg1"/>
+                </a:solidFill>
+                <a:latin typeface="Courier New" pitchFamily="49" charset="0"/>
+                <a:ea typeface="Times New Roman" pitchFamily="18" charset="0"/>
+                <a:cs typeface="Courier New" pitchFamily="49" charset="0"/>
+              </a:rPr>
+              <a:t>{</a:t>
+            </a:r>
+            <a:endParaRPr lang="be-BY" sz="1400" dirty="0">
+              <a:solidFill>
+                <a:schemeClr val="bg1"/>
+              </a:solidFill>
+              <a:latin typeface="Courier New" pitchFamily="49" charset="0"/>
+              <a:ea typeface="Times New Roman" pitchFamily="18" charset="0"/>
+              <a:cs typeface="Courier New" pitchFamily="49" charset="0"/>
+            </a:endParaRPr>
+          </a:p>
+          <a:p>
+            <a:pPr eaLnBrk="0" hangingPunct="0"/>
+            <a:r>
+              <a:rPr lang="ru-RU" sz="1400" dirty="0">
+                <a:solidFill>
+                  <a:schemeClr val="bg1"/>
+                </a:solidFill>
+                <a:latin typeface="Courier New" pitchFamily="49" charset="0"/>
+                <a:ea typeface="Times New Roman" pitchFamily="18" charset="0"/>
+                <a:cs typeface="Courier New" pitchFamily="49" charset="0"/>
+              </a:rPr>
+              <a:t>    </a:t>
+            </a:r>
+            <a:r>
+              <a:rPr lang="en-US" sz="1400" dirty="0">
+                <a:solidFill>
+                  <a:schemeClr val="bg1"/>
+                </a:solidFill>
+                <a:latin typeface="Courier New" pitchFamily="49" charset="0"/>
+                <a:ea typeface="Times New Roman" pitchFamily="18" charset="0"/>
+                <a:cs typeface="Courier New" pitchFamily="49" charset="0"/>
+              </a:rPr>
+              <a:t>add</a:t>
+            </a:r>
+            <a:r>
+              <a:rPr lang="ru-RU" sz="1400" dirty="0">
+                <a:solidFill>
+                  <a:schemeClr val="bg1"/>
+                </a:solidFill>
+                <a:latin typeface="Courier New" pitchFamily="49" charset="0"/>
+                <a:ea typeface="Times New Roman" pitchFamily="18" charset="0"/>
+                <a:cs typeface="Courier New" pitchFamily="49" charset="0"/>
+              </a:rPr>
+              <a:t> { }</a:t>
+            </a:r>
+            <a:endParaRPr lang="be-BY" sz="1400" dirty="0">
+              <a:solidFill>
+                <a:schemeClr val="bg1"/>
+              </a:solidFill>
+              <a:latin typeface="Courier New" pitchFamily="49" charset="0"/>
+              <a:ea typeface="Times New Roman" pitchFamily="18" charset="0"/>
+              <a:cs typeface="Courier New" pitchFamily="49" charset="0"/>
+            </a:endParaRPr>
+          </a:p>
+          <a:p>
+            <a:pPr eaLnBrk="0" hangingPunct="0"/>
+            <a:r>
+              <a:rPr lang="ru-RU" sz="1400" dirty="0">
+                <a:solidFill>
+                  <a:schemeClr val="bg1"/>
+                </a:solidFill>
+                <a:latin typeface="Courier New" pitchFamily="49" charset="0"/>
+                <a:ea typeface="Times New Roman" pitchFamily="18" charset="0"/>
+                <a:cs typeface="Courier New" pitchFamily="49" charset="0"/>
+              </a:rPr>
+              <a:t>    </a:t>
+            </a:r>
+            <a:r>
+              <a:rPr lang="en-US" sz="1400" dirty="0">
+                <a:solidFill>
+                  <a:schemeClr val="bg1"/>
+                </a:solidFill>
+                <a:latin typeface="Courier New" pitchFamily="49" charset="0"/>
+                <a:ea typeface="Times New Roman" pitchFamily="18" charset="0"/>
+                <a:cs typeface="Courier New" pitchFamily="49" charset="0"/>
+              </a:rPr>
+              <a:t>remove</a:t>
+            </a:r>
+            <a:r>
+              <a:rPr lang="ru-RU" sz="1400" dirty="0">
+                <a:solidFill>
+                  <a:schemeClr val="bg1"/>
+                </a:solidFill>
+                <a:latin typeface="Courier New" pitchFamily="49" charset="0"/>
+                <a:ea typeface="Times New Roman" pitchFamily="18" charset="0"/>
+                <a:cs typeface="Courier New" pitchFamily="49" charset="0"/>
+              </a:rPr>
+              <a:t> { }</a:t>
+            </a:r>
+            <a:endParaRPr lang="be-BY" sz="1400" dirty="0">
+              <a:solidFill>
+                <a:schemeClr val="bg1"/>
+              </a:solidFill>
+              <a:latin typeface="Courier New" pitchFamily="49" charset="0"/>
+              <a:ea typeface="Times New Roman" pitchFamily="18" charset="0"/>
+              <a:cs typeface="Courier New" pitchFamily="49" charset="0"/>
+            </a:endParaRPr>
+          </a:p>
+          <a:p>
+            <a:pPr eaLnBrk="0" hangingPunct="0"/>
+            <a:r>
+              <a:rPr lang="ru-RU" sz="1400" dirty="0">
+                <a:solidFill>
+                  <a:schemeClr val="bg1"/>
+                </a:solidFill>
+                <a:latin typeface="Courier New" pitchFamily="49" charset="0"/>
+                <a:ea typeface="Times New Roman" pitchFamily="18" charset="0"/>
+                <a:cs typeface="Courier New" pitchFamily="49" charset="0"/>
+              </a:rPr>
+              <a:t>};</a:t>
+            </a:r>
+            <a:endParaRPr lang="be-BY" sz="1400" dirty="0">
+              <a:solidFill>
+                <a:schemeClr val="bg1"/>
+              </a:solidFill>
+              <a:latin typeface="Courier New" pitchFamily="49" charset="0"/>
+              <a:ea typeface="Times New Roman" pitchFamily="18" charset="0"/>
+              <a:cs typeface="Courier New" pitchFamily="49" charset="0"/>
+            </a:endParaRPr>
+          </a:p>
+        </p:txBody>
+      </p:sp>
+      <p:sp>
+        <p:nvSpPr>
+          <p:cNvPr id="7" name="TextBox 6"/>
+          <p:cNvSpPr txBox="1">
+            <a:spLocks noChangeArrowheads="1"/>
+          </p:cNvSpPr>
+          <p:nvPr/>
+        </p:nvSpPr>
+        <p:spPr bwMode="auto">
+          <a:xfrm>
+            <a:off x="152400" y="4665364"/>
+            <a:ext cx="8839200" cy="584200"/>
+          </a:xfrm>
+          <a:prstGeom prst="rect">
+            <a:avLst/>
+          </a:prstGeom>
+          <a:noFill/>
+          <a:ln>
+            <a:noFill/>
+          </a:ln>
+          <a:extLst>
+            <a:ext uri="{909E8E84-426E-40DD-AFC4-6F175D3DCCD1}">
+              <a14:hiddenFill xmlns:a14="http://schemas.microsoft.com/office/drawing/2010/main">
+                <a:solidFill>
+                  <a:srgbClr val="FFFFFF"/>
+                </a:solidFill>
+              </a14:hiddenFill>
+            </a:ext>
+            <a:ext uri="{91240B29-F687-4F45-9708-019B960494DF}">
+              <a14:hiddenLine xmlns:a14="http://schemas.microsoft.com/office/drawing/2010/main" w="9525">
+                <a:solidFill>
+                  <a:srgbClr val="000000"/>
+                </a:solidFill>
+                <a:miter lim="800000"/>
+                <a:headEnd/>
+                <a:tailEnd/>
+              </a14:hiddenLine>
+            </a:ext>
+          </a:extLst>
+        </p:spPr>
+        <p:txBody>
+          <a:bodyPr>
+            <a:spAutoFit/>
+          </a:bodyPr>
+          <a:lstStyle>
+            <a:lvl1pPr defTabSz="358775" eaLnBrk="0" hangingPunct="0">
+              <a:defRPr>
+                <a:solidFill>
+                  <a:schemeClr val="tx1"/>
+                </a:solidFill>
+                <a:latin typeface="Arial" charset="0"/>
+              </a:defRPr>
+            </a:lvl1pPr>
+            <a:lvl2pPr marL="742950" indent="-285750" defTabSz="358775" eaLnBrk="0" hangingPunct="0">
+              <a:defRPr>
+                <a:solidFill>
+                  <a:schemeClr val="tx1"/>
+                </a:solidFill>
+                <a:latin typeface="Arial" charset="0"/>
+              </a:defRPr>
+            </a:lvl2pPr>
+            <a:lvl3pPr marL="1143000" indent="-228600" defTabSz="358775" eaLnBrk="0" hangingPunct="0">
+              <a:defRPr>
+                <a:solidFill>
+                  <a:schemeClr val="tx1"/>
+                </a:solidFill>
+                <a:latin typeface="Arial" charset="0"/>
+              </a:defRPr>
+            </a:lvl3pPr>
+            <a:lvl4pPr marL="1600200" indent="-228600" defTabSz="358775" eaLnBrk="0" hangingPunct="0">
+              <a:defRPr>
+                <a:solidFill>
+                  <a:schemeClr val="tx1"/>
+                </a:solidFill>
+                <a:latin typeface="Arial" charset="0"/>
+              </a:defRPr>
+            </a:lvl4pPr>
+            <a:lvl5pPr marL="2057400" indent="-228600" defTabSz="358775" eaLnBrk="0" hangingPunct="0">
+              <a:defRPr>
+                <a:solidFill>
+                  <a:schemeClr val="tx1"/>
+                </a:solidFill>
+                <a:latin typeface="Arial" charset="0"/>
+              </a:defRPr>
+            </a:lvl5pPr>
+            <a:lvl6pPr marL="2514600" indent="-228600" defTabSz="358775" eaLnBrk="0" fontAlgn="base" hangingPunct="0">
+              <a:spcBef>
+                <a:spcPct val="0"/>
+              </a:spcBef>
+              <a:spcAft>
+                <a:spcPct val="0"/>
+              </a:spcAft>
+              <a:defRPr>
+                <a:solidFill>
+                  <a:schemeClr val="tx1"/>
+                </a:solidFill>
+                <a:latin typeface="Arial" charset="0"/>
+              </a:defRPr>
+            </a:lvl6pPr>
+            <a:lvl7pPr marL="2971800" indent="-228600" defTabSz="358775" eaLnBrk="0" fontAlgn="base" hangingPunct="0">
+              <a:spcBef>
+                <a:spcPct val="0"/>
+              </a:spcBef>
+              <a:spcAft>
+                <a:spcPct val="0"/>
+              </a:spcAft>
+              <a:defRPr>
+                <a:solidFill>
+                  <a:schemeClr val="tx1"/>
+                </a:solidFill>
+                <a:latin typeface="Arial" charset="0"/>
+              </a:defRPr>
+            </a:lvl7pPr>
+            <a:lvl8pPr marL="3429000" indent="-228600" defTabSz="358775" eaLnBrk="0" fontAlgn="base" hangingPunct="0">
+              <a:spcBef>
+                <a:spcPct val="0"/>
+              </a:spcBef>
+              <a:spcAft>
+                <a:spcPct val="0"/>
+              </a:spcAft>
+              <a:defRPr>
+                <a:solidFill>
+                  <a:schemeClr val="tx1"/>
+                </a:solidFill>
+                <a:latin typeface="Arial" charset="0"/>
+              </a:defRPr>
+            </a:lvl8pPr>
+            <a:lvl9pPr marL="3886200" indent="-228600" defTabSz="358775" eaLnBrk="0" fontAlgn="base" hangingPunct="0">
+              <a:spcBef>
+                <a:spcPct val="0"/>
+              </a:spcBef>
+              <a:spcAft>
+                <a:spcPct val="0"/>
+              </a:spcAft>
+              <a:defRPr>
+                <a:solidFill>
+                  <a:schemeClr val="tx1"/>
+                </a:solidFill>
+                <a:latin typeface="Arial" charset="0"/>
+              </a:defRPr>
+            </a:lvl9pPr>
+          </a:lstStyle>
+          <a:p>
+            <a:pPr eaLnBrk="1" hangingPunct="1"/>
+            <a:r>
+              <a:rPr lang="ru-RU" sz="1600" dirty="0"/>
+              <a:t>	Методы добавления и удаления делегата из события генерируются автоматически, однако программист может их переопределить, используя следующую запись</a:t>
+            </a:r>
+            <a:r>
+              <a:rPr lang="en-US" sz="1600" dirty="0"/>
+              <a:t>:</a:t>
+            </a:r>
+            <a:endParaRPr lang="ru-RU" sz="1600" dirty="0"/>
           </a:p>
         </p:txBody>
       </p:sp>

</xml_diff>

<commit_message>
C# 6 features for the future
</commit_message>
<xml_diff>
--- a/Presentation/lesson-05-events.pptx
+++ b/Presentation/lesson-05-events.pptx
@@ -14,14 +14,15 @@
     <p:sldId id="277" r:id="rId8"/>
     <p:sldId id="278" r:id="rId9"/>
     <p:sldId id="279" r:id="rId10"/>
-    <p:sldId id="280" r:id="rId11"/>
-    <p:sldId id="281" r:id="rId12"/>
-    <p:sldId id="282" r:id="rId13"/>
-    <p:sldId id="289" r:id="rId14"/>
-    <p:sldId id="283" r:id="rId15"/>
-    <p:sldId id="286" r:id="rId16"/>
-    <p:sldId id="287" r:id="rId17"/>
-    <p:sldId id="288" r:id="rId18"/>
+    <p:sldId id="290" r:id="rId11"/>
+    <p:sldId id="280" r:id="rId12"/>
+    <p:sldId id="281" r:id="rId13"/>
+    <p:sldId id="282" r:id="rId14"/>
+    <p:sldId id="289" r:id="rId15"/>
+    <p:sldId id="283" r:id="rId16"/>
+    <p:sldId id="286" r:id="rId17"/>
+    <p:sldId id="287" r:id="rId18"/>
+    <p:sldId id="288" r:id="rId19"/>
   </p:sldIdLst>
   <p:sldSz cx="9144000" cy="6858000" type="screen4x3"/>
   <p:notesSz cx="6858000" cy="9144000"/>
@@ -304,7 +305,7 @@
           <a:p>
             <a:fld id="{FAECF776-F836-4CCD-9497-99E5597B8B5D}" type="datetimeFigureOut">
               <a:rPr lang="en-US" smtClean="0"/>
-              <a:t>6/4/2014</a:t>
+              <a:t>10/2/2014</a:t>
             </a:fld>
             <a:endParaRPr lang="en-US"/>
           </a:p>
@@ -474,7 +475,7 @@
           <a:p>
             <a:fld id="{FAECF776-F836-4CCD-9497-99E5597B8B5D}" type="datetimeFigureOut">
               <a:rPr lang="en-US" smtClean="0"/>
-              <a:t>6/4/2014</a:t>
+              <a:t>10/2/2014</a:t>
             </a:fld>
             <a:endParaRPr lang="en-US"/>
           </a:p>
@@ -654,7 +655,7 @@
           <a:p>
             <a:fld id="{FAECF776-F836-4CCD-9497-99E5597B8B5D}" type="datetimeFigureOut">
               <a:rPr lang="en-US" smtClean="0"/>
-              <a:t>6/4/2014</a:t>
+              <a:t>10/2/2014</a:t>
             </a:fld>
             <a:endParaRPr lang="en-US"/>
           </a:p>
@@ -824,7 +825,7 @@
           <a:p>
             <a:fld id="{FAECF776-F836-4CCD-9497-99E5597B8B5D}" type="datetimeFigureOut">
               <a:rPr lang="en-US" smtClean="0"/>
-              <a:t>6/4/2014</a:t>
+              <a:t>10/2/2014</a:t>
             </a:fld>
             <a:endParaRPr lang="en-US"/>
           </a:p>
@@ -1070,7 +1071,7 @@
           <a:p>
             <a:fld id="{FAECF776-F836-4CCD-9497-99E5597B8B5D}" type="datetimeFigureOut">
               <a:rPr lang="en-US" smtClean="0"/>
-              <a:t>6/4/2014</a:t>
+              <a:t>10/2/2014</a:t>
             </a:fld>
             <a:endParaRPr lang="en-US"/>
           </a:p>
@@ -1358,7 +1359,7 @@
           <a:p>
             <a:fld id="{FAECF776-F836-4CCD-9497-99E5597B8B5D}" type="datetimeFigureOut">
               <a:rPr lang="en-US" smtClean="0"/>
-              <a:t>6/4/2014</a:t>
+              <a:t>10/2/2014</a:t>
             </a:fld>
             <a:endParaRPr lang="en-US"/>
           </a:p>
@@ -1780,7 +1781,7 @@
           <a:p>
             <a:fld id="{FAECF776-F836-4CCD-9497-99E5597B8B5D}" type="datetimeFigureOut">
               <a:rPr lang="en-US" smtClean="0"/>
-              <a:t>6/4/2014</a:t>
+              <a:t>10/2/2014</a:t>
             </a:fld>
             <a:endParaRPr lang="en-US"/>
           </a:p>
@@ -1898,7 +1899,7 @@
           <a:p>
             <a:fld id="{FAECF776-F836-4CCD-9497-99E5597B8B5D}" type="datetimeFigureOut">
               <a:rPr lang="en-US" smtClean="0"/>
-              <a:t>6/4/2014</a:t>
+              <a:t>10/2/2014</a:t>
             </a:fld>
             <a:endParaRPr lang="en-US"/>
           </a:p>
@@ -1993,7 +1994,7 @@
           <a:p>
             <a:fld id="{FAECF776-F836-4CCD-9497-99E5597B8B5D}" type="datetimeFigureOut">
               <a:rPr lang="en-US" smtClean="0"/>
-              <a:t>6/4/2014</a:t>
+              <a:t>10/2/2014</a:t>
             </a:fld>
             <a:endParaRPr lang="en-US"/>
           </a:p>
@@ -2270,7 +2271,7 @@
           <a:p>
             <a:fld id="{FAECF776-F836-4CCD-9497-99E5597B8B5D}" type="datetimeFigureOut">
               <a:rPr lang="en-US" smtClean="0"/>
-              <a:t>6/4/2014</a:t>
+              <a:t>10/2/2014</a:t>
             </a:fld>
             <a:endParaRPr lang="en-US"/>
           </a:p>
@@ -2523,7 +2524,7 @@
           <a:p>
             <a:fld id="{FAECF776-F836-4CCD-9497-99E5597B8B5D}" type="datetimeFigureOut">
               <a:rPr lang="en-US" smtClean="0"/>
-              <a:t>6/4/2014</a:t>
+              <a:t>10/2/2014</a:t>
             </a:fld>
             <a:endParaRPr lang="en-US"/>
           </a:p>
@@ -2736,7 +2737,7 @@
           <a:p>
             <a:fld id="{FAECF776-F836-4CCD-9497-99E5597B8B5D}" type="datetimeFigureOut">
               <a:rPr lang="en-US" smtClean="0"/>
-              <a:t>6/4/2014</a:t>
+              <a:t>10/2/2014</a:t>
             </a:fld>
             <a:endParaRPr lang="en-US"/>
           </a:p>
@@ -3327,6 +3328,298 @@
 </file>
 
 <file path=ppt/slides/slide10.xml><?xml version="1.0" encoding="utf-8"?>
+<p:sld xmlns:a="http://schemas.openxmlformats.org/drawingml/2006/main" xmlns:r="http://schemas.openxmlformats.org/officeDocument/2006/relationships" xmlns:p="http://schemas.openxmlformats.org/presentationml/2006/main" show="0">
+  <p:cSld>
+    <p:bg>
+      <p:bgPr>
+        <a:solidFill>
+          <a:srgbClr val="C00000"/>
+        </a:solidFill>
+        <a:effectLst/>
+      </p:bgPr>
+    </p:bg>
+    <p:spTree>
+      <p:nvGrpSpPr>
+        <p:cNvPr id="1" name=""/>
+        <p:cNvGrpSpPr/>
+        <p:nvPr/>
+      </p:nvGrpSpPr>
+      <p:grpSpPr>
+        <a:xfrm>
+          <a:off x="0" y="0"/>
+          <a:ext cx="0" cy="0"/>
+          <a:chOff x="0" y="0"/>
+          <a:chExt cx="0" cy="0"/>
+        </a:xfrm>
+      </p:grpSpPr>
+      <p:sp>
+        <p:nvSpPr>
+          <p:cNvPr id="9218" name="Прямоугольник 2"/>
+          <p:cNvSpPr>
+            <a:spLocks noChangeArrowheads="1"/>
+          </p:cNvSpPr>
+          <p:nvPr/>
+        </p:nvSpPr>
+        <p:spPr bwMode="auto">
+          <a:xfrm>
+            <a:off x="2133600" y="0"/>
+            <a:ext cx="5105400" cy="461963"/>
+          </a:xfrm>
+          <a:prstGeom prst="rect">
+            <a:avLst/>
+          </a:prstGeom>
+          <a:noFill/>
+          <a:ln>
+            <a:noFill/>
+          </a:ln>
+          <a:extLst>
+            <a:ext uri="{909E8E84-426E-40DD-AFC4-6F175D3DCCD1}">
+              <a14:hiddenFill xmlns:a14="http://schemas.microsoft.com/office/drawing/2010/main">
+                <a:solidFill>
+                  <a:srgbClr val="FFFFFF"/>
+                </a:solidFill>
+              </a14:hiddenFill>
+            </a:ext>
+            <a:ext uri="{91240B29-F687-4F45-9708-019B960494DF}">
+              <a14:hiddenLine xmlns:a14="http://schemas.microsoft.com/office/drawing/2010/main" w="9525">
+                <a:solidFill>
+                  <a:srgbClr val="000000"/>
+                </a:solidFill>
+                <a:miter lim="800000"/>
+                <a:headEnd/>
+                <a:tailEnd/>
+              </a14:hiddenLine>
+            </a:ext>
+          </a:extLst>
+        </p:spPr>
+        <p:txBody>
+          <a:bodyPr>
+            <a:spAutoFit/>
+          </a:bodyPr>
+          <a:lstStyle/>
+          <a:p>
+            <a:pPr algn="ctr"/>
+            <a:r>
+              <a:rPr lang="en-US" sz="2400" b="1" dirty="0"/>
+              <a:t>C# 6. Null-Conditional Operator</a:t>
+            </a:r>
+            <a:endParaRPr lang="ru-RU" sz="2400" b="1" dirty="0"/>
+          </a:p>
+        </p:txBody>
+      </p:sp>
+      <p:sp>
+        <p:nvSpPr>
+          <p:cNvPr id="9219" name="TextBox 6"/>
+          <p:cNvSpPr txBox="1">
+            <a:spLocks noChangeArrowheads="1"/>
+          </p:cNvSpPr>
+          <p:nvPr/>
+        </p:nvSpPr>
+        <p:spPr bwMode="auto">
+          <a:xfrm>
+            <a:off x="152400" y="457200"/>
+            <a:ext cx="8839200" cy="830997"/>
+          </a:xfrm>
+          <a:prstGeom prst="rect">
+            <a:avLst/>
+          </a:prstGeom>
+          <a:noFill/>
+          <a:ln>
+            <a:noFill/>
+          </a:ln>
+          <a:extLst>
+            <a:ext uri="{909E8E84-426E-40DD-AFC4-6F175D3DCCD1}">
+              <a14:hiddenFill xmlns:a14="http://schemas.microsoft.com/office/drawing/2010/main">
+                <a:solidFill>
+                  <a:srgbClr val="FFFFFF"/>
+                </a:solidFill>
+              </a14:hiddenFill>
+            </a:ext>
+            <a:ext uri="{91240B29-F687-4F45-9708-019B960494DF}">
+              <a14:hiddenLine xmlns:a14="http://schemas.microsoft.com/office/drawing/2010/main" w="9525">
+                <a:solidFill>
+                  <a:srgbClr val="000000"/>
+                </a:solidFill>
+                <a:miter lim="800000"/>
+                <a:headEnd/>
+                <a:tailEnd/>
+              </a14:hiddenLine>
+            </a:ext>
+          </a:extLst>
+        </p:spPr>
+        <p:txBody>
+          <a:bodyPr>
+            <a:spAutoFit/>
+          </a:bodyPr>
+          <a:lstStyle>
+            <a:lvl1pPr defTabSz="358775" eaLnBrk="0" hangingPunct="0">
+              <a:defRPr>
+                <a:solidFill>
+                  <a:schemeClr val="tx1"/>
+                </a:solidFill>
+                <a:latin typeface="Arial" charset="0"/>
+              </a:defRPr>
+            </a:lvl1pPr>
+            <a:lvl2pPr marL="742950" indent="-285750" defTabSz="358775" eaLnBrk="0" hangingPunct="0">
+              <a:defRPr>
+                <a:solidFill>
+                  <a:schemeClr val="tx1"/>
+                </a:solidFill>
+                <a:latin typeface="Arial" charset="0"/>
+              </a:defRPr>
+            </a:lvl2pPr>
+            <a:lvl3pPr marL="1143000" indent="-228600" defTabSz="358775" eaLnBrk="0" hangingPunct="0">
+              <a:defRPr>
+                <a:solidFill>
+                  <a:schemeClr val="tx1"/>
+                </a:solidFill>
+                <a:latin typeface="Arial" charset="0"/>
+              </a:defRPr>
+            </a:lvl3pPr>
+            <a:lvl4pPr marL="1600200" indent="-228600" defTabSz="358775" eaLnBrk="0" hangingPunct="0">
+              <a:defRPr>
+                <a:solidFill>
+                  <a:schemeClr val="tx1"/>
+                </a:solidFill>
+                <a:latin typeface="Arial" charset="0"/>
+              </a:defRPr>
+            </a:lvl4pPr>
+            <a:lvl5pPr marL="2057400" indent="-228600" defTabSz="358775" eaLnBrk="0" hangingPunct="0">
+              <a:defRPr>
+                <a:solidFill>
+                  <a:schemeClr val="tx1"/>
+                </a:solidFill>
+                <a:latin typeface="Arial" charset="0"/>
+              </a:defRPr>
+            </a:lvl5pPr>
+            <a:lvl6pPr marL="2514600" indent="-228600" defTabSz="358775" eaLnBrk="0" fontAlgn="base" hangingPunct="0">
+              <a:spcBef>
+                <a:spcPct val="0"/>
+              </a:spcBef>
+              <a:spcAft>
+                <a:spcPct val="0"/>
+              </a:spcAft>
+              <a:defRPr>
+                <a:solidFill>
+                  <a:schemeClr val="tx1"/>
+                </a:solidFill>
+                <a:latin typeface="Arial" charset="0"/>
+              </a:defRPr>
+            </a:lvl6pPr>
+            <a:lvl7pPr marL="2971800" indent="-228600" defTabSz="358775" eaLnBrk="0" fontAlgn="base" hangingPunct="0">
+              <a:spcBef>
+                <a:spcPct val="0"/>
+              </a:spcBef>
+              <a:spcAft>
+                <a:spcPct val="0"/>
+              </a:spcAft>
+              <a:defRPr>
+                <a:solidFill>
+                  <a:schemeClr val="tx1"/>
+                </a:solidFill>
+                <a:latin typeface="Arial" charset="0"/>
+              </a:defRPr>
+            </a:lvl7pPr>
+            <a:lvl8pPr marL="3429000" indent="-228600" defTabSz="358775" eaLnBrk="0" fontAlgn="base" hangingPunct="0">
+              <a:spcBef>
+                <a:spcPct val="0"/>
+              </a:spcBef>
+              <a:spcAft>
+                <a:spcPct val="0"/>
+              </a:spcAft>
+              <a:defRPr>
+                <a:solidFill>
+                  <a:schemeClr val="tx1"/>
+                </a:solidFill>
+                <a:latin typeface="Arial" charset="0"/>
+              </a:defRPr>
+            </a:lvl8pPr>
+            <a:lvl9pPr marL="3886200" indent="-228600" defTabSz="358775" eaLnBrk="0" fontAlgn="base" hangingPunct="0">
+              <a:spcBef>
+                <a:spcPct val="0"/>
+              </a:spcBef>
+              <a:spcAft>
+                <a:spcPct val="0"/>
+              </a:spcAft>
+              <a:defRPr>
+                <a:solidFill>
+                  <a:schemeClr val="tx1"/>
+                </a:solidFill>
+                <a:latin typeface="Arial" charset="0"/>
+              </a:defRPr>
+            </a:lvl9pPr>
+          </a:lstStyle>
+          <a:p>
+            <a:pPr eaLnBrk="1" hangingPunct="1"/>
+            <a:r>
+              <a:rPr lang="en-US" sz="1600" dirty="0" err="1" smtClean="0"/>
+              <a:t>eventName</a:t>
+            </a:r>
+            <a:r>
+              <a:rPr lang="en-US" sz="1600" dirty="0" smtClean="0"/>
+              <a:t>?.Invoke()</a:t>
+            </a:r>
+            <a:endParaRPr lang="ru-RU" sz="1600" dirty="0" smtClean="0"/>
+          </a:p>
+          <a:p>
+            <a:pPr eaLnBrk="1" hangingPunct="1"/>
+            <a:endParaRPr lang="en-US" sz="1600" dirty="0" smtClean="0">
+              <a:hlinkClick r:id="rId2"/>
+            </a:endParaRPr>
+          </a:p>
+          <a:p>
+            <a:pPr eaLnBrk="1" hangingPunct="1"/>
+            <a:r>
+              <a:rPr lang="en-US" sz="1600" dirty="0" smtClean="0">
+                <a:hlinkClick r:id="rId2"/>
+              </a:rPr>
+              <a:t>http</a:t>
+            </a:r>
+            <a:r>
+              <a:rPr lang="en-US" sz="1600" dirty="0">
+                <a:hlinkClick r:id="rId2"/>
+              </a:rPr>
+              <a:t>://</a:t>
+            </a:r>
+            <a:r>
+              <a:rPr lang="en-US" sz="1600" dirty="0" smtClean="0">
+                <a:hlinkClick r:id="rId2"/>
+              </a:rPr>
+              <a:t>msdn.microsoft.com/en-us/magazine/dn802602.aspx</a:t>
+            </a:r>
+            <a:endParaRPr lang="ru-RU" sz="1600" dirty="0"/>
+          </a:p>
+        </p:txBody>
+      </p:sp>
+    </p:spTree>
+    <p:extLst>
+      <p:ext uri="{BB962C8B-B14F-4D97-AF65-F5344CB8AC3E}">
+        <p14:creationId xmlns:p14="http://schemas.microsoft.com/office/powerpoint/2010/main" val="1203268294"/>
+      </p:ext>
+    </p:extLst>
+  </p:cSld>
+  <p:clrMapOvr>
+    <a:masterClrMapping/>
+  </p:clrMapOvr>
+  <mc:AlternateContent xmlns:mc="http://schemas.openxmlformats.org/markup-compatibility/2006">
+    <mc:Choice xmlns:p14="http://schemas.microsoft.com/office/powerpoint/2010/main" Requires="p14">
+      <p:transition spd="slow" p14:dur="2000"/>
+    </mc:Choice>
+    <mc:Fallback>
+      <p:transition spd="slow"/>
+    </mc:Fallback>
+  </mc:AlternateContent>
+  <p:timing>
+    <p:tnLst>
+      <p:par>
+        <p:cTn id="1" dur="indefinite" restart="never" nodeType="tmRoot"/>
+      </p:par>
+    </p:tnLst>
+  </p:timing>
+</p:sld>
+</file>
+
+<file path=ppt/slides/slide11.xml><?xml version="1.0" encoding="utf-8"?>
 <p:sld xmlns:a="http://schemas.openxmlformats.org/drawingml/2006/main" xmlns:r="http://schemas.openxmlformats.org/officeDocument/2006/relationships" xmlns:p="http://schemas.openxmlformats.org/presentationml/2006/main">
   <p:cSld>
     <p:bg>
@@ -4630,7 +4923,7 @@
 </p:sld>
 </file>
 
-<file path=ppt/slides/slide11.xml><?xml version="1.0" encoding="utf-8"?>
+<file path=ppt/slides/slide12.xml><?xml version="1.0" encoding="utf-8"?>
 <p:sld xmlns:a="http://schemas.openxmlformats.org/drawingml/2006/main" xmlns:r="http://schemas.openxmlformats.org/officeDocument/2006/relationships" xmlns:p="http://schemas.openxmlformats.org/presentationml/2006/main">
   <p:cSld>
     <p:bg>
@@ -5436,886 +5729,6 @@
     <p:extLst>
       <p:ext uri="{BB962C8B-B14F-4D97-AF65-F5344CB8AC3E}">
         <p14:creationId xmlns:p14="http://schemas.microsoft.com/office/powerpoint/2010/main" val="872955865"/>
-      </p:ext>
-    </p:extLst>
-  </p:cSld>
-  <p:clrMapOvr>
-    <a:masterClrMapping/>
-  </p:clrMapOvr>
-  <p:timing>
-    <p:tnLst>
-      <p:par>
-        <p:cTn id="1" dur="indefinite" restart="never" nodeType="tmRoot"/>
-      </p:par>
-    </p:tnLst>
-  </p:timing>
-</p:sld>
-</file>
-
-<file path=ppt/slides/slide12.xml><?xml version="1.0" encoding="utf-8"?>
-<p:sld xmlns:a="http://schemas.openxmlformats.org/drawingml/2006/main" xmlns:r="http://schemas.openxmlformats.org/officeDocument/2006/relationships" xmlns:p="http://schemas.openxmlformats.org/presentationml/2006/main">
-  <p:cSld>
-    <p:bg>
-      <p:bgPr>
-        <a:blipFill dpi="0" rotWithShape="1">
-          <a:blip r:embed="rId2">
-            <a:lum/>
-          </a:blip>
-          <a:srcRect/>
-          <a:stretch>
-            <a:fillRect/>
-          </a:stretch>
-        </a:blipFill>
-        <a:effectLst/>
-      </p:bgPr>
-    </p:bg>
-    <p:spTree>
-      <p:nvGrpSpPr>
-        <p:cNvPr id="1" name=""/>
-        <p:cNvGrpSpPr/>
-        <p:nvPr/>
-      </p:nvGrpSpPr>
-      <p:grpSpPr>
-        <a:xfrm>
-          <a:off x="0" y="0"/>
-          <a:ext cx="0" cy="0"/>
-          <a:chOff x="0" y="0"/>
-          <a:chExt cx="0" cy="0"/>
-        </a:xfrm>
-      </p:grpSpPr>
-      <p:sp>
-        <p:nvSpPr>
-          <p:cNvPr id="12290" name="Прямоугольник 2"/>
-          <p:cNvSpPr>
-            <a:spLocks noChangeArrowheads="1"/>
-          </p:cNvSpPr>
-          <p:nvPr/>
-        </p:nvSpPr>
-        <p:spPr bwMode="auto">
-          <a:xfrm>
-            <a:off x="228600" y="0"/>
-            <a:ext cx="8686800" cy="461665"/>
-          </a:xfrm>
-          <a:prstGeom prst="rect">
-            <a:avLst/>
-          </a:prstGeom>
-          <a:noFill/>
-          <a:ln>
-            <a:noFill/>
-          </a:ln>
-          <a:extLst>
-            <a:ext uri="{909E8E84-426E-40DD-AFC4-6F175D3DCCD1}">
-              <a14:hiddenFill xmlns:a14="http://schemas.microsoft.com/office/drawing/2010/main">
-                <a:solidFill>
-                  <a:srgbClr val="FFFFFF"/>
-                </a:solidFill>
-              </a14:hiddenFill>
-            </a:ext>
-            <a:ext uri="{91240B29-F687-4F45-9708-019B960494DF}">
-              <a14:hiddenLine xmlns:a14="http://schemas.microsoft.com/office/drawing/2010/main" w="9525">
-                <a:solidFill>
-                  <a:srgbClr val="000000"/>
-                </a:solidFill>
-                <a:miter lim="800000"/>
-                <a:headEnd/>
-                <a:tailEnd/>
-              </a14:hiddenLine>
-            </a:ext>
-          </a:extLst>
-        </p:spPr>
-        <p:txBody>
-          <a:bodyPr wrap="square">
-            <a:spAutoFit/>
-          </a:bodyPr>
-          <a:lstStyle/>
-          <a:p>
-            <a:pPr algn="ctr"/>
-            <a:r>
-              <a:rPr lang="ru-RU" sz="2400" b="1" dirty="0" smtClean="0"/>
-              <a:t>Делегаты </a:t>
-            </a:r>
-            <a:r>
-              <a:rPr lang="en-US" sz="2400" b="1" dirty="0" err="1" smtClean="0"/>
-              <a:t>System.Action</a:t>
-            </a:r>
-            <a:r>
-              <a:rPr lang="en-US" sz="2400" b="1" dirty="0" smtClean="0"/>
-              <a:t> </a:t>
-            </a:r>
-            <a:r>
-              <a:rPr lang="ru-RU" sz="2400" b="1" dirty="0" smtClean="0"/>
-              <a:t>и </a:t>
-            </a:r>
-            <a:r>
-              <a:rPr lang="en-US" sz="2400" b="1" dirty="0" err="1" smtClean="0"/>
-              <a:t>System.Func</a:t>
-            </a:r>
-            <a:endParaRPr lang="ru-RU" sz="2400" b="1" dirty="0"/>
-          </a:p>
-        </p:txBody>
-      </p:sp>
-      <p:sp>
-        <p:nvSpPr>
-          <p:cNvPr id="12291" name="TextBox 6"/>
-          <p:cNvSpPr txBox="1">
-            <a:spLocks noChangeArrowheads="1"/>
-          </p:cNvSpPr>
-          <p:nvPr/>
-        </p:nvSpPr>
-        <p:spPr bwMode="auto">
-          <a:xfrm>
-            <a:off x="152400" y="1002828"/>
-            <a:ext cx="8839200" cy="5016758"/>
-          </a:xfrm>
-          <a:prstGeom prst="rect">
-            <a:avLst/>
-          </a:prstGeom>
-          <a:noFill/>
-          <a:ln>
-            <a:noFill/>
-          </a:ln>
-          <a:extLst>
-            <a:ext uri="{909E8E84-426E-40DD-AFC4-6F175D3DCCD1}">
-              <a14:hiddenFill xmlns:a14="http://schemas.microsoft.com/office/drawing/2010/main">
-                <a:solidFill>
-                  <a:srgbClr val="FFFFFF"/>
-                </a:solidFill>
-              </a14:hiddenFill>
-            </a:ext>
-            <a:ext uri="{91240B29-F687-4F45-9708-019B960494DF}">
-              <a14:hiddenLine xmlns:a14="http://schemas.microsoft.com/office/drawing/2010/main" w="9525">
-                <a:solidFill>
-                  <a:srgbClr val="000000"/>
-                </a:solidFill>
-                <a:miter lim="800000"/>
-                <a:headEnd/>
-                <a:tailEnd/>
-              </a14:hiddenLine>
-            </a:ext>
-          </a:extLst>
-        </p:spPr>
-        <p:txBody>
-          <a:bodyPr>
-            <a:spAutoFit/>
-          </a:bodyPr>
-          <a:lstStyle>
-            <a:lvl1pPr defTabSz="358775" eaLnBrk="0" hangingPunct="0">
-              <a:defRPr>
-                <a:solidFill>
-                  <a:schemeClr val="tx1"/>
-                </a:solidFill>
-                <a:latin typeface="Arial" charset="0"/>
-              </a:defRPr>
-            </a:lvl1pPr>
-            <a:lvl2pPr marL="742950" indent="-285750" defTabSz="358775" eaLnBrk="0" hangingPunct="0">
-              <a:defRPr>
-                <a:solidFill>
-                  <a:schemeClr val="tx1"/>
-                </a:solidFill>
-                <a:latin typeface="Arial" charset="0"/>
-              </a:defRPr>
-            </a:lvl2pPr>
-            <a:lvl3pPr marL="1143000" indent="-228600" defTabSz="358775" eaLnBrk="0" hangingPunct="0">
-              <a:defRPr>
-                <a:solidFill>
-                  <a:schemeClr val="tx1"/>
-                </a:solidFill>
-                <a:latin typeface="Arial" charset="0"/>
-              </a:defRPr>
-            </a:lvl3pPr>
-            <a:lvl4pPr marL="1600200" indent="-228600" defTabSz="358775" eaLnBrk="0" hangingPunct="0">
-              <a:defRPr>
-                <a:solidFill>
-                  <a:schemeClr val="tx1"/>
-                </a:solidFill>
-                <a:latin typeface="Arial" charset="0"/>
-              </a:defRPr>
-            </a:lvl4pPr>
-            <a:lvl5pPr marL="2057400" indent="-228600" defTabSz="358775" eaLnBrk="0" hangingPunct="0">
-              <a:defRPr>
-                <a:solidFill>
-                  <a:schemeClr val="tx1"/>
-                </a:solidFill>
-                <a:latin typeface="Arial" charset="0"/>
-              </a:defRPr>
-            </a:lvl5pPr>
-            <a:lvl6pPr marL="2514600" indent="-228600" defTabSz="358775" eaLnBrk="0" fontAlgn="base" hangingPunct="0">
-              <a:spcBef>
-                <a:spcPct val="0"/>
-              </a:spcBef>
-              <a:spcAft>
-                <a:spcPct val="0"/>
-              </a:spcAft>
-              <a:defRPr>
-                <a:solidFill>
-                  <a:schemeClr val="tx1"/>
-                </a:solidFill>
-                <a:latin typeface="Arial" charset="0"/>
-              </a:defRPr>
-            </a:lvl6pPr>
-            <a:lvl7pPr marL="2971800" indent="-228600" defTabSz="358775" eaLnBrk="0" fontAlgn="base" hangingPunct="0">
-              <a:spcBef>
-                <a:spcPct val="0"/>
-              </a:spcBef>
-              <a:spcAft>
-                <a:spcPct val="0"/>
-              </a:spcAft>
-              <a:defRPr>
-                <a:solidFill>
-                  <a:schemeClr val="tx1"/>
-                </a:solidFill>
-                <a:latin typeface="Arial" charset="0"/>
-              </a:defRPr>
-            </a:lvl7pPr>
-            <a:lvl8pPr marL="3429000" indent="-228600" defTabSz="358775" eaLnBrk="0" fontAlgn="base" hangingPunct="0">
-              <a:spcBef>
-                <a:spcPct val="0"/>
-              </a:spcBef>
-              <a:spcAft>
-                <a:spcPct val="0"/>
-              </a:spcAft>
-              <a:defRPr>
-                <a:solidFill>
-                  <a:schemeClr val="tx1"/>
-                </a:solidFill>
-                <a:latin typeface="Arial" charset="0"/>
-              </a:defRPr>
-            </a:lvl8pPr>
-            <a:lvl9pPr marL="3886200" indent="-228600" defTabSz="358775" eaLnBrk="0" fontAlgn="base" hangingPunct="0">
-              <a:spcBef>
-                <a:spcPct val="0"/>
-              </a:spcBef>
-              <a:spcAft>
-                <a:spcPct val="0"/>
-              </a:spcAft>
-              <a:defRPr>
-                <a:solidFill>
-                  <a:schemeClr val="tx1"/>
-                </a:solidFill>
-                <a:latin typeface="Arial" charset="0"/>
-              </a:defRPr>
-            </a:lvl9pPr>
-          </a:lstStyle>
-          <a:p>
-            <a:pPr marL="285750" indent="-285750" eaLnBrk="1" hangingPunct="1">
-              <a:buFont typeface="Arial" panose="020B0604020202020204" pitchFamily="34" charset="0"/>
-              <a:buChar char="•"/>
-            </a:pPr>
-            <a:r>
-              <a:rPr lang="ru-RU" sz="1600" dirty="0" smtClean="0">
-                <a:solidFill>
-                  <a:schemeClr val="bg1"/>
-                </a:solidFill>
-              </a:rPr>
-              <a:t>Делегат</a:t>
-            </a:r>
-            <a:r>
-              <a:rPr lang="ru-RU" sz="1600" dirty="0">
-                <a:solidFill>
-                  <a:schemeClr val="bg1"/>
-                </a:solidFill>
-              </a:rPr>
-              <a:t>ы</a:t>
-            </a:r>
-            <a:r>
-              <a:rPr lang="ru-RU" sz="1600" dirty="0" smtClean="0">
-                <a:solidFill>
-                  <a:schemeClr val="bg1"/>
-                </a:solidFill>
-              </a:rPr>
-              <a:t> </a:t>
-            </a:r>
-            <a:r>
-              <a:rPr lang="en-US" sz="1600" dirty="0" err="1" smtClean="0">
-                <a:solidFill>
-                  <a:schemeClr val="bg1"/>
-                </a:solidFill>
-              </a:rPr>
-              <a:t>System.Action</a:t>
-            </a:r>
-            <a:r>
-              <a:rPr lang="en-US" sz="1600" dirty="0" smtClean="0">
-                <a:solidFill>
-                  <a:schemeClr val="bg1"/>
-                </a:solidFill>
-              </a:rPr>
-              <a:t> </a:t>
-            </a:r>
-            <a:r>
-              <a:rPr lang="ru-RU" sz="1600" dirty="0" smtClean="0">
-                <a:solidFill>
-                  <a:schemeClr val="bg1"/>
-                </a:solidFill>
-              </a:rPr>
-              <a:t>описывают </a:t>
-            </a:r>
-            <a:r>
-              <a:rPr lang="ru-RU" sz="1600" dirty="0" smtClean="0">
-                <a:solidFill>
-                  <a:schemeClr val="bg1"/>
-                </a:solidFill>
-              </a:rPr>
-              <a:t>функцию без возвращаемого </a:t>
-            </a:r>
-            <a:r>
-              <a:rPr lang="ru-RU" sz="1600" dirty="0" smtClean="0">
-                <a:solidFill>
-                  <a:schemeClr val="bg1"/>
-                </a:solidFill>
-              </a:rPr>
-              <a:t>значения </a:t>
-            </a:r>
-            <a:r>
-              <a:rPr lang="ru-RU" sz="1600" dirty="0" smtClean="0">
-                <a:solidFill>
-                  <a:schemeClr val="bg1"/>
-                </a:solidFill>
-              </a:rPr>
-              <a:t>с количеством аргументов от 0 до 16.</a:t>
-            </a:r>
-          </a:p>
-          <a:p>
-            <a:pPr marL="1028700" lvl="1" eaLnBrk="1" hangingPunct="1">
-              <a:buFont typeface="Arial" panose="020B0604020202020204" pitchFamily="34" charset="0"/>
-              <a:buChar char="•"/>
-            </a:pPr>
-            <a:r>
-              <a:rPr lang="en-US" sz="1600" dirty="0" smtClean="0">
-                <a:solidFill>
-                  <a:schemeClr val="bg1"/>
-                </a:solidFill>
-              </a:rPr>
-              <a:t>Action</a:t>
-            </a:r>
-          </a:p>
-          <a:p>
-            <a:pPr marL="1028700" lvl="1" eaLnBrk="1" hangingPunct="1">
-              <a:buFont typeface="Arial" panose="020B0604020202020204" pitchFamily="34" charset="0"/>
-              <a:buChar char="•"/>
-            </a:pPr>
-            <a:r>
-              <a:rPr lang="en-US" sz="1600" dirty="0" smtClean="0">
-                <a:solidFill>
-                  <a:schemeClr val="bg1"/>
-                </a:solidFill>
-              </a:rPr>
-              <a:t>Action&lt;T&gt;</a:t>
-            </a:r>
-          </a:p>
-          <a:p>
-            <a:pPr marL="1028700" lvl="1" eaLnBrk="1" hangingPunct="1">
-              <a:buFont typeface="Arial" panose="020B0604020202020204" pitchFamily="34" charset="0"/>
-              <a:buChar char="•"/>
-            </a:pPr>
-            <a:r>
-              <a:rPr lang="en-US" sz="1600" dirty="0" smtClean="0">
-                <a:solidFill>
-                  <a:schemeClr val="bg1"/>
-                </a:solidFill>
-              </a:rPr>
-              <a:t>Action&lt;T1, T2&gt;</a:t>
-            </a:r>
-          </a:p>
-          <a:p>
-            <a:pPr marL="1028700" lvl="1" eaLnBrk="1" hangingPunct="1">
-              <a:buFont typeface="Arial" panose="020B0604020202020204" pitchFamily="34" charset="0"/>
-              <a:buChar char="•"/>
-            </a:pPr>
-            <a:r>
-              <a:rPr lang="en-US" sz="1600" dirty="0">
-                <a:solidFill>
-                  <a:schemeClr val="bg1"/>
-                </a:solidFill>
-              </a:rPr>
-              <a:t>Action&lt;T1, </a:t>
-            </a:r>
-            <a:r>
-              <a:rPr lang="en-US" sz="1600" dirty="0" smtClean="0">
-                <a:solidFill>
-                  <a:schemeClr val="bg1"/>
-                </a:solidFill>
-              </a:rPr>
-              <a:t>T2, T3&gt;</a:t>
-            </a:r>
-          </a:p>
-          <a:p>
-            <a:pPr marL="1028700" lvl="1" eaLnBrk="1" hangingPunct="1">
-              <a:buFont typeface="Arial" panose="020B0604020202020204" pitchFamily="34" charset="0"/>
-              <a:buChar char="•"/>
-            </a:pPr>
-            <a:r>
-              <a:rPr lang="en-US" sz="1600" dirty="0" smtClean="0">
-                <a:solidFill>
-                  <a:schemeClr val="bg1"/>
-                </a:solidFill>
-              </a:rPr>
-              <a:t>…</a:t>
-            </a:r>
-          </a:p>
-          <a:p>
-            <a:pPr marL="1028700" lvl="1" eaLnBrk="1" hangingPunct="1">
-              <a:buFont typeface="Arial" panose="020B0604020202020204" pitchFamily="34" charset="0"/>
-              <a:buChar char="•"/>
-            </a:pPr>
-            <a:r>
-              <a:rPr lang="en-US" sz="1600" dirty="0">
-                <a:solidFill>
-                  <a:schemeClr val="bg1"/>
-                </a:solidFill>
-              </a:rPr>
-              <a:t>Action&lt;T1, T2, </a:t>
-            </a:r>
-            <a:r>
-              <a:rPr lang="en-US" sz="1600" dirty="0" smtClean="0">
-                <a:solidFill>
-                  <a:schemeClr val="bg1"/>
-                </a:solidFill>
-              </a:rPr>
-              <a:t>T3, T4, T5, T6, T7, T8, T9, T10, T11, T12, T13, T14, T15, T16&gt;</a:t>
-            </a:r>
-          </a:p>
-          <a:p>
-            <a:pPr marL="285750" indent="-285750" eaLnBrk="1" hangingPunct="1">
-              <a:buFont typeface="Arial" panose="020B0604020202020204" pitchFamily="34" charset="0"/>
-              <a:buChar char="•"/>
-            </a:pPr>
-            <a:r>
-              <a:rPr lang="ru-RU" sz="1600" dirty="0" smtClean="0">
-                <a:solidFill>
-                  <a:schemeClr val="bg1"/>
-                </a:solidFill>
-              </a:rPr>
-              <a:t>Делегаты </a:t>
-            </a:r>
-            <a:r>
-              <a:rPr lang="en-US" sz="1600" dirty="0" err="1" smtClean="0">
-                <a:solidFill>
-                  <a:schemeClr val="bg1"/>
-                </a:solidFill>
-              </a:rPr>
-              <a:t>System.Func</a:t>
-            </a:r>
-            <a:r>
-              <a:rPr lang="en-US" sz="1600" dirty="0" smtClean="0">
-                <a:solidFill>
-                  <a:schemeClr val="bg1"/>
-                </a:solidFill>
-              </a:rPr>
-              <a:t> </a:t>
-            </a:r>
-            <a:r>
-              <a:rPr lang="ru-RU" sz="1600" dirty="0" smtClean="0">
-                <a:solidFill>
-                  <a:schemeClr val="bg1"/>
-                </a:solidFill>
-              </a:rPr>
-              <a:t>описывают </a:t>
-            </a:r>
-            <a:r>
-              <a:rPr lang="ru-RU" sz="1600" dirty="0">
-                <a:solidFill>
-                  <a:schemeClr val="bg1"/>
-                </a:solidFill>
-              </a:rPr>
-              <a:t>функцию </a:t>
-            </a:r>
-            <a:r>
-              <a:rPr lang="ru-RU" sz="1600" dirty="0" smtClean="0">
-                <a:solidFill>
-                  <a:schemeClr val="bg1"/>
-                </a:solidFill>
-              </a:rPr>
-              <a:t>с возвращаемым значением с количеством </a:t>
-            </a:r>
-            <a:r>
-              <a:rPr lang="ru-RU" sz="1600" dirty="0">
-                <a:solidFill>
-                  <a:schemeClr val="bg1"/>
-                </a:solidFill>
-              </a:rPr>
-              <a:t>аргументов от 0 до </a:t>
-            </a:r>
-            <a:r>
-              <a:rPr lang="ru-RU" sz="1600" dirty="0" smtClean="0">
-                <a:solidFill>
-                  <a:schemeClr val="bg1"/>
-                </a:solidFill>
-              </a:rPr>
-              <a:t>16.</a:t>
-            </a:r>
-            <a:endParaRPr lang="en-US" sz="1600" dirty="0" smtClean="0">
-              <a:solidFill>
-                <a:schemeClr val="bg1"/>
-              </a:solidFill>
-            </a:endParaRPr>
-          </a:p>
-          <a:p>
-            <a:pPr marL="1028700" lvl="1" eaLnBrk="1" hangingPunct="1">
-              <a:buFont typeface="Arial" panose="020B0604020202020204" pitchFamily="34" charset="0"/>
-              <a:buChar char="•"/>
-            </a:pPr>
-            <a:r>
-              <a:rPr lang="en-US" sz="1600" dirty="0" err="1" smtClean="0">
-                <a:solidFill>
-                  <a:schemeClr val="bg1"/>
-                </a:solidFill>
-              </a:rPr>
-              <a:t>Func</a:t>
-            </a:r>
-            <a:r>
-              <a:rPr lang="en-US" sz="1600" dirty="0" smtClean="0">
-                <a:solidFill>
-                  <a:schemeClr val="bg1"/>
-                </a:solidFill>
-              </a:rPr>
-              <a:t>&lt;</a:t>
-            </a:r>
-            <a:r>
-              <a:rPr lang="en-US" sz="1600" dirty="0" err="1" smtClean="0">
-                <a:solidFill>
-                  <a:schemeClr val="bg1"/>
-                </a:solidFill>
-              </a:rPr>
-              <a:t>TResult</a:t>
-            </a:r>
-            <a:r>
-              <a:rPr lang="en-US" sz="1600" dirty="0" smtClean="0">
-                <a:solidFill>
-                  <a:schemeClr val="bg1"/>
-                </a:solidFill>
-              </a:rPr>
-              <a:t>&gt;</a:t>
-            </a:r>
-            <a:endParaRPr lang="en-US" sz="1600" dirty="0">
-              <a:solidFill>
-                <a:schemeClr val="bg1"/>
-              </a:solidFill>
-            </a:endParaRPr>
-          </a:p>
-          <a:p>
-            <a:pPr marL="1028700" lvl="1" eaLnBrk="1" hangingPunct="1">
-              <a:buFont typeface="Arial" panose="020B0604020202020204" pitchFamily="34" charset="0"/>
-              <a:buChar char="•"/>
-            </a:pPr>
-            <a:r>
-              <a:rPr lang="en-US" sz="1600" dirty="0" err="1" smtClean="0">
-                <a:solidFill>
-                  <a:schemeClr val="bg1"/>
-                </a:solidFill>
-              </a:rPr>
-              <a:t>Func</a:t>
-            </a:r>
-            <a:r>
-              <a:rPr lang="en-US" sz="1600" dirty="0" smtClean="0">
-                <a:solidFill>
-                  <a:schemeClr val="bg1"/>
-                </a:solidFill>
-              </a:rPr>
-              <a:t>&lt;</a:t>
-            </a:r>
-            <a:r>
-              <a:rPr lang="en-US" sz="1600" dirty="0" err="1" smtClean="0">
-                <a:solidFill>
-                  <a:schemeClr val="bg1"/>
-                </a:solidFill>
-              </a:rPr>
-              <a:t>TResult</a:t>
-            </a:r>
-            <a:r>
-              <a:rPr lang="en-US" sz="1600" dirty="0" smtClean="0">
-                <a:solidFill>
-                  <a:schemeClr val="bg1"/>
-                </a:solidFill>
-              </a:rPr>
-              <a:t>, T</a:t>
-            </a:r>
-            <a:r>
-              <a:rPr lang="en-US" sz="1600" dirty="0">
-                <a:solidFill>
-                  <a:schemeClr val="bg1"/>
-                </a:solidFill>
-              </a:rPr>
-              <a:t>&gt;</a:t>
-            </a:r>
-          </a:p>
-          <a:p>
-            <a:pPr marL="1028700" lvl="1" eaLnBrk="1" hangingPunct="1">
-              <a:buFont typeface="Arial" panose="020B0604020202020204" pitchFamily="34" charset="0"/>
-              <a:buChar char="•"/>
-            </a:pPr>
-            <a:r>
-              <a:rPr lang="en-US" sz="1600" dirty="0" err="1" smtClean="0">
-                <a:solidFill>
-                  <a:schemeClr val="bg1"/>
-                </a:solidFill>
-              </a:rPr>
-              <a:t>Func</a:t>
-            </a:r>
-            <a:r>
-              <a:rPr lang="en-US" sz="1600" dirty="0" smtClean="0">
-                <a:solidFill>
-                  <a:schemeClr val="bg1"/>
-                </a:solidFill>
-              </a:rPr>
-              <a:t>&lt;</a:t>
-            </a:r>
-            <a:r>
-              <a:rPr lang="en-US" sz="1600" dirty="0" err="1">
-                <a:solidFill>
-                  <a:schemeClr val="bg1"/>
-                </a:solidFill>
-              </a:rPr>
-              <a:t>TResult</a:t>
-            </a:r>
-            <a:r>
-              <a:rPr lang="en-US" sz="1600" dirty="0">
-                <a:solidFill>
-                  <a:schemeClr val="bg1"/>
-                </a:solidFill>
-              </a:rPr>
-              <a:t>, </a:t>
-            </a:r>
-            <a:r>
-              <a:rPr lang="en-US" sz="1600" dirty="0" smtClean="0">
-                <a:solidFill>
-                  <a:schemeClr val="bg1"/>
-                </a:solidFill>
-              </a:rPr>
-              <a:t>T1</a:t>
-            </a:r>
-            <a:r>
-              <a:rPr lang="en-US" sz="1600" dirty="0">
-                <a:solidFill>
-                  <a:schemeClr val="bg1"/>
-                </a:solidFill>
-              </a:rPr>
-              <a:t>, T2&gt;</a:t>
-            </a:r>
-          </a:p>
-          <a:p>
-            <a:pPr marL="1028700" lvl="1" eaLnBrk="1" hangingPunct="1">
-              <a:buFont typeface="Arial" panose="020B0604020202020204" pitchFamily="34" charset="0"/>
-              <a:buChar char="•"/>
-            </a:pPr>
-            <a:r>
-              <a:rPr lang="en-US" sz="1600" dirty="0" err="1" smtClean="0">
-                <a:solidFill>
-                  <a:schemeClr val="bg1"/>
-                </a:solidFill>
-              </a:rPr>
-              <a:t>Func</a:t>
-            </a:r>
-            <a:r>
-              <a:rPr lang="en-US" sz="1600" dirty="0" smtClean="0">
-                <a:solidFill>
-                  <a:schemeClr val="bg1"/>
-                </a:solidFill>
-              </a:rPr>
-              <a:t>&lt;</a:t>
-            </a:r>
-            <a:r>
-              <a:rPr lang="en-US" sz="1600" dirty="0" err="1">
-                <a:solidFill>
-                  <a:schemeClr val="bg1"/>
-                </a:solidFill>
-              </a:rPr>
-              <a:t>TResult</a:t>
-            </a:r>
-            <a:r>
-              <a:rPr lang="en-US" sz="1600" dirty="0">
-                <a:solidFill>
-                  <a:schemeClr val="bg1"/>
-                </a:solidFill>
-              </a:rPr>
-              <a:t>, </a:t>
-            </a:r>
-            <a:r>
-              <a:rPr lang="en-US" sz="1600" dirty="0" smtClean="0">
-                <a:solidFill>
-                  <a:schemeClr val="bg1"/>
-                </a:solidFill>
-              </a:rPr>
-              <a:t>T1</a:t>
-            </a:r>
-            <a:r>
-              <a:rPr lang="en-US" sz="1600" dirty="0">
-                <a:solidFill>
-                  <a:schemeClr val="bg1"/>
-                </a:solidFill>
-              </a:rPr>
-              <a:t>, T2, T3&gt;</a:t>
-            </a:r>
-          </a:p>
-          <a:p>
-            <a:pPr marL="1028700" lvl="1" eaLnBrk="1" hangingPunct="1">
-              <a:buFont typeface="Arial" panose="020B0604020202020204" pitchFamily="34" charset="0"/>
-              <a:buChar char="•"/>
-            </a:pPr>
-            <a:r>
-              <a:rPr lang="en-US" sz="1600" dirty="0">
-                <a:solidFill>
-                  <a:schemeClr val="bg1"/>
-                </a:solidFill>
-              </a:rPr>
-              <a:t>…</a:t>
-            </a:r>
-          </a:p>
-          <a:p>
-            <a:pPr marL="1028700" lvl="1" eaLnBrk="1" hangingPunct="1">
-              <a:buFont typeface="Arial" panose="020B0604020202020204" pitchFamily="34" charset="0"/>
-              <a:buChar char="•"/>
-            </a:pPr>
-            <a:r>
-              <a:rPr lang="en-US" sz="1600" dirty="0" err="1" smtClean="0">
-                <a:solidFill>
-                  <a:schemeClr val="bg1"/>
-                </a:solidFill>
-              </a:rPr>
-              <a:t>Func</a:t>
-            </a:r>
-            <a:r>
-              <a:rPr lang="en-US" sz="1600" dirty="0" smtClean="0">
-                <a:solidFill>
-                  <a:schemeClr val="bg1"/>
-                </a:solidFill>
-              </a:rPr>
-              <a:t>&lt;</a:t>
-            </a:r>
-            <a:r>
-              <a:rPr lang="en-US" sz="1600" dirty="0" err="1">
-                <a:solidFill>
-                  <a:schemeClr val="bg1"/>
-                </a:solidFill>
-              </a:rPr>
-              <a:t>TResult</a:t>
-            </a:r>
-            <a:r>
-              <a:rPr lang="en-US" sz="1600" dirty="0">
-                <a:solidFill>
-                  <a:schemeClr val="bg1"/>
-                </a:solidFill>
-              </a:rPr>
-              <a:t>, </a:t>
-            </a:r>
-            <a:r>
-              <a:rPr lang="en-US" sz="1600" dirty="0" smtClean="0">
-                <a:solidFill>
-                  <a:schemeClr val="bg1"/>
-                </a:solidFill>
-              </a:rPr>
-              <a:t>T1</a:t>
-            </a:r>
-            <a:r>
-              <a:rPr lang="en-US" sz="1600" dirty="0">
-                <a:solidFill>
-                  <a:schemeClr val="bg1"/>
-                </a:solidFill>
-              </a:rPr>
-              <a:t>, T2, T3, T4, T5, T6, T7, T8, T9, T10, T11, T12, T13, T14, T15, </a:t>
-            </a:r>
-            <a:r>
-              <a:rPr lang="en-US" sz="1600" dirty="0" smtClean="0">
-                <a:solidFill>
-                  <a:schemeClr val="bg1"/>
-                </a:solidFill>
-              </a:rPr>
-              <a:t>T16&gt;</a:t>
-            </a:r>
-          </a:p>
-          <a:p>
-            <a:pPr marL="285750" eaLnBrk="1" hangingPunct="1"/>
-            <a:endParaRPr lang="en-US" sz="1600" dirty="0">
-              <a:solidFill>
-                <a:schemeClr val="bg1"/>
-              </a:solidFill>
-            </a:endParaRPr>
-          </a:p>
-          <a:p>
-            <a:pPr eaLnBrk="1" hangingPunct="1"/>
-            <a:r>
-              <a:rPr lang="ru-RU" sz="1600" dirty="0" smtClean="0">
-                <a:solidFill>
-                  <a:schemeClr val="bg1"/>
-                </a:solidFill>
-              </a:rPr>
-              <a:t>Где </a:t>
-            </a:r>
-            <a:r>
-              <a:rPr lang="en-US" sz="1600" dirty="0" smtClean="0">
-                <a:solidFill>
-                  <a:schemeClr val="bg1"/>
-                </a:solidFill>
-              </a:rPr>
-              <a:t>T1, T2, ,,, T16 </a:t>
-            </a:r>
-            <a:r>
-              <a:rPr lang="ru-RU" sz="1600" dirty="0" smtClean="0">
-                <a:solidFill>
-                  <a:schemeClr val="bg1"/>
-                </a:solidFill>
-              </a:rPr>
-              <a:t>– тип аргумента, </a:t>
-            </a:r>
-            <a:r>
-              <a:rPr lang="en-US" sz="1600" smtClean="0">
-                <a:solidFill>
-                  <a:schemeClr val="bg1"/>
-                </a:solidFill>
-              </a:rPr>
-              <a:t>T</a:t>
-            </a:r>
-            <a:r>
-              <a:rPr lang="en-US" sz="1600">
-                <a:solidFill>
-                  <a:schemeClr val="bg1"/>
-                </a:solidFill>
-              </a:rPr>
-              <a:t>R</a:t>
-            </a:r>
-            <a:r>
-              <a:rPr lang="en-US" sz="1600" smtClean="0">
-                <a:solidFill>
-                  <a:schemeClr val="bg1"/>
-                </a:solidFill>
-              </a:rPr>
-              <a:t>esult</a:t>
-            </a:r>
-            <a:r>
-              <a:rPr lang="en-US" sz="1600" dirty="0" smtClean="0">
-                <a:solidFill>
-                  <a:schemeClr val="bg1"/>
-                </a:solidFill>
-              </a:rPr>
-              <a:t> </a:t>
-            </a:r>
-            <a:r>
-              <a:rPr lang="ru-RU" sz="1600" dirty="0" smtClean="0">
-                <a:solidFill>
-                  <a:schemeClr val="bg1"/>
-                </a:solidFill>
-              </a:rPr>
-              <a:t>тип возвращаемого значения.</a:t>
-            </a:r>
-            <a:endParaRPr lang="ru-RU" sz="1600" dirty="0">
-              <a:solidFill>
-                <a:schemeClr val="bg1"/>
-              </a:solidFill>
-            </a:endParaRPr>
-          </a:p>
-          <a:p>
-            <a:pPr eaLnBrk="1" hangingPunct="1"/>
-            <a:endParaRPr lang="ru-RU" sz="1600" dirty="0">
-              <a:solidFill>
-                <a:schemeClr val="bg1"/>
-              </a:solidFill>
-            </a:endParaRPr>
-          </a:p>
-        </p:txBody>
-      </p:sp>
-    </p:spTree>
-    <p:extLst>
-      <p:ext uri="{BB962C8B-B14F-4D97-AF65-F5344CB8AC3E}">
-        <p14:creationId xmlns:p14="http://schemas.microsoft.com/office/powerpoint/2010/main" val="1894118169"/>
       </p:ext>
     </p:extLst>
   </p:cSld>
@@ -6374,6 +5787,862 @@
         <p:spPr bwMode="auto">
           <a:xfrm>
             <a:off x="228600" y="0"/>
+            <a:ext cx="8686800" cy="461665"/>
+          </a:xfrm>
+          <a:prstGeom prst="rect">
+            <a:avLst/>
+          </a:prstGeom>
+          <a:noFill/>
+          <a:ln>
+            <a:noFill/>
+          </a:ln>
+          <a:extLst>
+            <a:ext uri="{909E8E84-426E-40DD-AFC4-6F175D3DCCD1}">
+              <a14:hiddenFill xmlns:a14="http://schemas.microsoft.com/office/drawing/2010/main">
+                <a:solidFill>
+                  <a:srgbClr val="FFFFFF"/>
+                </a:solidFill>
+              </a14:hiddenFill>
+            </a:ext>
+            <a:ext uri="{91240B29-F687-4F45-9708-019B960494DF}">
+              <a14:hiddenLine xmlns:a14="http://schemas.microsoft.com/office/drawing/2010/main" w="9525">
+                <a:solidFill>
+                  <a:srgbClr val="000000"/>
+                </a:solidFill>
+                <a:miter lim="800000"/>
+                <a:headEnd/>
+                <a:tailEnd/>
+              </a14:hiddenLine>
+            </a:ext>
+          </a:extLst>
+        </p:spPr>
+        <p:txBody>
+          <a:bodyPr wrap="square">
+            <a:spAutoFit/>
+          </a:bodyPr>
+          <a:lstStyle/>
+          <a:p>
+            <a:pPr algn="ctr"/>
+            <a:r>
+              <a:rPr lang="ru-RU" sz="2400" b="1" dirty="0" smtClean="0"/>
+              <a:t>Делегаты </a:t>
+            </a:r>
+            <a:r>
+              <a:rPr lang="en-US" sz="2400" b="1" dirty="0" err="1" smtClean="0"/>
+              <a:t>System.Action</a:t>
+            </a:r>
+            <a:r>
+              <a:rPr lang="en-US" sz="2400" b="1" dirty="0" smtClean="0"/>
+              <a:t> </a:t>
+            </a:r>
+            <a:r>
+              <a:rPr lang="ru-RU" sz="2400" b="1" dirty="0" smtClean="0"/>
+              <a:t>и </a:t>
+            </a:r>
+            <a:r>
+              <a:rPr lang="en-US" sz="2400" b="1" dirty="0" err="1" smtClean="0"/>
+              <a:t>System.Func</a:t>
+            </a:r>
+            <a:endParaRPr lang="ru-RU" sz="2400" b="1" dirty="0"/>
+          </a:p>
+        </p:txBody>
+      </p:sp>
+      <p:sp>
+        <p:nvSpPr>
+          <p:cNvPr id="12291" name="TextBox 6"/>
+          <p:cNvSpPr txBox="1">
+            <a:spLocks noChangeArrowheads="1"/>
+          </p:cNvSpPr>
+          <p:nvPr/>
+        </p:nvSpPr>
+        <p:spPr bwMode="auto">
+          <a:xfrm>
+            <a:off x="152400" y="1002828"/>
+            <a:ext cx="8839200" cy="5016758"/>
+          </a:xfrm>
+          <a:prstGeom prst="rect">
+            <a:avLst/>
+          </a:prstGeom>
+          <a:noFill/>
+          <a:ln>
+            <a:noFill/>
+          </a:ln>
+          <a:extLst>
+            <a:ext uri="{909E8E84-426E-40DD-AFC4-6F175D3DCCD1}">
+              <a14:hiddenFill xmlns:a14="http://schemas.microsoft.com/office/drawing/2010/main">
+                <a:solidFill>
+                  <a:srgbClr val="FFFFFF"/>
+                </a:solidFill>
+              </a14:hiddenFill>
+            </a:ext>
+            <a:ext uri="{91240B29-F687-4F45-9708-019B960494DF}">
+              <a14:hiddenLine xmlns:a14="http://schemas.microsoft.com/office/drawing/2010/main" w="9525">
+                <a:solidFill>
+                  <a:srgbClr val="000000"/>
+                </a:solidFill>
+                <a:miter lim="800000"/>
+                <a:headEnd/>
+                <a:tailEnd/>
+              </a14:hiddenLine>
+            </a:ext>
+          </a:extLst>
+        </p:spPr>
+        <p:txBody>
+          <a:bodyPr>
+            <a:spAutoFit/>
+          </a:bodyPr>
+          <a:lstStyle>
+            <a:lvl1pPr defTabSz="358775" eaLnBrk="0" hangingPunct="0">
+              <a:defRPr>
+                <a:solidFill>
+                  <a:schemeClr val="tx1"/>
+                </a:solidFill>
+                <a:latin typeface="Arial" charset="0"/>
+              </a:defRPr>
+            </a:lvl1pPr>
+            <a:lvl2pPr marL="742950" indent="-285750" defTabSz="358775" eaLnBrk="0" hangingPunct="0">
+              <a:defRPr>
+                <a:solidFill>
+                  <a:schemeClr val="tx1"/>
+                </a:solidFill>
+                <a:latin typeface="Arial" charset="0"/>
+              </a:defRPr>
+            </a:lvl2pPr>
+            <a:lvl3pPr marL="1143000" indent="-228600" defTabSz="358775" eaLnBrk="0" hangingPunct="0">
+              <a:defRPr>
+                <a:solidFill>
+                  <a:schemeClr val="tx1"/>
+                </a:solidFill>
+                <a:latin typeface="Arial" charset="0"/>
+              </a:defRPr>
+            </a:lvl3pPr>
+            <a:lvl4pPr marL="1600200" indent="-228600" defTabSz="358775" eaLnBrk="0" hangingPunct="0">
+              <a:defRPr>
+                <a:solidFill>
+                  <a:schemeClr val="tx1"/>
+                </a:solidFill>
+                <a:latin typeface="Arial" charset="0"/>
+              </a:defRPr>
+            </a:lvl4pPr>
+            <a:lvl5pPr marL="2057400" indent="-228600" defTabSz="358775" eaLnBrk="0" hangingPunct="0">
+              <a:defRPr>
+                <a:solidFill>
+                  <a:schemeClr val="tx1"/>
+                </a:solidFill>
+                <a:latin typeface="Arial" charset="0"/>
+              </a:defRPr>
+            </a:lvl5pPr>
+            <a:lvl6pPr marL="2514600" indent="-228600" defTabSz="358775" eaLnBrk="0" fontAlgn="base" hangingPunct="0">
+              <a:spcBef>
+                <a:spcPct val="0"/>
+              </a:spcBef>
+              <a:spcAft>
+                <a:spcPct val="0"/>
+              </a:spcAft>
+              <a:defRPr>
+                <a:solidFill>
+                  <a:schemeClr val="tx1"/>
+                </a:solidFill>
+                <a:latin typeface="Arial" charset="0"/>
+              </a:defRPr>
+            </a:lvl6pPr>
+            <a:lvl7pPr marL="2971800" indent="-228600" defTabSz="358775" eaLnBrk="0" fontAlgn="base" hangingPunct="0">
+              <a:spcBef>
+                <a:spcPct val="0"/>
+              </a:spcBef>
+              <a:spcAft>
+                <a:spcPct val="0"/>
+              </a:spcAft>
+              <a:defRPr>
+                <a:solidFill>
+                  <a:schemeClr val="tx1"/>
+                </a:solidFill>
+                <a:latin typeface="Arial" charset="0"/>
+              </a:defRPr>
+            </a:lvl7pPr>
+            <a:lvl8pPr marL="3429000" indent="-228600" defTabSz="358775" eaLnBrk="0" fontAlgn="base" hangingPunct="0">
+              <a:spcBef>
+                <a:spcPct val="0"/>
+              </a:spcBef>
+              <a:spcAft>
+                <a:spcPct val="0"/>
+              </a:spcAft>
+              <a:defRPr>
+                <a:solidFill>
+                  <a:schemeClr val="tx1"/>
+                </a:solidFill>
+                <a:latin typeface="Arial" charset="0"/>
+              </a:defRPr>
+            </a:lvl8pPr>
+            <a:lvl9pPr marL="3886200" indent="-228600" defTabSz="358775" eaLnBrk="0" fontAlgn="base" hangingPunct="0">
+              <a:spcBef>
+                <a:spcPct val="0"/>
+              </a:spcBef>
+              <a:spcAft>
+                <a:spcPct val="0"/>
+              </a:spcAft>
+              <a:defRPr>
+                <a:solidFill>
+                  <a:schemeClr val="tx1"/>
+                </a:solidFill>
+                <a:latin typeface="Arial" charset="0"/>
+              </a:defRPr>
+            </a:lvl9pPr>
+          </a:lstStyle>
+          <a:p>
+            <a:pPr marL="285750" indent="-285750" eaLnBrk="1" hangingPunct="1">
+              <a:buFont typeface="Arial" panose="020B0604020202020204" pitchFamily="34" charset="0"/>
+              <a:buChar char="•"/>
+            </a:pPr>
+            <a:r>
+              <a:rPr lang="ru-RU" sz="1600" dirty="0" smtClean="0">
+                <a:solidFill>
+                  <a:schemeClr val="bg1"/>
+                </a:solidFill>
+              </a:rPr>
+              <a:t>Делегат</a:t>
+            </a:r>
+            <a:r>
+              <a:rPr lang="ru-RU" sz="1600" dirty="0">
+                <a:solidFill>
+                  <a:schemeClr val="bg1"/>
+                </a:solidFill>
+              </a:rPr>
+              <a:t>ы</a:t>
+            </a:r>
+            <a:r>
+              <a:rPr lang="ru-RU" sz="1600" dirty="0" smtClean="0">
+                <a:solidFill>
+                  <a:schemeClr val="bg1"/>
+                </a:solidFill>
+              </a:rPr>
+              <a:t> </a:t>
+            </a:r>
+            <a:r>
+              <a:rPr lang="en-US" sz="1600" dirty="0" err="1" smtClean="0">
+                <a:solidFill>
+                  <a:schemeClr val="bg1"/>
+                </a:solidFill>
+              </a:rPr>
+              <a:t>System.Action</a:t>
+            </a:r>
+            <a:r>
+              <a:rPr lang="en-US" sz="1600" dirty="0" smtClean="0">
+                <a:solidFill>
+                  <a:schemeClr val="bg1"/>
+                </a:solidFill>
+              </a:rPr>
+              <a:t> </a:t>
+            </a:r>
+            <a:r>
+              <a:rPr lang="ru-RU" sz="1600" dirty="0" smtClean="0">
+                <a:solidFill>
+                  <a:schemeClr val="bg1"/>
+                </a:solidFill>
+              </a:rPr>
+              <a:t>описывают функцию без возвращаемого значения с количеством аргументов от 0 до 16.</a:t>
+            </a:r>
+          </a:p>
+          <a:p>
+            <a:pPr marL="1028700" lvl="1" eaLnBrk="1" hangingPunct="1">
+              <a:buFont typeface="Arial" panose="020B0604020202020204" pitchFamily="34" charset="0"/>
+              <a:buChar char="•"/>
+            </a:pPr>
+            <a:r>
+              <a:rPr lang="en-US" sz="1600" dirty="0" smtClean="0">
+                <a:solidFill>
+                  <a:schemeClr val="bg1"/>
+                </a:solidFill>
+              </a:rPr>
+              <a:t>Action</a:t>
+            </a:r>
+          </a:p>
+          <a:p>
+            <a:pPr marL="1028700" lvl="1" eaLnBrk="1" hangingPunct="1">
+              <a:buFont typeface="Arial" panose="020B0604020202020204" pitchFamily="34" charset="0"/>
+              <a:buChar char="•"/>
+            </a:pPr>
+            <a:r>
+              <a:rPr lang="en-US" sz="1600" dirty="0" smtClean="0">
+                <a:solidFill>
+                  <a:schemeClr val="bg1"/>
+                </a:solidFill>
+              </a:rPr>
+              <a:t>Action&lt;T&gt;</a:t>
+            </a:r>
+          </a:p>
+          <a:p>
+            <a:pPr marL="1028700" lvl="1" eaLnBrk="1" hangingPunct="1">
+              <a:buFont typeface="Arial" panose="020B0604020202020204" pitchFamily="34" charset="0"/>
+              <a:buChar char="•"/>
+            </a:pPr>
+            <a:r>
+              <a:rPr lang="en-US" sz="1600" dirty="0" smtClean="0">
+                <a:solidFill>
+                  <a:schemeClr val="bg1"/>
+                </a:solidFill>
+              </a:rPr>
+              <a:t>Action&lt;T1, T2&gt;</a:t>
+            </a:r>
+          </a:p>
+          <a:p>
+            <a:pPr marL="1028700" lvl="1" eaLnBrk="1" hangingPunct="1">
+              <a:buFont typeface="Arial" panose="020B0604020202020204" pitchFamily="34" charset="0"/>
+              <a:buChar char="•"/>
+            </a:pPr>
+            <a:r>
+              <a:rPr lang="en-US" sz="1600" dirty="0">
+                <a:solidFill>
+                  <a:schemeClr val="bg1"/>
+                </a:solidFill>
+              </a:rPr>
+              <a:t>Action&lt;T1, </a:t>
+            </a:r>
+            <a:r>
+              <a:rPr lang="en-US" sz="1600" dirty="0" smtClean="0">
+                <a:solidFill>
+                  <a:schemeClr val="bg1"/>
+                </a:solidFill>
+              </a:rPr>
+              <a:t>T2, T3&gt;</a:t>
+            </a:r>
+          </a:p>
+          <a:p>
+            <a:pPr marL="1028700" lvl="1" eaLnBrk="1" hangingPunct="1">
+              <a:buFont typeface="Arial" panose="020B0604020202020204" pitchFamily="34" charset="0"/>
+              <a:buChar char="•"/>
+            </a:pPr>
+            <a:r>
+              <a:rPr lang="en-US" sz="1600" dirty="0" smtClean="0">
+                <a:solidFill>
+                  <a:schemeClr val="bg1"/>
+                </a:solidFill>
+              </a:rPr>
+              <a:t>…</a:t>
+            </a:r>
+          </a:p>
+          <a:p>
+            <a:pPr marL="1028700" lvl="1" eaLnBrk="1" hangingPunct="1">
+              <a:buFont typeface="Arial" panose="020B0604020202020204" pitchFamily="34" charset="0"/>
+              <a:buChar char="•"/>
+            </a:pPr>
+            <a:r>
+              <a:rPr lang="en-US" sz="1600" dirty="0">
+                <a:solidFill>
+                  <a:schemeClr val="bg1"/>
+                </a:solidFill>
+              </a:rPr>
+              <a:t>Action&lt;T1, T2, </a:t>
+            </a:r>
+            <a:r>
+              <a:rPr lang="en-US" sz="1600" dirty="0" smtClean="0">
+                <a:solidFill>
+                  <a:schemeClr val="bg1"/>
+                </a:solidFill>
+              </a:rPr>
+              <a:t>T3, T4, T5, T6, T7, T8, T9, T10, T11, T12, T13, T14, T15, T16&gt;</a:t>
+            </a:r>
+          </a:p>
+          <a:p>
+            <a:pPr marL="285750" indent="-285750" eaLnBrk="1" hangingPunct="1">
+              <a:buFont typeface="Arial" panose="020B0604020202020204" pitchFamily="34" charset="0"/>
+              <a:buChar char="•"/>
+            </a:pPr>
+            <a:r>
+              <a:rPr lang="ru-RU" sz="1600" dirty="0" smtClean="0">
+                <a:solidFill>
+                  <a:schemeClr val="bg1"/>
+                </a:solidFill>
+              </a:rPr>
+              <a:t>Делегаты </a:t>
+            </a:r>
+            <a:r>
+              <a:rPr lang="en-US" sz="1600" dirty="0" err="1" smtClean="0">
+                <a:solidFill>
+                  <a:schemeClr val="bg1"/>
+                </a:solidFill>
+              </a:rPr>
+              <a:t>System.Func</a:t>
+            </a:r>
+            <a:r>
+              <a:rPr lang="en-US" sz="1600" dirty="0" smtClean="0">
+                <a:solidFill>
+                  <a:schemeClr val="bg1"/>
+                </a:solidFill>
+              </a:rPr>
+              <a:t> </a:t>
+            </a:r>
+            <a:r>
+              <a:rPr lang="ru-RU" sz="1600" dirty="0" smtClean="0">
+                <a:solidFill>
+                  <a:schemeClr val="bg1"/>
+                </a:solidFill>
+              </a:rPr>
+              <a:t>описывают </a:t>
+            </a:r>
+            <a:r>
+              <a:rPr lang="ru-RU" sz="1600" dirty="0">
+                <a:solidFill>
+                  <a:schemeClr val="bg1"/>
+                </a:solidFill>
+              </a:rPr>
+              <a:t>функцию </a:t>
+            </a:r>
+            <a:r>
+              <a:rPr lang="ru-RU" sz="1600" dirty="0" smtClean="0">
+                <a:solidFill>
+                  <a:schemeClr val="bg1"/>
+                </a:solidFill>
+              </a:rPr>
+              <a:t>с возвращаемым значением с количеством </a:t>
+            </a:r>
+            <a:r>
+              <a:rPr lang="ru-RU" sz="1600" dirty="0">
+                <a:solidFill>
+                  <a:schemeClr val="bg1"/>
+                </a:solidFill>
+              </a:rPr>
+              <a:t>аргументов от 0 до </a:t>
+            </a:r>
+            <a:r>
+              <a:rPr lang="ru-RU" sz="1600" dirty="0" smtClean="0">
+                <a:solidFill>
+                  <a:schemeClr val="bg1"/>
+                </a:solidFill>
+              </a:rPr>
+              <a:t>16.</a:t>
+            </a:r>
+            <a:endParaRPr lang="en-US" sz="1600" dirty="0" smtClean="0">
+              <a:solidFill>
+                <a:schemeClr val="bg1"/>
+              </a:solidFill>
+            </a:endParaRPr>
+          </a:p>
+          <a:p>
+            <a:pPr marL="1028700" lvl="1" eaLnBrk="1" hangingPunct="1">
+              <a:buFont typeface="Arial" panose="020B0604020202020204" pitchFamily="34" charset="0"/>
+              <a:buChar char="•"/>
+            </a:pPr>
+            <a:r>
+              <a:rPr lang="en-US" sz="1600" dirty="0" err="1" smtClean="0">
+                <a:solidFill>
+                  <a:schemeClr val="bg1"/>
+                </a:solidFill>
+              </a:rPr>
+              <a:t>Func</a:t>
+            </a:r>
+            <a:r>
+              <a:rPr lang="en-US" sz="1600" dirty="0" smtClean="0">
+                <a:solidFill>
+                  <a:schemeClr val="bg1"/>
+                </a:solidFill>
+              </a:rPr>
+              <a:t>&lt;</a:t>
+            </a:r>
+            <a:r>
+              <a:rPr lang="en-US" sz="1600" dirty="0" err="1" smtClean="0">
+                <a:solidFill>
+                  <a:schemeClr val="bg1"/>
+                </a:solidFill>
+              </a:rPr>
+              <a:t>TResult</a:t>
+            </a:r>
+            <a:r>
+              <a:rPr lang="en-US" sz="1600" dirty="0" smtClean="0">
+                <a:solidFill>
+                  <a:schemeClr val="bg1"/>
+                </a:solidFill>
+              </a:rPr>
+              <a:t>&gt;</a:t>
+            </a:r>
+            <a:endParaRPr lang="en-US" sz="1600" dirty="0">
+              <a:solidFill>
+                <a:schemeClr val="bg1"/>
+              </a:solidFill>
+            </a:endParaRPr>
+          </a:p>
+          <a:p>
+            <a:pPr marL="1028700" lvl="1" eaLnBrk="1" hangingPunct="1">
+              <a:buFont typeface="Arial" panose="020B0604020202020204" pitchFamily="34" charset="0"/>
+              <a:buChar char="•"/>
+            </a:pPr>
+            <a:r>
+              <a:rPr lang="en-US" sz="1600" dirty="0" err="1" smtClean="0">
+                <a:solidFill>
+                  <a:schemeClr val="bg1"/>
+                </a:solidFill>
+              </a:rPr>
+              <a:t>Func</a:t>
+            </a:r>
+            <a:r>
+              <a:rPr lang="en-US" sz="1600" dirty="0" smtClean="0">
+                <a:solidFill>
+                  <a:schemeClr val="bg1"/>
+                </a:solidFill>
+              </a:rPr>
+              <a:t>&lt;</a:t>
+            </a:r>
+            <a:r>
+              <a:rPr lang="en-US" sz="1600" dirty="0" err="1" smtClean="0">
+                <a:solidFill>
+                  <a:schemeClr val="bg1"/>
+                </a:solidFill>
+              </a:rPr>
+              <a:t>TResult</a:t>
+            </a:r>
+            <a:r>
+              <a:rPr lang="en-US" sz="1600" dirty="0" smtClean="0">
+                <a:solidFill>
+                  <a:schemeClr val="bg1"/>
+                </a:solidFill>
+              </a:rPr>
+              <a:t>, T</a:t>
+            </a:r>
+            <a:r>
+              <a:rPr lang="en-US" sz="1600" dirty="0">
+                <a:solidFill>
+                  <a:schemeClr val="bg1"/>
+                </a:solidFill>
+              </a:rPr>
+              <a:t>&gt;</a:t>
+            </a:r>
+          </a:p>
+          <a:p>
+            <a:pPr marL="1028700" lvl="1" eaLnBrk="1" hangingPunct="1">
+              <a:buFont typeface="Arial" panose="020B0604020202020204" pitchFamily="34" charset="0"/>
+              <a:buChar char="•"/>
+            </a:pPr>
+            <a:r>
+              <a:rPr lang="en-US" sz="1600" dirty="0" err="1" smtClean="0">
+                <a:solidFill>
+                  <a:schemeClr val="bg1"/>
+                </a:solidFill>
+              </a:rPr>
+              <a:t>Func</a:t>
+            </a:r>
+            <a:r>
+              <a:rPr lang="en-US" sz="1600" dirty="0" smtClean="0">
+                <a:solidFill>
+                  <a:schemeClr val="bg1"/>
+                </a:solidFill>
+              </a:rPr>
+              <a:t>&lt;</a:t>
+            </a:r>
+            <a:r>
+              <a:rPr lang="en-US" sz="1600" dirty="0" err="1">
+                <a:solidFill>
+                  <a:schemeClr val="bg1"/>
+                </a:solidFill>
+              </a:rPr>
+              <a:t>TResult</a:t>
+            </a:r>
+            <a:r>
+              <a:rPr lang="en-US" sz="1600" dirty="0">
+                <a:solidFill>
+                  <a:schemeClr val="bg1"/>
+                </a:solidFill>
+              </a:rPr>
+              <a:t>, </a:t>
+            </a:r>
+            <a:r>
+              <a:rPr lang="en-US" sz="1600" dirty="0" smtClean="0">
+                <a:solidFill>
+                  <a:schemeClr val="bg1"/>
+                </a:solidFill>
+              </a:rPr>
+              <a:t>T1</a:t>
+            </a:r>
+            <a:r>
+              <a:rPr lang="en-US" sz="1600" dirty="0">
+                <a:solidFill>
+                  <a:schemeClr val="bg1"/>
+                </a:solidFill>
+              </a:rPr>
+              <a:t>, T2&gt;</a:t>
+            </a:r>
+          </a:p>
+          <a:p>
+            <a:pPr marL="1028700" lvl="1" eaLnBrk="1" hangingPunct="1">
+              <a:buFont typeface="Arial" panose="020B0604020202020204" pitchFamily="34" charset="0"/>
+              <a:buChar char="•"/>
+            </a:pPr>
+            <a:r>
+              <a:rPr lang="en-US" sz="1600" dirty="0" err="1" smtClean="0">
+                <a:solidFill>
+                  <a:schemeClr val="bg1"/>
+                </a:solidFill>
+              </a:rPr>
+              <a:t>Func</a:t>
+            </a:r>
+            <a:r>
+              <a:rPr lang="en-US" sz="1600" dirty="0" smtClean="0">
+                <a:solidFill>
+                  <a:schemeClr val="bg1"/>
+                </a:solidFill>
+              </a:rPr>
+              <a:t>&lt;</a:t>
+            </a:r>
+            <a:r>
+              <a:rPr lang="en-US" sz="1600" dirty="0" err="1">
+                <a:solidFill>
+                  <a:schemeClr val="bg1"/>
+                </a:solidFill>
+              </a:rPr>
+              <a:t>TResult</a:t>
+            </a:r>
+            <a:r>
+              <a:rPr lang="en-US" sz="1600" dirty="0">
+                <a:solidFill>
+                  <a:schemeClr val="bg1"/>
+                </a:solidFill>
+              </a:rPr>
+              <a:t>, </a:t>
+            </a:r>
+            <a:r>
+              <a:rPr lang="en-US" sz="1600" dirty="0" smtClean="0">
+                <a:solidFill>
+                  <a:schemeClr val="bg1"/>
+                </a:solidFill>
+              </a:rPr>
+              <a:t>T1</a:t>
+            </a:r>
+            <a:r>
+              <a:rPr lang="en-US" sz="1600" dirty="0">
+                <a:solidFill>
+                  <a:schemeClr val="bg1"/>
+                </a:solidFill>
+              </a:rPr>
+              <a:t>, T2, T3&gt;</a:t>
+            </a:r>
+          </a:p>
+          <a:p>
+            <a:pPr marL="1028700" lvl="1" eaLnBrk="1" hangingPunct="1">
+              <a:buFont typeface="Arial" panose="020B0604020202020204" pitchFamily="34" charset="0"/>
+              <a:buChar char="•"/>
+            </a:pPr>
+            <a:r>
+              <a:rPr lang="en-US" sz="1600" dirty="0">
+                <a:solidFill>
+                  <a:schemeClr val="bg1"/>
+                </a:solidFill>
+              </a:rPr>
+              <a:t>…</a:t>
+            </a:r>
+          </a:p>
+          <a:p>
+            <a:pPr marL="1028700" lvl="1" eaLnBrk="1" hangingPunct="1">
+              <a:buFont typeface="Arial" panose="020B0604020202020204" pitchFamily="34" charset="0"/>
+              <a:buChar char="•"/>
+            </a:pPr>
+            <a:r>
+              <a:rPr lang="en-US" sz="1600" dirty="0" err="1" smtClean="0">
+                <a:solidFill>
+                  <a:schemeClr val="bg1"/>
+                </a:solidFill>
+              </a:rPr>
+              <a:t>Func</a:t>
+            </a:r>
+            <a:r>
+              <a:rPr lang="en-US" sz="1600" dirty="0" smtClean="0">
+                <a:solidFill>
+                  <a:schemeClr val="bg1"/>
+                </a:solidFill>
+              </a:rPr>
+              <a:t>&lt;</a:t>
+            </a:r>
+            <a:r>
+              <a:rPr lang="en-US" sz="1600" dirty="0" err="1">
+                <a:solidFill>
+                  <a:schemeClr val="bg1"/>
+                </a:solidFill>
+              </a:rPr>
+              <a:t>TResult</a:t>
+            </a:r>
+            <a:r>
+              <a:rPr lang="en-US" sz="1600" dirty="0">
+                <a:solidFill>
+                  <a:schemeClr val="bg1"/>
+                </a:solidFill>
+              </a:rPr>
+              <a:t>, </a:t>
+            </a:r>
+            <a:r>
+              <a:rPr lang="en-US" sz="1600" dirty="0" smtClean="0">
+                <a:solidFill>
+                  <a:schemeClr val="bg1"/>
+                </a:solidFill>
+              </a:rPr>
+              <a:t>T1</a:t>
+            </a:r>
+            <a:r>
+              <a:rPr lang="en-US" sz="1600" dirty="0">
+                <a:solidFill>
+                  <a:schemeClr val="bg1"/>
+                </a:solidFill>
+              </a:rPr>
+              <a:t>, T2, T3, T4, T5, T6, T7, T8, T9, T10, T11, T12, T13, T14, T15, </a:t>
+            </a:r>
+            <a:r>
+              <a:rPr lang="en-US" sz="1600" dirty="0" smtClean="0">
+                <a:solidFill>
+                  <a:schemeClr val="bg1"/>
+                </a:solidFill>
+              </a:rPr>
+              <a:t>T16&gt;</a:t>
+            </a:r>
+          </a:p>
+          <a:p>
+            <a:pPr marL="285750" eaLnBrk="1" hangingPunct="1"/>
+            <a:endParaRPr lang="en-US" sz="1600" dirty="0">
+              <a:solidFill>
+                <a:schemeClr val="bg1"/>
+              </a:solidFill>
+            </a:endParaRPr>
+          </a:p>
+          <a:p>
+            <a:pPr eaLnBrk="1" hangingPunct="1"/>
+            <a:r>
+              <a:rPr lang="ru-RU" sz="1600" dirty="0" smtClean="0">
+                <a:solidFill>
+                  <a:schemeClr val="bg1"/>
+                </a:solidFill>
+              </a:rPr>
+              <a:t>Где </a:t>
+            </a:r>
+            <a:r>
+              <a:rPr lang="en-US" sz="1600" dirty="0" smtClean="0">
+                <a:solidFill>
+                  <a:schemeClr val="bg1"/>
+                </a:solidFill>
+              </a:rPr>
+              <a:t>T1, T2, ,,, T16 </a:t>
+            </a:r>
+            <a:r>
+              <a:rPr lang="ru-RU" sz="1600" dirty="0" smtClean="0">
+                <a:solidFill>
+                  <a:schemeClr val="bg1"/>
+                </a:solidFill>
+              </a:rPr>
+              <a:t>– тип аргумента, </a:t>
+            </a:r>
+            <a:r>
+              <a:rPr lang="en-US" sz="1600" smtClean="0">
+                <a:solidFill>
+                  <a:schemeClr val="bg1"/>
+                </a:solidFill>
+              </a:rPr>
+              <a:t>T</a:t>
+            </a:r>
+            <a:r>
+              <a:rPr lang="en-US" sz="1600">
+                <a:solidFill>
+                  <a:schemeClr val="bg1"/>
+                </a:solidFill>
+              </a:rPr>
+              <a:t>R</a:t>
+            </a:r>
+            <a:r>
+              <a:rPr lang="en-US" sz="1600" smtClean="0">
+                <a:solidFill>
+                  <a:schemeClr val="bg1"/>
+                </a:solidFill>
+              </a:rPr>
+              <a:t>esult</a:t>
+            </a:r>
+            <a:r>
+              <a:rPr lang="en-US" sz="1600" dirty="0" smtClean="0">
+                <a:solidFill>
+                  <a:schemeClr val="bg1"/>
+                </a:solidFill>
+              </a:rPr>
+              <a:t> </a:t>
+            </a:r>
+            <a:r>
+              <a:rPr lang="ru-RU" sz="1600" dirty="0" smtClean="0">
+                <a:solidFill>
+                  <a:schemeClr val="bg1"/>
+                </a:solidFill>
+              </a:rPr>
+              <a:t>тип возвращаемого значения.</a:t>
+            </a:r>
+            <a:endParaRPr lang="ru-RU" sz="1600" dirty="0">
+              <a:solidFill>
+                <a:schemeClr val="bg1"/>
+              </a:solidFill>
+            </a:endParaRPr>
+          </a:p>
+          <a:p>
+            <a:pPr eaLnBrk="1" hangingPunct="1"/>
+            <a:endParaRPr lang="ru-RU" sz="1600" dirty="0">
+              <a:solidFill>
+                <a:schemeClr val="bg1"/>
+              </a:solidFill>
+            </a:endParaRPr>
+          </a:p>
+        </p:txBody>
+      </p:sp>
+    </p:spTree>
+    <p:extLst>
+      <p:ext uri="{BB962C8B-B14F-4D97-AF65-F5344CB8AC3E}">
+        <p14:creationId xmlns:p14="http://schemas.microsoft.com/office/powerpoint/2010/main" val="1894118169"/>
+      </p:ext>
+    </p:extLst>
+  </p:cSld>
+  <p:clrMapOvr>
+    <a:masterClrMapping/>
+  </p:clrMapOvr>
+  <p:timing>
+    <p:tnLst>
+      <p:par>
+        <p:cTn id="1" dur="indefinite" restart="never" nodeType="tmRoot"/>
+      </p:par>
+    </p:tnLst>
+  </p:timing>
+</p:sld>
+</file>
+
+<file path=ppt/slides/slide14.xml><?xml version="1.0" encoding="utf-8"?>
+<p:sld xmlns:a="http://schemas.openxmlformats.org/drawingml/2006/main" xmlns:r="http://schemas.openxmlformats.org/officeDocument/2006/relationships" xmlns:p="http://schemas.openxmlformats.org/presentationml/2006/main">
+  <p:cSld>
+    <p:bg>
+      <p:bgPr>
+        <a:blipFill dpi="0" rotWithShape="1">
+          <a:blip r:embed="rId2">
+            <a:lum/>
+          </a:blip>
+          <a:srcRect/>
+          <a:stretch>
+            <a:fillRect/>
+          </a:stretch>
+        </a:blipFill>
+        <a:effectLst/>
+      </p:bgPr>
+    </p:bg>
+    <p:spTree>
+      <p:nvGrpSpPr>
+        <p:cNvPr id="1" name=""/>
+        <p:cNvGrpSpPr/>
+        <p:nvPr/>
+      </p:nvGrpSpPr>
+      <p:grpSpPr>
+        <a:xfrm>
+          <a:off x="0" y="0"/>
+          <a:ext cx="0" cy="0"/>
+          <a:chOff x="0" y="0"/>
+          <a:chExt cx="0" cy="0"/>
+        </a:xfrm>
+      </p:grpSpPr>
+      <p:sp>
+        <p:nvSpPr>
+          <p:cNvPr id="12290" name="Прямоугольник 2"/>
+          <p:cNvSpPr>
+            <a:spLocks noChangeArrowheads="1"/>
+          </p:cNvSpPr>
+          <p:nvPr/>
+        </p:nvSpPr>
+        <p:spPr bwMode="auto">
+          <a:xfrm>
+            <a:off x="228600" y="0"/>
             <a:ext cx="8686800" cy="830997"/>
           </a:xfrm>
           <a:prstGeom prst="rect">
@@ -7161,7 +7430,7 @@
 </p:sld>
 </file>
 
-<file path=ppt/slides/slide14.xml><?xml version="1.0" encoding="utf-8"?>
+<file path=ppt/slides/slide15.xml><?xml version="1.0" encoding="utf-8"?>
 <p:sld xmlns:a="http://schemas.openxmlformats.org/drawingml/2006/main" xmlns:r="http://schemas.openxmlformats.org/officeDocument/2006/relationships" xmlns:p="http://schemas.openxmlformats.org/presentationml/2006/main">
   <p:cSld>
     <p:bg>
@@ -8197,7 +8466,7 @@
 </p:sld>
 </file>
 
-<file path=ppt/slides/slide15.xml><?xml version="1.0" encoding="utf-8"?>
+<file path=ppt/slides/slide16.xml><?xml version="1.0" encoding="utf-8"?>
 <p:sld xmlns:a="http://schemas.openxmlformats.org/drawingml/2006/main" xmlns:r="http://schemas.openxmlformats.org/officeDocument/2006/relationships" xmlns:p="http://schemas.openxmlformats.org/presentationml/2006/main">
   <p:cSld>
     <p:bg>
@@ -9725,7 +9994,7 @@
 </p:sld>
 </file>
 
-<file path=ppt/slides/slide16.xml><?xml version="1.0" encoding="utf-8"?>
+<file path=ppt/slides/slide17.xml><?xml version="1.0" encoding="utf-8"?>
 <p:sld xmlns:a="http://schemas.openxmlformats.org/drawingml/2006/main" xmlns:r="http://schemas.openxmlformats.org/officeDocument/2006/relationships" xmlns:p="http://schemas.openxmlformats.org/presentationml/2006/main">
   <p:cSld>
     <p:bg>
@@ -10028,7 +10297,7 @@
 </p:sld>
 </file>
 
-<file path=ppt/slides/slide17.xml><?xml version="1.0" encoding="utf-8"?>
+<file path=ppt/slides/slide18.xml><?xml version="1.0" encoding="utf-8"?>
 <p:sld xmlns:a="http://schemas.openxmlformats.org/drawingml/2006/main" xmlns:r="http://schemas.openxmlformats.org/officeDocument/2006/relationships" xmlns:p="http://schemas.openxmlformats.org/presentationml/2006/main">
   <p:cSld>
     <p:bg>

</xml_diff>

<commit_message>
Code to check for event subscribers
</commit_message>
<xml_diff>
--- a/Presentation/lesson-05-events.pptx
+++ b/Presentation/lesson-05-events.pptx
@@ -305,7 +305,7 @@
           <a:p>
             <a:fld id="{FAECF776-F836-4CCD-9497-99E5597B8B5D}" type="datetimeFigureOut">
               <a:rPr lang="en-US" smtClean="0"/>
-              <a:t>10/2/2014</a:t>
+              <a:t>2/2/2015</a:t>
             </a:fld>
             <a:endParaRPr lang="en-US"/>
           </a:p>
@@ -475,7 +475,7 @@
           <a:p>
             <a:fld id="{FAECF776-F836-4CCD-9497-99E5597B8B5D}" type="datetimeFigureOut">
               <a:rPr lang="en-US" smtClean="0"/>
-              <a:t>10/2/2014</a:t>
+              <a:t>2/2/2015</a:t>
             </a:fld>
             <a:endParaRPr lang="en-US"/>
           </a:p>
@@ -655,7 +655,7 @@
           <a:p>
             <a:fld id="{FAECF776-F836-4CCD-9497-99E5597B8B5D}" type="datetimeFigureOut">
               <a:rPr lang="en-US" smtClean="0"/>
-              <a:t>10/2/2014</a:t>
+              <a:t>2/2/2015</a:t>
             </a:fld>
             <a:endParaRPr lang="en-US"/>
           </a:p>
@@ -825,7 +825,7 @@
           <a:p>
             <a:fld id="{FAECF776-F836-4CCD-9497-99E5597B8B5D}" type="datetimeFigureOut">
               <a:rPr lang="en-US" smtClean="0"/>
-              <a:t>10/2/2014</a:t>
+              <a:t>2/2/2015</a:t>
             </a:fld>
             <a:endParaRPr lang="en-US"/>
           </a:p>
@@ -1071,7 +1071,7 @@
           <a:p>
             <a:fld id="{FAECF776-F836-4CCD-9497-99E5597B8B5D}" type="datetimeFigureOut">
               <a:rPr lang="en-US" smtClean="0"/>
-              <a:t>10/2/2014</a:t>
+              <a:t>2/2/2015</a:t>
             </a:fld>
             <a:endParaRPr lang="en-US"/>
           </a:p>
@@ -1359,7 +1359,7 @@
           <a:p>
             <a:fld id="{FAECF776-F836-4CCD-9497-99E5597B8B5D}" type="datetimeFigureOut">
               <a:rPr lang="en-US" smtClean="0"/>
-              <a:t>10/2/2014</a:t>
+              <a:t>2/2/2015</a:t>
             </a:fld>
             <a:endParaRPr lang="en-US"/>
           </a:p>
@@ -1781,7 +1781,7 @@
           <a:p>
             <a:fld id="{FAECF776-F836-4CCD-9497-99E5597B8B5D}" type="datetimeFigureOut">
               <a:rPr lang="en-US" smtClean="0"/>
-              <a:t>10/2/2014</a:t>
+              <a:t>2/2/2015</a:t>
             </a:fld>
             <a:endParaRPr lang="en-US"/>
           </a:p>
@@ -1899,7 +1899,7 @@
           <a:p>
             <a:fld id="{FAECF776-F836-4CCD-9497-99E5597B8B5D}" type="datetimeFigureOut">
               <a:rPr lang="en-US" smtClean="0"/>
-              <a:t>10/2/2014</a:t>
+              <a:t>2/2/2015</a:t>
             </a:fld>
             <a:endParaRPr lang="en-US"/>
           </a:p>
@@ -1994,7 +1994,7 @@
           <a:p>
             <a:fld id="{FAECF776-F836-4CCD-9497-99E5597B8B5D}" type="datetimeFigureOut">
               <a:rPr lang="en-US" smtClean="0"/>
-              <a:t>10/2/2014</a:t>
+              <a:t>2/2/2015</a:t>
             </a:fld>
             <a:endParaRPr lang="en-US"/>
           </a:p>
@@ -2271,7 +2271,7 @@
           <a:p>
             <a:fld id="{FAECF776-F836-4CCD-9497-99E5597B8B5D}" type="datetimeFigureOut">
               <a:rPr lang="en-US" smtClean="0"/>
-              <a:t>10/2/2014</a:t>
+              <a:t>2/2/2015</a:t>
             </a:fld>
             <a:endParaRPr lang="en-US"/>
           </a:p>
@@ -2524,7 +2524,7 @@
           <a:p>
             <a:fld id="{FAECF776-F836-4CCD-9497-99E5597B8B5D}" type="datetimeFigureOut">
               <a:rPr lang="en-US" smtClean="0"/>
-              <a:t>10/2/2014</a:t>
+              <a:t>2/2/2015</a:t>
             </a:fld>
             <a:endParaRPr lang="en-US"/>
           </a:p>
@@ -2737,7 +2737,7 @@
           <a:p>
             <a:fld id="{FAECF776-F836-4CCD-9497-99E5597B8B5D}" type="datetimeFigureOut">
               <a:rPr lang="en-US" smtClean="0"/>
-              <a:t>10/2/2014</a:t>
+              <a:t>2/2/2015</a:t>
             </a:fld>
             <a:endParaRPr lang="en-US"/>
           </a:p>
@@ -3601,11 +3601,11 @@
   <p:clrMapOvr>
     <a:masterClrMapping/>
   </p:clrMapOvr>
-  <mc:AlternateContent xmlns:mc="http://schemas.openxmlformats.org/markup-compatibility/2006">
-    <mc:Choice xmlns:p14="http://schemas.microsoft.com/office/powerpoint/2010/main" Requires="p14">
+  <mc:AlternateContent xmlns:mc="http://schemas.openxmlformats.org/markup-compatibility/2006" xmlns:p14="http://schemas.microsoft.com/office/powerpoint/2010/main">
+    <mc:Choice Requires="p14">
       <p:transition spd="slow" p14:dur="2000"/>
     </mc:Choice>
-    <mc:Fallback>
+    <mc:Fallback xmlns="">
       <p:transition spd="slow"/>
     </mc:Fallback>
   </mc:AlternateContent>
@@ -4281,8 +4281,8 @@
         </p:nvSpPr>
         <p:spPr bwMode="auto">
           <a:xfrm>
-            <a:off x="152400" y="2068830"/>
-            <a:ext cx="8839200" cy="3939540"/>
+            <a:off x="152400" y="1991886"/>
+            <a:ext cx="8839200" cy="4093428"/>
           </a:xfrm>
           <a:prstGeom prst="rect">
             <a:avLst/>
@@ -4628,13 +4628,8 @@
                 <a:ea typeface="Calibri" pitchFamily="34" charset="0"/>
                 <a:cs typeface="Courier New" pitchFamily="49" charset="0"/>
               </a:rPr>
-              <a:t>("Engine explode...");</a:t>
-            </a:r>
-          </a:p>
-          <a:p>
-            <a:pPr eaLnBrk="0" hangingPunct="0">
-              <a:defRPr/>
-            </a:pPr>
+              <a:t>("Engine explode</a:t>
+            </a:r>
             <a:r>
               <a:rPr lang="en-US" sz="1000" dirty="0" smtClean="0">
                 <a:solidFill>
@@ -4644,9 +4639,123 @@
                 <a:ea typeface="Calibri" pitchFamily="34" charset="0"/>
                 <a:cs typeface="Courier New" pitchFamily="49" charset="0"/>
               </a:rPr>
+              <a:t>...");</a:t>
+            </a:r>
+            <a:endParaRPr lang="ru-RU" sz="1000" dirty="0" smtClean="0">
+              <a:solidFill>
+                <a:schemeClr val="bg1"/>
+              </a:solidFill>
+              <a:latin typeface="Courier New" pitchFamily="49" charset="0"/>
+              <a:ea typeface="Calibri" pitchFamily="34" charset="0"/>
+              <a:cs typeface="Courier New" pitchFamily="49" charset="0"/>
+            </a:endParaRPr>
+          </a:p>
+          <a:p>
+            <a:pPr eaLnBrk="0" hangingPunct="0">
+              <a:defRPr/>
+            </a:pPr>
+            <a:r>
+              <a:rPr lang="en-US" sz="1000" dirty="0" smtClean="0">
+                <a:solidFill>
+                  <a:schemeClr val="bg1"/>
+                </a:solidFill>
+                <a:latin typeface="Courier New" pitchFamily="49" charset="0"/>
+                <a:ea typeface="Calibri" pitchFamily="34" charset="0"/>
+                <a:cs typeface="Courier New" pitchFamily="49" charset="0"/>
+              </a:rPr>
+              <a:t>                </a:t>
+            </a:r>
+            <a:r>
+              <a:rPr lang="be-BY" sz="1000" dirty="0" smtClean="0">
+                <a:solidFill>
+                  <a:schemeClr val="bg1"/>
+                </a:solidFill>
+                <a:latin typeface="Courier New" pitchFamily="49" charset="0"/>
+                <a:ea typeface="Calibri" pitchFamily="34" charset="0"/>
+                <a:cs typeface="Courier New" pitchFamily="49" charset="0"/>
+              </a:rPr>
+              <a:t>Explosion </a:t>
+            </a:r>
+            <a:r>
+              <a:rPr lang="en-US" sz="1000" dirty="0" smtClean="0">
+                <a:solidFill>
+                  <a:schemeClr val="bg1"/>
+                </a:solidFill>
+                <a:latin typeface="Courier New" pitchFamily="49" charset="0"/>
+                <a:ea typeface="Calibri" pitchFamily="34" charset="0"/>
+                <a:cs typeface="Courier New" pitchFamily="49" charset="0"/>
+              </a:rPr>
+              <a:t>ex</a:t>
+            </a:r>
+            <a:r>
+              <a:rPr lang="be-BY" sz="1000" dirty="0" smtClean="0">
+                <a:solidFill>
+                  <a:schemeClr val="bg1"/>
+                </a:solidFill>
+                <a:latin typeface="Courier New" pitchFamily="49" charset="0"/>
+                <a:ea typeface="Calibri" pitchFamily="34" charset="0"/>
+                <a:cs typeface="Courier New" pitchFamily="49" charset="0"/>
+              </a:rPr>
+              <a:t>plode</a:t>
+            </a:r>
+            <a:r>
+              <a:rPr lang="en-US" sz="1000" dirty="0">
+                <a:solidFill>
+                  <a:schemeClr val="bg1"/>
+                </a:solidFill>
+                <a:latin typeface="Courier New" pitchFamily="49" charset="0"/>
+                <a:ea typeface="Calibri" pitchFamily="34" charset="0"/>
+                <a:cs typeface="Courier New" pitchFamily="49" charset="0"/>
+              </a:rPr>
+              <a:t> </a:t>
+            </a:r>
+            <a:r>
+              <a:rPr lang="en-US" sz="1000" dirty="0" smtClean="0">
+                <a:solidFill>
+                  <a:schemeClr val="bg1"/>
+                </a:solidFill>
+                <a:latin typeface="Courier New" pitchFamily="49" charset="0"/>
+                <a:ea typeface="Calibri" pitchFamily="34" charset="0"/>
+                <a:cs typeface="Courier New" pitchFamily="49" charset="0"/>
+              </a:rPr>
+              <a:t>= Explode;</a:t>
+            </a:r>
+            <a:endParaRPr lang="en-US" sz="1000" dirty="0">
+              <a:solidFill>
+                <a:schemeClr val="bg1"/>
+              </a:solidFill>
+              <a:latin typeface="Courier New" pitchFamily="49" charset="0"/>
+              <a:ea typeface="Calibri" pitchFamily="34" charset="0"/>
+              <a:cs typeface="Courier New" pitchFamily="49" charset="0"/>
+            </a:endParaRPr>
+          </a:p>
+          <a:p>
+            <a:pPr eaLnBrk="0" hangingPunct="0">
+              <a:defRPr/>
+            </a:pPr>
+            <a:r>
+              <a:rPr lang="en-US" sz="1000" dirty="0" smtClean="0">
+                <a:solidFill>
+                  <a:schemeClr val="bg1"/>
+                </a:solidFill>
+                <a:latin typeface="Courier New" pitchFamily="49" charset="0"/>
+                <a:ea typeface="Calibri" pitchFamily="34" charset="0"/>
+                <a:cs typeface="Courier New" pitchFamily="49" charset="0"/>
+              </a:rPr>
               <a:t>                if </a:t>
             </a:r>
             <a:r>
+              <a:rPr lang="en-US" sz="1000" dirty="0" smtClean="0">
+                <a:solidFill>
+                  <a:schemeClr val="bg1"/>
+                </a:solidFill>
+                <a:latin typeface="Courier New" pitchFamily="49" charset="0"/>
+                <a:ea typeface="Calibri" pitchFamily="34" charset="0"/>
+                <a:cs typeface="Courier New" pitchFamily="49" charset="0"/>
+              </a:rPr>
+              <a:t>(explode </a:t>
+            </a:r>
+            <a:r>
               <a:rPr lang="en-US" sz="1000" dirty="0">
                 <a:solidFill>
                   <a:schemeClr val="bg1"/>
@@ -4655,7 +4764,7 @@
                 <a:ea typeface="Calibri" pitchFamily="34" charset="0"/>
                 <a:cs typeface="Courier New" pitchFamily="49" charset="0"/>
               </a:rPr>
-              <a:t>(Explode != null)</a:t>
+              <a:t>!= null)</a:t>
             </a:r>
           </a:p>
           <a:p>
@@ -4687,7 +4796,29 @@
                 <a:ea typeface="Calibri" pitchFamily="34" charset="0"/>
                 <a:cs typeface="Courier New" pitchFamily="49" charset="0"/>
               </a:rPr>
-              <a:t>                    Explode</a:t>
+              <a:t>                    </a:t>
+            </a:r>
+            <a:r>
+              <a:rPr lang="en-US" sz="1000" dirty="0" err="1" smtClean="0">
+                <a:solidFill>
+                  <a:schemeClr val="bg1"/>
+                </a:solidFill>
+                <a:latin typeface="Courier New" pitchFamily="49" charset="0"/>
+                <a:ea typeface="Calibri" pitchFamily="34" charset="0"/>
+                <a:cs typeface="Courier New" pitchFamily="49" charset="0"/>
+              </a:rPr>
+              <a:t>explode.Invoke</a:t>
+            </a:r>
+            <a:r>
+              <a:rPr lang="en-US" sz="1000" dirty="0" smtClean="0">
+                <a:solidFill>
+                  <a:schemeClr val="bg1"/>
+                </a:solidFill>
+                <a:latin typeface="Courier New" pitchFamily="49" charset="0"/>
+                <a:ea typeface="Calibri" pitchFamily="34" charset="0"/>
+                <a:cs typeface="Courier New" pitchFamily="49" charset="0"/>
+              </a:rPr>
+              <a:t>(); </a:t>
             </a:r>
             <a:r>
               <a:rPr lang="en-US" sz="1000" dirty="0">
@@ -4698,7 +4829,7 @@
                 <a:ea typeface="Calibri" pitchFamily="34" charset="0"/>
                 <a:cs typeface="Courier New" pitchFamily="49" charset="0"/>
               </a:rPr>
-              <a:t>(); /</a:t>
+              <a:t>/</a:t>
             </a:r>
             <a:r>
               <a:rPr lang="be-BY" sz="1000" dirty="0">

</xml_diff>

<commit_message>
Fixed error in Func delegate declarations
</commit_message>
<xml_diff>
--- a/Presentation/lesson-05-events.pptx
+++ b/Presentation/lesson-05-events.pptx
@@ -305,7 +305,7 @@
           <a:p>
             <a:fld id="{FAECF776-F836-4CCD-9497-99E5597B8B5D}" type="datetimeFigureOut">
               <a:rPr lang="en-US" smtClean="0"/>
-              <a:t>2/2/2015</a:t>
+              <a:t>11/29/2015</a:t>
             </a:fld>
             <a:endParaRPr lang="en-US"/>
           </a:p>
@@ -475,7 +475,7 @@
           <a:p>
             <a:fld id="{FAECF776-F836-4CCD-9497-99E5597B8B5D}" type="datetimeFigureOut">
               <a:rPr lang="en-US" smtClean="0"/>
-              <a:t>2/2/2015</a:t>
+              <a:t>11/29/2015</a:t>
             </a:fld>
             <a:endParaRPr lang="en-US"/>
           </a:p>
@@ -655,7 +655,7 @@
           <a:p>
             <a:fld id="{FAECF776-F836-4CCD-9497-99E5597B8B5D}" type="datetimeFigureOut">
               <a:rPr lang="en-US" smtClean="0"/>
-              <a:t>2/2/2015</a:t>
+              <a:t>11/29/2015</a:t>
             </a:fld>
             <a:endParaRPr lang="en-US"/>
           </a:p>
@@ -825,7 +825,7 @@
           <a:p>
             <a:fld id="{FAECF776-F836-4CCD-9497-99E5597B8B5D}" type="datetimeFigureOut">
               <a:rPr lang="en-US" smtClean="0"/>
-              <a:t>2/2/2015</a:t>
+              <a:t>11/29/2015</a:t>
             </a:fld>
             <a:endParaRPr lang="en-US"/>
           </a:p>
@@ -1071,7 +1071,7 @@
           <a:p>
             <a:fld id="{FAECF776-F836-4CCD-9497-99E5597B8B5D}" type="datetimeFigureOut">
               <a:rPr lang="en-US" smtClean="0"/>
-              <a:t>2/2/2015</a:t>
+              <a:t>11/29/2015</a:t>
             </a:fld>
             <a:endParaRPr lang="en-US"/>
           </a:p>
@@ -1359,7 +1359,7 @@
           <a:p>
             <a:fld id="{FAECF776-F836-4CCD-9497-99E5597B8B5D}" type="datetimeFigureOut">
               <a:rPr lang="en-US" smtClean="0"/>
-              <a:t>2/2/2015</a:t>
+              <a:t>11/29/2015</a:t>
             </a:fld>
             <a:endParaRPr lang="en-US"/>
           </a:p>
@@ -1781,7 +1781,7 @@
           <a:p>
             <a:fld id="{FAECF776-F836-4CCD-9497-99E5597B8B5D}" type="datetimeFigureOut">
               <a:rPr lang="en-US" smtClean="0"/>
-              <a:t>2/2/2015</a:t>
+              <a:t>11/29/2015</a:t>
             </a:fld>
             <a:endParaRPr lang="en-US"/>
           </a:p>
@@ -1899,7 +1899,7 @@
           <a:p>
             <a:fld id="{FAECF776-F836-4CCD-9497-99E5597B8B5D}" type="datetimeFigureOut">
               <a:rPr lang="en-US" smtClean="0"/>
-              <a:t>2/2/2015</a:t>
+              <a:t>11/29/2015</a:t>
             </a:fld>
             <a:endParaRPr lang="en-US"/>
           </a:p>
@@ -1994,7 +1994,7 @@
           <a:p>
             <a:fld id="{FAECF776-F836-4CCD-9497-99E5597B8B5D}" type="datetimeFigureOut">
               <a:rPr lang="en-US" smtClean="0"/>
-              <a:t>2/2/2015</a:t>
+              <a:t>11/29/2015</a:t>
             </a:fld>
             <a:endParaRPr lang="en-US"/>
           </a:p>
@@ -2271,7 +2271,7 @@
           <a:p>
             <a:fld id="{FAECF776-F836-4CCD-9497-99E5597B8B5D}" type="datetimeFigureOut">
               <a:rPr lang="en-US" smtClean="0"/>
-              <a:t>2/2/2015</a:t>
+              <a:t>11/29/2015</a:t>
             </a:fld>
             <a:endParaRPr lang="en-US"/>
           </a:p>
@@ -2524,7 +2524,7 @@
           <a:p>
             <a:fld id="{FAECF776-F836-4CCD-9497-99E5597B8B5D}" type="datetimeFigureOut">
               <a:rPr lang="en-US" smtClean="0"/>
-              <a:t>2/2/2015</a:t>
+              <a:t>11/29/2015</a:t>
             </a:fld>
             <a:endParaRPr lang="en-US"/>
           </a:p>
@@ -2737,7 +2737,7 @@
           <a:p>
             <a:fld id="{FAECF776-F836-4CCD-9497-99E5597B8B5D}" type="datetimeFigureOut">
               <a:rPr lang="en-US" smtClean="0"/>
-              <a:t>2/2/2015</a:t>
+              <a:t>11/29/2015</a:t>
             </a:fld>
             <a:endParaRPr lang="en-US"/>
           </a:p>
@@ -4742,18 +4742,7 @@
                 <a:ea typeface="Calibri" pitchFamily="34" charset="0"/>
                 <a:cs typeface="Courier New" pitchFamily="49" charset="0"/>
               </a:rPr>
-              <a:t>                if </a:t>
-            </a:r>
-            <a:r>
-              <a:rPr lang="en-US" sz="1000" dirty="0" smtClean="0">
-                <a:solidFill>
-                  <a:schemeClr val="bg1"/>
-                </a:solidFill>
-                <a:latin typeface="Courier New" pitchFamily="49" charset="0"/>
-                <a:ea typeface="Calibri" pitchFamily="34" charset="0"/>
-                <a:cs typeface="Courier New" pitchFamily="49" charset="0"/>
-              </a:rPr>
-              <a:t>(explode </a:t>
+              <a:t>                if (explode </a:t>
             </a:r>
             <a:r>
               <a:rPr lang="en-US" sz="1000" dirty="0">
@@ -5989,7 +5978,7 @@
         <p:spPr bwMode="auto">
           <a:xfrm>
             <a:off x="152400" y="1002828"/>
-            <a:ext cx="8839200" cy="5016758"/>
+            <a:ext cx="8839200" cy="3970318"/>
           </a:xfrm>
           <a:prstGeom prst="rect">
             <a:avLst/>
@@ -6126,7 +6115,7 @@
               <a:buChar char="•"/>
             </a:pPr>
             <a:r>
-              <a:rPr lang="ru-RU" sz="1600" dirty="0" smtClean="0">
+              <a:rPr lang="ru-RU" sz="1400" dirty="0" smtClean="0">
                 <a:solidFill>
                   <a:schemeClr val="bg1"/>
                 </a:solidFill>
@@ -6134,7 +6123,7 @@
               <a:t>Делегат</a:t>
             </a:r>
             <a:r>
-              <a:rPr lang="ru-RU" sz="1600" dirty="0">
+              <a:rPr lang="ru-RU" sz="1400" dirty="0">
                 <a:solidFill>
                   <a:schemeClr val="bg1"/>
                 </a:solidFill>
@@ -6142,7 +6131,7 @@
               <a:t>ы</a:t>
             </a:r>
             <a:r>
-              <a:rPr lang="ru-RU" sz="1600" dirty="0" smtClean="0">
+              <a:rPr lang="ru-RU" sz="1400" dirty="0" smtClean="0">
                 <a:solidFill>
                   <a:schemeClr val="bg1"/>
                 </a:solidFill>
@@ -6150,7 +6139,7 @@
               <a:t> </a:t>
             </a:r>
             <a:r>
-              <a:rPr lang="en-US" sz="1600" dirty="0" err="1" smtClean="0">
+              <a:rPr lang="en-US" sz="1400" dirty="0" err="1" smtClean="0">
                 <a:solidFill>
                   <a:schemeClr val="bg1"/>
                 </a:solidFill>
@@ -6158,7 +6147,7 @@
               <a:t>System.Action</a:t>
             </a:r>
             <a:r>
-              <a:rPr lang="en-US" sz="1600" dirty="0" smtClean="0">
+              <a:rPr lang="en-US" sz="1400" dirty="0" smtClean="0">
                 <a:solidFill>
                   <a:schemeClr val="bg1"/>
                 </a:solidFill>
@@ -6166,13 +6155,26 @@
               <a:t> </a:t>
             </a:r>
             <a:r>
-              <a:rPr lang="ru-RU" sz="1600" dirty="0" smtClean="0">
-                <a:solidFill>
-                  <a:schemeClr val="bg1"/>
-                </a:solidFill>
-              </a:rPr>
-              <a:t>описывают функцию без возвращаемого значения с количеством аргументов от 0 до 16.</a:t>
-            </a:r>
+              <a:rPr lang="ru-RU" sz="1400" dirty="0" smtClean="0">
+                <a:solidFill>
+                  <a:schemeClr val="bg1"/>
+                </a:solidFill>
+              </a:rPr>
+              <a:t>описывают функцию без возвращаемого значения с количеством аргументов от 0 до </a:t>
+            </a:r>
+            <a:r>
+              <a:rPr lang="ru-RU" sz="1400" dirty="0" smtClean="0">
+                <a:solidFill>
+                  <a:schemeClr val="bg1"/>
+                </a:solidFill>
+              </a:rPr>
+              <a:t>16.</a:t>
+            </a:r>
+            <a:endParaRPr lang="en-US" sz="1400" dirty="0" smtClean="0">
+              <a:solidFill>
+                <a:schemeClr val="bg1"/>
+              </a:solidFill>
+            </a:endParaRPr>
           </a:p>
           <a:p>
             <a:pPr marL="1028700" lvl="1" eaLnBrk="1" hangingPunct="1">
@@ -6180,13 +6182,18 @@
               <a:buChar char="•"/>
             </a:pPr>
             <a:r>
-              <a:rPr lang="en-US" sz="1600" dirty="0" smtClean="0">
+              <a:rPr lang="en-US" sz="1400" dirty="0" smtClean="0">
                 <a:solidFill>
                   <a:schemeClr val="bg1"/>
                 </a:solidFill>
               </a:rPr>
               <a:t>Action</a:t>
             </a:r>
+            <a:endParaRPr lang="en-US" sz="1400" dirty="0" smtClean="0">
+              <a:solidFill>
+                <a:schemeClr val="bg1"/>
+              </a:solidFill>
+            </a:endParaRPr>
           </a:p>
           <a:p>
             <a:pPr marL="1028700" lvl="1" eaLnBrk="1" hangingPunct="1">
@@ -6194,7 +6201,7 @@
               <a:buChar char="•"/>
             </a:pPr>
             <a:r>
-              <a:rPr lang="en-US" sz="1600" dirty="0" smtClean="0">
+              <a:rPr lang="en-US" sz="1400" dirty="0" smtClean="0">
                 <a:solidFill>
                   <a:schemeClr val="bg1"/>
                 </a:solidFill>
@@ -6208,7 +6215,7 @@
               <a:buChar char="•"/>
             </a:pPr>
             <a:r>
-              <a:rPr lang="en-US" sz="1600" dirty="0" smtClean="0">
+              <a:rPr lang="en-US" sz="1400" dirty="0" smtClean="0">
                 <a:solidFill>
                   <a:schemeClr val="bg1"/>
                 </a:solidFill>
@@ -6222,7 +6229,7 @@
               <a:buChar char="•"/>
             </a:pPr>
             <a:r>
-              <a:rPr lang="en-US" sz="1600" dirty="0">
+              <a:rPr lang="en-US" sz="1400" dirty="0">
                 <a:solidFill>
                   <a:schemeClr val="bg1"/>
                 </a:solidFill>
@@ -6230,7 +6237,7 @@
               <a:t>Action&lt;T1, </a:t>
             </a:r>
             <a:r>
-              <a:rPr lang="en-US" sz="1600" dirty="0" smtClean="0">
+              <a:rPr lang="en-US" sz="1400" dirty="0" smtClean="0">
                 <a:solidFill>
                   <a:schemeClr val="bg1"/>
                 </a:solidFill>
@@ -6244,7 +6251,7 @@
               <a:buChar char="•"/>
             </a:pPr>
             <a:r>
-              <a:rPr lang="en-US" sz="1600" dirty="0" smtClean="0">
+              <a:rPr lang="en-US" sz="1400" dirty="0" smtClean="0">
                 <a:solidFill>
                   <a:schemeClr val="bg1"/>
                 </a:solidFill>
@@ -6258,7 +6265,7 @@
               <a:buChar char="•"/>
             </a:pPr>
             <a:r>
-              <a:rPr lang="en-US" sz="1600" dirty="0">
+              <a:rPr lang="en-US" sz="1400" dirty="0">
                 <a:solidFill>
                   <a:schemeClr val="bg1"/>
                 </a:solidFill>
@@ -6266,7 +6273,7 @@
               <a:t>Action&lt;T1, T2, </a:t>
             </a:r>
             <a:r>
-              <a:rPr lang="en-US" sz="1600" dirty="0" smtClean="0">
+              <a:rPr lang="en-US" sz="1400" dirty="0" smtClean="0">
                 <a:solidFill>
                   <a:schemeClr val="bg1"/>
                 </a:solidFill>
@@ -6280,7 +6287,7 @@
               <a:buChar char="•"/>
             </a:pPr>
             <a:r>
-              <a:rPr lang="ru-RU" sz="1600" dirty="0" smtClean="0">
+              <a:rPr lang="ru-RU" sz="1400" dirty="0" smtClean="0">
                 <a:solidFill>
                   <a:schemeClr val="bg1"/>
                 </a:solidFill>
@@ -6288,7 +6295,7 @@
               <a:t>Делегаты </a:t>
             </a:r>
             <a:r>
-              <a:rPr lang="en-US" sz="1600" dirty="0" err="1" smtClean="0">
+              <a:rPr lang="en-US" sz="1400" dirty="0" err="1" smtClean="0">
                 <a:solidFill>
                   <a:schemeClr val="bg1"/>
                 </a:solidFill>
@@ -6296,7 +6303,7 @@
               <a:t>System.Func</a:t>
             </a:r>
             <a:r>
-              <a:rPr lang="en-US" sz="1600" dirty="0" smtClean="0">
+              <a:rPr lang="en-US" sz="1400" dirty="0" smtClean="0">
                 <a:solidFill>
                   <a:schemeClr val="bg1"/>
                 </a:solidFill>
@@ -6304,7 +6311,7 @@
               <a:t> </a:t>
             </a:r>
             <a:r>
-              <a:rPr lang="ru-RU" sz="1600" dirty="0" smtClean="0">
+              <a:rPr lang="ru-RU" sz="1400" dirty="0" smtClean="0">
                 <a:solidFill>
                   <a:schemeClr val="bg1"/>
                 </a:solidFill>
@@ -6312,7 +6319,7 @@
               <a:t>описывают </a:t>
             </a:r>
             <a:r>
-              <a:rPr lang="ru-RU" sz="1600" dirty="0">
+              <a:rPr lang="ru-RU" sz="1400" dirty="0">
                 <a:solidFill>
                   <a:schemeClr val="bg1"/>
                 </a:solidFill>
@@ -6320,7 +6327,7 @@
               <a:t>функцию </a:t>
             </a:r>
             <a:r>
-              <a:rPr lang="ru-RU" sz="1600" dirty="0" smtClean="0">
+              <a:rPr lang="ru-RU" sz="1400" dirty="0" smtClean="0">
                 <a:solidFill>
                   <a:schemeClr val="bg1"/>
                 </a:solidFill>
@@ -6328,7 +6335,7 @@
               <a:t>с возвращаемым значением с количеством </a:t>
             </a:r>
             <a:r>
-              <a:rPr lang="ru-RU" sz="1600" dirty="0">
+              <a:rPr lang="ru-RU" sz="1400" dirty="0">
                 <a:solidFill>
                   <a:schemeClr val="bg1"/>
                 </a:solidFill>
@@ -6336,14 +6343,14 @@
               <a:t>аргументов от 0 до </a:t>
             </a:r>
             <a:r>
-              <a:rPr lang="ru-RU" sz="1600" dirty="0" smtClean="0">
+              <a:rPr lang="ru-RU" sz="1400" dirty="0" smtClean="0">
                 <a:solidFill>
                   <a:schemeClr val="bg1"/>
                 </a:solidFill>
               </a:rPr>
               <a:t>16.</a:t>
             </a:r>
-            <a:endParaRPr lang="en-US" sz="1600" dirty="0" smtClean="0">
+            <a:endParaRPr lang="en-US" sz="1400" dirty="0" smtClean="0">
               <a:solidFill>
                 <a:schemeClr val="bg1"/>
               </a:solidFill>
@@ -6355,7 +6362,7 @@
               <a:buChar char="•"/>
             </a:pPr>
             <a:r>
-              <a:rPr lang="en-US" sz="1600" dirty="0" err="1" smtClean="0">
+              <a:rPr lang="en-US" sz="1400" dirty="0" err="1" smtClean="0">
                 <a:solidFill>
                   <a:schemeClr val="bg1"/>
                 </a:solidFill>
@@ -6363,7 +6370,7 @@
               <a:t>Func</a:t>
             </a:r>
             <a:r>
-              <a:rPr lang="en-US" sz="1600" dirty="0" smtClean="0">
+              <a:rPr lang="en-US" sz="1400" dirty="0" smtClean="0">
                 <a:solidFill>
                   <a:schemeClr val="bg1"/>
                 </a:solidFill>
@@ -6371,7 +6378,7 @@
               <a:t>&lt;</a:t>
             </a:r>
             <a:r>
-              <a:rPr lang="en-US" sz="1600" dirty="0" err="1" smtClean="0">
+              <a:rPr lang="en-US" sz="1400" dirty="0" err="1" smtClean="0">
                 <a:solidFill>
                   <a:schemeClr val="bg1"/>
                 </a:solidFill>
@@ -6379,14 +6386,14 @@
               <a:t>TResult</a:t>
             </a:r>
             <a:r>
-              <a:rPr lang="en-US" sz="1600" dirty="0" smtClean="0">
+              <a:rPr lang="en-US" sz="1400" dirty="0" smtClean="0">
                 <a:solidFill>
                   <a:schemeClr val="bg1"/>
                 </a:solidFill>
               </a:rPr>
               <a:t>&gt;</a:t>
             </a:r>
-            <a:endParaRPr lang="en-US" sz="1600" dirty="0">
+            <a:endParaRPr lang="en-US" sz="1400" dirty="0">
               <a:solidFill>
                 <a:schemeClr val="bg1"/>
               </a:solidFill>
@@ -6398,7 +6405,7 @@
               <a:buChar char="•"/>
             </a:pPr>
             <a:r>
-              <a:rPr lang="en-US" sz="1600" dirty="0" err="1" smtClean="0">
+              <a:rPr lang="en-US" sz="1400" dirty="0" err="1" smtClean="0">
                 <a:solidFill>
                   <a:schemeClr val="bg1"/>
                 </a:solidFill>
@@ -6406,15 +6413,15 @@
               <a:t>Func</a:t>
             </a:r>
             <a:r>
-              <a:rPr lang="en-US" sz="1600" dirty="0" smtClean="0">
-                <a:solidFill>
-                  <a:schemeClr val="bg1"/>
-                </a:solidFill>
-              </a:rPr>
-              <a:t>&lt;</a:t>
-            </a:r>
-            <a:r>
-              <a:rPr lang="en-US" sz="1600" dirty="0" err="1" smtClean="0">
+              <a:rPr lang="en-US" sz="1400" dirty="0" smtClean="0">
+                <a:solidFill>
+                  <a:schemeClr val="bg1"/>
+                </a:solidFill>
+              </a:rPr>
+              <a:t>&lt;T, </a:t>
+            </a:r>
+            <a:r>
+              <a:rPr lang="en-US" sz="1400" dirty="0" err="1" smtClean="0">
                 <a:solidFill>
                   <a:schemeClr val="bg1"/>
                 </a:solidFill>
@@ -6422,21 +6429,18 @@
               <a:t>TResult</a:t>
             </a:r>
             <a:r>
-              <a:rPr lang="en-US" sz="1600" dirty="0" smtClean="0">
-                <a:solidFill>
-                  <a:schemeClr val="bg1"/>
-                </a:solidFill>
-              </a:rPr>
-              <a:t>, T</a:t>
-            </a:r>
-            <a:r>
-              <a:rPr lang="en-US" sz="1600" dirty="0">
+              <a:rPr lang="en-US" sz="1400" dirty="0">
                 <a:solidFill>
                   <a:schemeClr val="bg1"/>
                 </a:solidFill>
               </a:rPr>
               <a:t>&gt;</a:t>
             </a:r>
+            <a:endParaRPr lang="en-US" sz="1400" dirty="0">
+              <a:solidFill>
+                <a:schemeClr val="bg1"/>
+              </a:solidFill>
+            </a:endParaRPr>
           </a:p>
           <a:p>
             <a:pPr marL="1028700" lvl="1" eaLnBrk="1" hangingPunct="1">
@@ -6444,7 +6448,7 @@
               <a:buChar char="•"/>
             </a:pPr>
             <a:r>
-              <a:rPr lang="en-US" sz="1600" dirty="0" err="1" smtClean="0">
+              <a:rPr lang="en-US" sz="1400" dirty="0" err="1" smtClean="0">
                 <a:solidFill>
                   <a:schemeClr val="bg1"/>
                 </a:solidFill>
@@ -6452,15 +6456,23 @@
               <a:t>Func</a:t>
             </a:r>
             <a:r>
-              <a:rPr lang="en-US" sz="1600" dirty="0" smtClean="0">
-                <a:solidFill>
-                  <a:schemeClr val="bg1"/>
-                </a:solidFill>
-              </a:rPr>
-              <a:t>&lt;</a:t>
-            </a:r>
-            <a:r>
-              <a:rPr lang="en-US" sz="1600" dirty="0" err="1">
+              <a:rPr lang="en-US" sz="1400" dirty="0" smtClean="0">
+                <a:solidFill>
+                  <a:schemeClr val="bg1"/>
+                </a:solidFill>
+              </a:rPr>
+              <a:t>&lt;T1, </a:t>
+            </a:r>
+            <a:r>
+              <a:rPr lang="en-US" sz="1400" dirty="0" smtClean="0">
+                <a:solidFill>
+                  <a:schemeClr val="bg1"/>
+                </a:solidFill>
+              </a:rPr>
+              <a:t>T2, </a:t>
+            </a:r>
+            <a:r>
+              <a:rPr lang="en-US" sz="1400" dirty="0" err="1" smtClean="0">
                 <a:solidFill>
                   <a:schemeClr val="bg1"/>
                 </a:solidFill>
@@ -6468,29 +6480,18 @@
               <a:t>TResult</a:t>
             </a:r>
             <a:r>
-              <a:rPr lang="en-US" sz="1600" dirty="0">
-                <a:solidFill>
-                  <a:schemeClr val="bg1"/>
-                </a:solidFill>
-              </a:rPr>
-              <a:t>, </a:t>
-            </a:r>
-            <a:r>
-              <a:rPr lang="en-US" sz="1600" dirty="0" smtClean="0">
-                <a:solidFill>
-                  <a:schemeClr val="bg1"/>
-                </a:solidFill>
-              </a:rPr>
-              <a:t>T1</a:t>
-            </a:r>
-            <a:r>
-              <a:rPr lang="en-US" sz="1600" dirty="0">
-                <a:solidFill>
-                  <a:schemeClr val="bg1"/>
-                </a:solidFill>
-              </a:rPr>
-              <a:t>, T2&gt;</a:t>
-            </a:r>
+              <a:rPr lang="en-US" sz="1400" dirty="0">
+                <a:solidFill>
+                  <a:schemeClr val="bg1"/>
+                </a:solidFill>
+              </a:rPr>
+              <a:t>&gt;</a:t>
+            </a:r>
+            <a:endParaRPr lang="en-US" sz="1400" dirty="0">
+              <a:solidFill>
+                <a:schemeClr val="bg1"/>
+              </a:solidFill>
+            </a:endParaRPr>
           </a:p>
           <a:p>
             <a:pPr marL="1028700" lvl="1" eaLnBrk="1" hangingPunct="1">
@@ -6498,7 +6499,7 @@
               <a:buChar char="•"/>
             </a:pPr>
             <a:r>
-              <a:rPr lang="en-US" sz="1600" dirty="0" err="1" smtClean="0">
+              <a:rPr lang="en-US" sz="1400" dirty="0" err="1" smtClean="0">
                 <a:solidFill>
                   <a:schemeClr val="bg1"/>
                 </a:solidFill>
@@ -6506,15 +6507,31 @@
               <a:t>Func</a:t>
             </a:r>
             <a:r>
-              <a:rPr lang="en-US" sz="1600" dirty="0" smtClean="0">
-                <a:solidFill>
-                  <a:schemeClr val="bg1"/>
-                </a:solidFill>
-              </a:rPr>
-              <a:t>&lt;</a:t>
-            </a:r>
-            <a:r>
-              <a:rPr lang="en-US" sz="1600" dirty="0" err="1">
+              <a:rPr lang="en-US" sz="1400" dirty="0" smtClean="0">
+                <a:solidFill>
+                  <a:schemeClr val="bg1"/>
+                </a:solidFill>
+              </a:rPr>
+              <a:t>&lt;T1</a:t>
+            </a:r>
+            <a:r>
+              <a:rPr lang="en-US" sz="1400" dirty="0">
+                <a:solidFill>
+                  <a:schemeClr val="bg1"/>
+                </a:solidFill>
+              </a:rPr>
+              <a:t>, T2, </a:t>
+            </a:r>
+            <a:r>
+              <a:rPr lang="en-US" sz="1400" dirty="0">
+                <a:solidFill>
+                  <a:schemeClr val="bg1"/>
+                </a:solidFill>
+              </a:rPr>
+              <a:t>T3, </a:t>
+            </a:r>
+            <a:r>
+              <a:rPr lang="en-US" sz="1400" dirty="0" err="1">
                 <a:solidFill>
                   <a:schemeClr val="bg1"/>
                 </a:solidFill>
@@ -6522,29 +6539,18 @@
               <a:t>TResult</a:t>
             </a:r>
             <a:r>
-              <a:rPr lang="en-US" sz="1600" dirty="0">
-                <a:solidFill>
-                  <a:schemeClr val="bg1"/>
-                </a:solidFill>
-              </a:rPr>
-              <a:t>, </a:t>
-            </a:r>
-            <a:r>
-              <a:rPr lang="en-US" sz="1600" dirty="0" smtClean="0">
-                <a:solidFill>
-                  <a:schemeClr val="bg1"/>
-                </a:solidFill>
-              </a:rPr>
-              <a:t>T1</a:t>
-            </a:r>
-            <a:r>
-              <a:rPr lang="en-US" sz="1600" dirty="0">
-                <a:solidFill>
-                  <a:schemeClr val="bg1"/>
-                </a:solidFill>
-              </a:rPr>
-              <a:t>, T2, T3&gt;</a:t>
-            </a:r>
+              <a:rPr lang="en-US" sz="1400" dirty="0">
+                <a:solidFill>
+                  <a:schemeClr val="bg1"/>
+                </a:solidFill>
+              </a:rPr>
+              <a:t>&gt;</a:t>
+            </a:r>
+            <a:endParaRPr lang="en-US" sz="1400" dirty="0">
+              <a:solidFill>
+                <a:schemeClr val="bg1"/>
+              </a:solidFill>
+            </a:endParaRPr>
           </a:p>
           <a:p>
             <a:pPr marL="1028700" lvl="1" eaLnBrk="1" hangingPunct="1">
@@ -6552,7 +6558,7 @@
               <a:buChar char="•"/>
             </a:pPr>
             <a:r>
-              <a:rPr lang="en-US" sz="1600" dirty="0">
+              <a:rPr lang="en-US" sz="1400" dirty="0">
                 <a:solidFill>
                   <a:schemeClr val="bg1"/>
                 </a:solidFill>
@@ -6566,7 +6572,7 @@
               <a:buChar char="•"/>
             </a:pPr>
             <a:r>
-              <a:rPr lang="en-US" sz="1600" dirty="0" err="1" smtClean="0">
+              <a:rPr lang="en-US" sz="1400" dirty="0" err="1" smtClean="0">
                 <a:solidFill>
                   <a:schemeClr val="bg1"/>
                 </a:solidFill>
@@ -6574,15 +6580,31 @@
               <a:t>Func</a:t>
             </a:r>
             <a:r>
-              <a:rPr lang="en-US" sz="1600" dirty="0" smtClean="0">
-                <a:solidFill>
-                  <a:schemeClr val="bg1"/>
-                </a:solidFill>
-              </a:rPr>
-              <a:t>&lt;</a:t>
-            </a:r>
-            <a:r>
-              <a:rPr lang="en-US" sz="1600" dirty="0" err="1">
+              <a:rPr lang="en-US" sz="1400" dirty="0" smtClean="0">
+                <a:solidFill>
+                  <a:schemeClr val="bg1"/>
+                </a:solidFill>
+              </a:rPr>
+              <a:t>&lt;T1</a:t>
+            </a:r>
+            <a:r>
+              <a:rPr lang="en-US" sz="1400" dirty="0">
+                <a:solidFill>
+                  <a:schemeClr val="bg1"/>
+                </a:solidFill>
+              </a:rPr>
+              <a:t>, T2, T3, T4, T5, T6, T7, T8, T9, T10, T11, T12, T13, T14, T15, </a:t>
+            </a:r>
+            <a:r>
+              <a:rPr lang="en-US" sz="1400" dirty="0">
+                <a:solidFill>
+                  <a:schemeClr val="bg1"/>
+                </a:solidFill>
+              </a:rPr>
+              <a:t>T16, </a:t>
+            </a:r>
+            <a:r>
+              <a:rPr lang="en-US" sz="1400" dirty="0" err="1">
                 <a:solidFill>
                   <a:schemeClr val="bg1"/>
                 </a:solidFill>
@@ -6590,41 +6612,22 @@
               <a:t>TResult</a:t>
             </a:r>
             <a:r>
-              <a:rPr lang="en-US" sz="1600" dirty="0">
-                <a:solidFill>
-                  <a:schemeClr val="bg1"/>
-                </a:solidFill>
-              </a:rPr>
-              <a:t>, </a:t>
-            </a:r>
-            <a:r>
-              <a:rPr lang="en-US" sz="1600" dirty="0" smtClean="0">
-                <a:solidFill>
-                  <a:schemeClr val="bg1"/>
-                </a:solidFill>
-              </a:rPr>
-              <a:t>T1</a:t>
-            </a:r>
-            <a:r>
-              <a:rPr lang="en-US" sz="1600" dirty="0">
-                <a:solidFill>
-                  <a:schemeClr val="bg1"/>
-                </a:solidFill>
-              </a:rPr>
-              <a:t>, T2, T3, T4, T5, T6, T7, T8, T9, T10, T11, T12, T13, T14, T15, </a:t>
-            </a:r>
-            <a:r>
-              <a:rPr lang="en-US" sz="1600" dirty="0" smtClean="0">
-                <a:solidFill>
-                  <a:schemeClr val="bg1"/>
-                </a:solidFill>
-              </a:rPr>
-              <a:t>T16&gt;</a:t>
-            </a:r>
+              <a:rPr lang="en-US" sz="1400" dirty="0">
+                <a:solidFill>
+                  <a:schemeClr val="bg1"/>
+                </a:solidFill>
+              </a:rPr>
+              <a:t>&gt;</a:t>
+            </a:r>
+            <a:endParaRPr lang="en-US" sz="1400" dirty="0" smtClean="0">
+              <a:solidFill>
+                <a:schemeClr val="bg1"/>
+              </a:solidFill>
+            </a:endParaRPr>
           </a:p>
           <a:p>
             <a:pPr marL="285750" eaLnBrk="1" hangingPunct="1"/>
-            <a:endParaRPr lang="en-US" sz="1600" dirty="0">
+            <a:endParaRPr lang="en-US" sz="1400" dirty="0">
               <a:solidFill>
                 <a:schemeClr val="bg1"/>
               </a:solidFill>
@@ -6633,7 +6636,7 @@
           <a:p>
             <a:pPr eaLnBrk="1" hangingPunct="1"/>
             <a:r>
-              <a:rPr lang="ru-RU" sz="1600" dirty="0" smtClean="0">
+              <a:rPr lang="ru-RU" sz="1400" dirty="0" smtClean="0">
                 <a:solidFill>
                   <a:schemeClr val="bg1"/>
                 </a:solidFill>
@@ -6641,7 +6644,7 @@
               <a:t>Где </a:t>
             </a:r>
             <a:r>
-              <a:rPr lang="en-US" sz="1600" dirty="0" smtClean="0">
+              <a:rPr lang="en-US" sz="1400" dirty="0" smtClean="0">
                 <a:solidFill>
                   <a:schemeClr val="bg1"/>
                 </a:solidFill>
@@ -6649,7 +6652,7 @@
               <a:t>T1, T2, ,,, T16 </a:t>
             </a:r>
             <a:r>
-              <a:rPr lang="ru-RU" sz="1600" dirty="0" smtClean="0">
+              <a:rPr lang="ru-RU" sz="1400" dirty="0" smtClean="0">
                 <a:solidFill>
                   <a:schemeClr val="bg1"/>
                 </a:solidFill>
@@ -6657,7 +6660,7 @@
               <a:t>– тип аргумента, </a:t>
             </a:r>
             <a:r>
-              <a:rPr lang="en-US" sz="1600" smtClean="0">
+              <a:rPr lang="en-US" sz="1400" dirty="0" err="1" smtClean="0">
                 <a:solidFill>
                   <a:schemeClr val="bg1"/>
                 </a:solidFill>
@@ -6665,7 +6668,7 @@
               <a:t>T</a:t>
             </a:r>
             <a:r>
-              <a:rPr lang="en-US" sz="1600">
+              <a:rPr lang="en-US" sz="1400" dirty="0" err="1">
                 <a:solidFill>
                   <a:schemeClr val="bg1"/>
                 </a:solidFill>
@@ -6673,7 +6676,7 @@
               <a:t>R</a:t>
             </a:r>
             <a:r>
-              <a:rPr lang="en-US" sz="1600" smtClean="0">
+              <a:rPr lang="en-US" sz="1400" dirty="0" err="1" smtClean="0">
                 <a:solidFill>
                   <a:schemeClr val="bg1"/>
                 </a:solidFill>
@@ -6681,7 +6684,7 @@
               <a:t>esult</a:t>
             </a:r>
             <a:r>
-              <a:rPr lang="en-US" sz="1600" dirty="0" smtClean="0">
+              <a:rPr lang="en-US" sz="1400" dirty="0" smtClean="0">
                 <a:solidFill>
                   <a:schemeClr val="bg1"/>
                 </a:solidFill>
@@ -6689,22 +6692,22 @@
               <a:t> </a:t>
             </a:r>
             <a:r>
-              <a:rPr lang="ru-RU" sz="1600" dirty="0" smtClean="0">
-                <a:solidFill>
-                  <a:schemeClr val="bg1"/>
-                </a:solidFill>
-              </a:rPr>
-              <a:t>тип возвращаемого значения.</a:t>
-            </a:r>
-            <a:endParaRPr lang="ru-RU" sz="1600" dirty="0">
-              <a:solidFill>
-                <a:schemeClr val="bg1"/>
-              </a:solidFill>
-            </a:endParaRPr>
-          </a:p>
-          <a:p>
-            <a:pPr eaLnBrk="1" hangingPunct="1"/>
-            <a:endParaRPr lang="ru-RU" sz="1600" dirty="0">
+              <a:rPr lang="ru-RU" sz="1400" dirty="0" smtClean="0">
+                <a:solidFill>
+                  <a:schemeClr val="bg1"/>
+                </a:solidFill>
+              </a:rPr>
+              <a:t>тип возвращаемого значения</a:t>
+            </a:r>
+            <a:r>
+              <a:rPr lang="ru-RU" sz="1400" dirty="0" smtClean="0">
+                <a:solidFill>
+                  <a:schemeClr val="bg1"/>
+                </a:solidFill>
+              </a:rPr>
+              <a:t>.</a:t>
+            </a:r>
+            <a:endParaRPr lang="ru-RU" sz="1400" dirty="0">
               <a:solidFill>
                 <a:schemeClr val="bg1"/>
               </a:solidFill>

</xml_diff>

<commit_message>
Added sections to presentations
</commit_message>
<xml_diff>
--- a/Presentation/lesson-05-events.pptx
+++ b/Presentation/lesson-05-events.pptx
@@ -121,6 +121,46 @@
       </a:defRPr>
     </a:lvl9pPr>
   </p:defaultTextStyle>
+  <p:extLst>
+    <p:ext uri="{521415D9-36F7-43E2-AB2F-B90AF26B5E84}">
+      <p14:sectionLst xmlns:p14="http://schemas.microsoft.com/office/powerpoint/2010/main">
+        <p14:section name="Default Section" id="{F97A4805-1400-486D-9DFA-FC75683CC133}">
+          <p14:sldIdLst>
+            <p14:sldId id="257"/>
+            <p14:sldId id="285"/>
+          </p14:sldIdLst>
+        </p14:section>
+        <p14:section name="Делегаты" id="{7ECA1784-1F88-4A34-BDC5-15DA2528DC50}">
+          <p14:sldIdLst>
+            <p14:sldId id="273"/>
+            <p14:sldId id="274"/>
+            <p14:sldId id="275"/>
+            <p14:sldId id="276"/>
+            <p14:sldId id="277"/>
+            <p14:sldId id="278"/>
+          </p14:sldIdLst>
+        </p14:section>
+        <p14:section name="События" id="{51CD63FA-9B48-429F-B2C7-C63C3B612EDB}">
+          <p14:sldIdLst>
+            <p14:sldId id="279"/>
+            <p14:sldId id="290"/>
+            <p14:sldId id="280"/>
+            <p14:sldId id="281"/>
+            <p14:sldId id="282"/>
+            <p14:sldId id="289"/>
+            <p14:sldId id="283"/>
+            <p14:sldId id="286"/>
+          </p14:sldIdLst>
+        </p14:section>
+        <p14:section name="Задания" id="{AD85C9C5-C26B-4232-9BCE-39CA16F727FF}">
+          <p14:sldIdLst>
+            <p14:sldId id="287"/>
+            <p14:sldId id="288"/>
+          </p14:sldIdLst>
+        </p14:section>
+      </p14:sectionLst>
+    </p:ext>
+  </p:extLst>
 </p:presentation>
 </file>
 
@@ -305,7 +345,7 @@
           <a:p>
             <a:fld id="{FAECF776-F836-4CCD-9497-99E5597B8B5D}" type="datetimeFigureOut">
               <a:rPr lang="en-US" smtClean="0"/>
-              <a:t>11/29/2015</a:t>
+              <a:t>6/23/2016</a:t>
             </a:fld>
             <a:endParaRPr lang="en-US"/>
           </a:p>
@@ -475,7 +515,7 @@
           <a:p>
             <a:fld id="{FAECF776-F836-4CCD-9497-99E5597B8B5D}" type="datetimeFigureOut">
               <a:rPr lang="en-US" smtClean="0"/>
-              <a:t>11/29/2015</a:t>
+              <a:t>6/23/2016</a:t>
             </a:fld>
             <a:endParaRPr lang="en-US"/>
           </a:p>
@@ -655,7 +695,7 @@
           <a:p>
             <a:fld id="{FAECF776-F836-4CCD-9497-99E5597B8B5D}" type="datetimeFigureOut">
               <a:rPr lang="en-US" smtClean="0"/>
-              <a:t>11/29/2015</a:t>
+              <a:t>6/23/2016</a:t>
             </a:fld>
             <a:endParaRPr lang="en-US"/>
           </a:p>
@@ -825,7 +865,7 @@
           <a:p>
             <a:fld id="{FAECF776-F836-4CCD-9497-99E5597B8B5D}" type="datetimeFigureOut">
               <a:rPr lang="en-US" smtClean="0"/>
-              <a:t>11/29/2015</a:t>
+              <a:t>6/23/2016</a:t>
             </a:fld>
             <a:endParaRPr lang="en-US"/>
           </a:p>
@@ -1071,7 +1111,7 @@
           <a:p>
             <a:fld id="{FAECF776-F836-4CCD-9497-99E5597B8B5D}" type="datetimeFigureOut">
               <a:rPr lang="en-US" smtClean="0"/>
-              <a:t>11/29/2015</a:t>
+              <a:t>6/23/2016</a:t>
             </a:fld>
             <a:endParaRPr lang="en-US"/>
           </a:p>
@@ -1359,7 +1399,7 @@
           <a:p>
             <a:fld id="{FAECF776-F836-4CCD-9497-99E5597B8B5D}" type="datetimeFigureOut">
               <a:rPr lang="en-US" smtClean="0"/>
-              <a:t>11/29/2015</a:t>
+              <a:t>6/23/2016</a:t>
             </a:fld>
             <a:endParaRPr lang="en-US"/>
           </a:p>
@@ -1781,7 +1821,7 @@
           <a:p>
             <a:fld id="{FAECF776-F836-4CCD-9497-99E5597B8B5D}" type="datetimeFigureOut">
               <a:rPr lang="en-US" smtClean="0"/>
-              <a:t>11/29/2015</a:t>
+              <a:t>6/23/2016</a:t>
             </a:fld>
             <a:endParaRPr lang="en-US"/>
           </a:p>
@@ -1899,7 +1939,7 @@
           <a:p>
             <a:fld id="{FAECF776-F836-4CCD-9497-99E5597B8B5D}" type="datetimeFigureOut">
               <a:rPr lang="en-US" smtClean="0"/>
-              <a:t>11/29/2015</a:t>
+              <a:t>6/23/2016</a:t>
             </a:fld>
             <a:endParaRPr lang="en-US"/>
           </a:p>
@@ -1994,7 +2034,7 @@
           <a:p>
             <a:fld id="{FAECF776-F836-4CCD-9497-99E5597B8B5D}" type="datetimeFigureOut">
               <a:rPr lang="en-US" smtClean="0"/>
-              <a:t>11/29/2015</a:t>
+              <a:t>6/23/2016</a:t>
             </a:fld>
             <a:endParaRPr lang="en-US"/>
           </a:p>
@@ -2271,7 +2311,7 @@
           <a:p>
             <a:fld id="{FAECF776-F836-4CCD-9497-99E5597B8B5D}" type="datetimeFigureOut">
               <a:rPr lang="en-US" smtClean="0"/>
-              <a:t>11/29/2015</a:t>
+              <a:t>6/23/2016</a:t>
             </a:fld>
             <a:endParaRPr lang="en-US"/>
           </a:p>
@@ -2524,7 +2564,7 @@
           <a:p>
             <a:fld id="{FAECF776-F836-4CCD-9497-99E5597B8B5D}" type="datetimeFigureOut">
               <a:rPr lang="en-US" smtClean="0"/>
-              <a:t>11/29/2015</a:t>
+              <a:t>6/23/2016</a:t>
             </a:fld>
             <a:endParaRPr lang="en-US"/>
           </a:p>
@@ -2737,7 +2777,7 @@
           <a:p>
             <a:fld id="{FAECF776-F836-4CCD-9497-99E5597B8B5D}" type="datetimeFigureOut">
               <a:rPr lang="en-US" smtClean="0"/>
-              <a:t>11/29/2015</a:t>
+              <a:t>6/23/2016</a:t>
             </a:fld>
             <a:endParaRPr lang="en-US"/>
           </a:p>
@@ -6160,15 +6200,7 @@
                   <a:schemeClr val="bg1"/>
                 </a:solidFill>
               </a:rPr>
-              <a:t>описывают функцию без возвращаемого значения с количеством аргументов от 0 до </a:t>
-            </a:r>
-            <a:r>
-              <a:rPr lang="ru-RU" sz="1400" dirty="0" smtClean="0">
-                <a:solidFill>
-                  <a:schemeClr val="bg1"/>
-                </a:solidFill>
-              </a:rPr>
-              <a:t>16.</a:t>
+              <a:t>описывают функцию без возвращаемого значения с количеством аргументов от 0 до 16.</a:t>
             </a:r>
             <a:endParaRPr lang="en-US" sz="1400" dirty="0" smtClean="0">
               <a:solidFill>
@@ -6189,11 +6221,6 @@
               </a:rPr>
               <a:t>Action</a:t>
             </a:r>
-            <a:endParaRPr lang="en-US" sz="1400" dirty="0" smtClean="0">
-              <a:solidFill>
-                <a:schemeClr val="bg1"/>
-              </a:solidFill>
-            </a:endParaRPr>
           </a:p>
           <a:p>
             <a:pPr marL="1028700" lvl="1" eaLnBrk="1" hangingPunct="1">
@@ -6436,11 +6463,6 @@
               </a:rPr>
               <a:t>&gt;</a:t>
             </a:r>
-            <a:endParaRPr lang="en-US" sz="1400" dirty="0">
-              <a:solidFill>
-                <a:schemeClr val="bg1"/>
-              </a:solidFill>
-            </a:endParaRPr>
           </a:p>
           <a:p>
             <a:pPr marL="1028700" lvl="1" eaLnBrk="1" hangingPunct="1">
@@ -6461,15 +6483,7 @@
                   <a:schemeClr val="bg1"/>
                 </a:solidFill>
               </a:rPr>
-              <a:t>&lt;T1, </a:t>
-            </a:r>
-            <a:r>
-              <a:rPr lang="en-US" sz="1400" dirty="0" smtClean="0">
-                <a:solidFill>
-                  <a:schemeClr val="bg1"/>
-                </a:solidFill>
-              </a:rPr>
-              <a:t>T2, </a:t>
+              <a:t>&lt;T1, T2, </a:t>
             </a:r>
             <a:r>
               <a:rPr lang="en-US" sz="1400" dirty="0" err="1" smtClean="0">
@@ -6487,11 +6501,6 @@
               </a:rPr>
               <a:t>&gt;</a:t>
             </a:r>
-            <a:endParaRPr lang="en-US" sz="1400" dirty="0">
-              <a:solidFill>
-                <a:schemeClr val="bg1"/>
-              </a:solidFill>
-            </a:endParaRPr>
           </a:p>
           <a:p>
             <a:pPr marL="1028700" lvl="1" eaLnBrk="1" hangingPunct="1">
@@ -6520,7 +6529,15 @@
                   <a:schemeClr val="bg1"/>
                 </a:solidFill>
               </a:rPr>
-              <a:t>, T2, </a:t>
+              <a:t>, T2, T3, </a:t>
+            </a:r>
+            <a:r>
+              <a:rPr lang="en-US" sz="1400" dirty="0" err="1">
+                <a:solidFill>
+                  <a:schemeClr val="bg1"/>
+                </a:solidFill>
+              </a:rPr>
+              <a:t>TResult</a:t>
             </a:r>
             <a:r>
               <a:rPr lang="en-US" sz="1400" dirty="0">
@@ -6528,29 +6545,8 @@
                   <a:schemeClr val="bg1"/>
                 </a:solidFill>
               </a:rPr>
-              <a:t>T3, </a:t>
-            </a:r>
-            <a:r>
-              <a:rPr lang="en-US" sz="1400" dirty="0" err="1">
-                <a:solidFill>
-                  <a:schemeClr val="bg1"/>
-                </a:solidFill>
-              </a:rPr>
-              <a:t>TResult</a:t>
-            </a:r>
-            <a:r>
-              <a:rPr lang="en-US" sz="1400" dirty="0">
-                <a:solidFill>
-                  <a:schemeClr val="bg1"/>
-                </a:solidFill>
-              </a:rPr>
               <a:t>&gt;</a:t>
             </a:r>
-            <a:endParaRPr lang="en-US" sz="1400" dirty="0">
-              <a:solidFill>
-                <a:schemeClr val="bg1"/>
-              </a:solidFill>
-            </a:endParaRPr>
           </a:p>
           <a:p>
             <a:pPr marL="1028700" lvl="1" eaLnBrk="1" hangingPunct="1">
@@ -6593,15 +6589,7 @@
                   <a:schemeClr val="bg1"/>
                 </a:solidFill>
               </a:rPr>
-              <a:t>, T2, T3, T4, T5, T6, T7, T8, T9, T10, T11, T12, T13, T14, T15, </a:t>
-            </a:r>
-            <a:r>
-              <a:rPr lang="en-US" sz="1400" dirty="0">
-                <a:solidFill>
-                  <a:schemeClr val="bg1"/>
-                </a:solidFill>
-              </a:rPr>
-              <a:t>T16, </a:t>
+              <a:t>, T2, T3, T4, T5, T6, T7, T8, T9, T10, T11, T12, T13, T14, T15, T16, </a:t>
             </a:r>
             <a:r>
               <a:rPr lang="en-US" sz="1400" dirty="0" err="1">
@@ -6697,15 +6685,7 @@
                   <a:schemeClr val="bg1"/>
                 </a:solidFill>
               </a:rPr>
-              <a:t>тип возвращаемого значения</a:t>
-            </a:r>
-            <a:r>
-              <a:rPr lang="ru-RU" sz="1400" dirty="0" smtClean="0">
-                <a:solidFill>
-                  <a:schemeClr val="bg1"/>
-                </a:solidFill>
-              </a:rPr>
-              <a:t>.</a:t>
+              <a:t>тип возвращаемого значения.</a:t>
             </a:r>
             <a:endParaRPr lang="ru-RU" sz="1400" dirty="0">
               <a:solidFill>

</xml_diff>